<commit_message>
added application section & schematic diagrams of the container yard
</commit_message>
<xml_diff>
--- a/Tex/img/image_drafts.pptx
+++ b/Tex/img/image_drafts.pptx
@@ -6,6 +6,8 @@
   </p:sldMasterIdLst>
   <p:sldIdLst>
     <p:sldId id="257" r:id="rId2"/>
+    <p:sldId id="258" r:id="rId3"/>
+    <p:sldId id="259" r:id="rId4"/>
   </p:sldIdLst>
   <p:sldSz cx="12192000" cy="6858000"/>
   <p:notesSz cx="6858000" cy="9144000"/>
@@ -4678,6 +4680,4967 @@
     <p:extLst>
       <p:ext uri="{BB962C8B-B14F-4D97-AF65-F5344CB8AC3E}">
         <p14:creationId xmlns:p14="http://schemas.microsoft.com/office/powerpoint/2010/main" val="977330680"/>
+      </p:ext>
+    </p:extLst>
+  </p:cSld>
+  <p:clrMapOvr>
+    <a:masterClrMapping/>
+  </p:clrMapOvr>
+</p:sld>
+</file>
+
+<file path=ppt/slides/slide2.xml><?xml version="1.0" encoding="utf-8"?>
+<p:sld xmlns:a="http://schemas.openxmlformats.org/drawingml/2006/main" xmlns:r="http://schemas.openxmlformats.org/officeDocument/2006/relationships" xmlns:p="http://schemas.openxmlformats.org/presentationml/2006/main">
+  <p:cSld>
+    <p:spTree>
+      <p:nvGrpSpPr>
+        <p:cNvPr id="1" name=""/>
+        <p:cNvGrpSpPr/>
+        <p:nvPr/>
+      </p:nvGrpSpPr>
+      <p:grpSpPr>
+        <a:xfrm>
+          <a:off x="0" y="0"/>
+          <a:ext cx="0" cy="0"/>
+          <a:chOff x="0" y="0"/>
+          <a:chExt cx="0" cy="0"/>
+        </a:xfrm>
+      </p:grpSpPr>
+      <p:sp>
+        <p:nvSpPr>
+          <p:cNvPr id="4" name="Rectangle 3">
+            <a:extLst>
+              <a:ext uri="{FF2B5EF4-FFF2-40B4-BE49-F238E27FC236}">
+                <a16:creationId xmlns:a16="http://schemas.microsoft.com/office/drawing/2014/main" id="{838BD938-B4A0-41EE-B65C-9541C1A77E86}"/>
+              </a:ext>
+            </a:extLst>
+          </p:cNvPr>
+          <p:cNvSpPr/>
+          <p:nvPr/>
+        </p:nvSpPr>
+        <p:spPr>
+          <a:xfrm>
+            <a:off x="2716694" y="4956806"/>
+            <a:ext cx="6374295" cy="459359"/>
+          </a:xfrm>
+          <a:prstGeom prst="rect">
+            <a:avLst/>
+          </a:prstGeom>
+          <a:solidFill>
+            <a:schemeClr val="bg2">
+              <a:lumMod val="75000"/>
+            </a:schemeClr>
+          </a:solidFill>
+        </p:spPr>
+        <p:style>
+          <a:lnRef idx="2">
+            <a:schemeClr val="accent1">
+              <a:shade val="50000"/>
+            </a:schemeClr>
+          </a:lnRef>
+          <a:fillRef idx="1">
+            <a:schemeClr val="accent1"/>
+          </a:fillRef>
+          <a:effectRef idx="0">
+            <a:schemeClr val="accent1"/>
+          </a:effectRef>
+          <a:fontRef idx="minor">
+            <a:schemeClr val="lt1"/>
+          </a:fontRef>
+        </p:style>
+        <p:txBody>
+          <a:bodyPr rtlCol="0" anchor="ctr"/>
+          <a:lstStyle/>
+          <a:p>
+            <a:pPr algn="ctr"/>
+            <a:endParaRPr lang="en-US"/>
+          </a:p>
+        </p:txBody>
+      </p:sp>
+      <p:grpSp>
+        <p:nvGrpSpPr>
+          <p:cNvPr id="42" name="Group 41">
+            <a:extLst>
+              <a:ext uri="{FF2B5EF4-FFF2-40B4-BE49-F238E27FC236}">
+                <a16:creationId xmlns:a16="http://schemas.microsoft.com/office/drawing/2014/main" id="{5AF6E748-CA2E-43DB-8B79-DB61D8F68493}"/>
+              </a:ext>
+            </a:extLst>
+          </p:cNvPr>
+          <p:cNvGrpSpPr/>
+          <p:nvPr/>
+        </p:nvGrpSpPr>
+        <p:grpSpPr>
+          <a:xfrm>
+            <a:off x="3157232" y="1279148"/>
+            <a:ext cx="5371736" cy="3693596"/>
+            <a:chOff x="2242834" y="1279148"/>
+            <a:chExt cx="5371736" cy="3693596"/>
+          </a:xfrm>
+        </p:grpSpPr>
+        <p:grpSp>
+          <p:nvGrpSpPr>
+            <p:cNvPr id="41" name="Group 40">
+              <a:extLst>
+                <a:ext uri="{FF2B5EF4-FFF2-40B4-BE49-F238E27FC236}">
+                  <a16:creationId xmlns:a16="http://schemas.microsoft.com/office/drawing/2014/main" id="{56F4DE4C-C4D7-4C8B-8591-079CC0E68F9D}"/>
+                </a:ext>
+              </a:extLst>
+            </p:cNvPr>
+            <p:cNvGrpSpPr/>
+            <p:nvPr/>
+          </p:nvGrpSpPr>
+          <p:grpSpPr>
+            <a:xfrm>
+              <a:off x="2242834" y="4314312"/>
+              <a:ext cx="197212" cy="658432"/>
+              <a:chOff x="2242834" y="4314312"/>
+              <a:chExt cx="197212" cy="658432"/>
+            </a:xfrm>
+          </p:grpSpPr>
+          <p:sp>
+            <p:nvSpPr>
+              <p:cNvPr id="37" name="Rectangle 36">
+                <a:extLst>
+                  <a:ext uri="{FF2B5EF4-FFF2-40B4-BE49-F238E27FC236}">
+                    <a16:creationId xmlns:a16="http://schemas.microsoft.com/office/drawing/2014/main" id="{AAF87F40-DDDD-4E8B-83AE-C1C18EC15F57}"/>
+                  </a:ext>
+                </a:extLst>
+              </p:cNvPr>
+              <p:cNvSpPr/>
+              <p:nvPr/>
+            </p:nvSpPr>
+            <p:spPr>
+              <a:xfrm>
+                <a:off x="2242834" y="4314312"/>
+                <a:ext cx="197212" cy="406644"/>
+              </a:xfrm>
+              <a:prstGeom prst="rect">
+                <a:avLst/>
+              </a:prstGeom>
+              <a:solidFill>
+                <a:schemeClr val="accent4">
+                  <a:lumMod val="60000"/>
+                  <a:lumOff val="40000"/>
+                </a:schemeClr>
+              </a:solidFill>
+              <a:ln>
+                <a:noFill/>
+              </a:ln>
+            </p:spPr>
+            <p:style>
+              <a:lnRef idx="2">
+                <a:schemeClr val="accent1">
+                  <a:shade val="50000"/>
+                </a:schemeClr>
+              </a:lnRef>
+              <a:fillRef idx="1">
+                <a:schemeClr val="accent1"/>
+              </a:fillRef>
+              <a:effectRef idx="0">
+                <a:schemeClr val="accent1"/>
+              </a:effectRef>
+              <a:fontRef idx="minor">
+                <a:schemeClr val="lt1"/>
+              </a:fontRef>
+            </p:style>
+            <p:txBody>
+              <a:bodyPr rtlCol="0" anchor="ctr"/>
+              <a:lstStyle/>
+              <a:p>
+                <a:pPr algn="ctr"/>
+                <a:endParaRPr lang="en-US"/>
+              </a:p>
+            </p:txBody>
+          </p:sp>
+          <p:sp>
+            <p:nvSpPr>
+              <p:cNvPr id="35" name="Rectangle 34">
+                <a:extLst>
+                  <a:ext uri="{FF2B5EF4-FFF2-40B4-BE49-F238E27FC236}">
+                    <a16:creationId xmlns:a16="http://schemas.microsoft.com/office/drawing/2014/main" id="{05B929A0-6961-4442-944A-16C4FDF8CA57}"/>
+                  </a:ext>
+                </a:extLst>
+              </p:cNvPr>
+              <p:cNvSpPr/>
+              <p:nvPr/>
+            </p:nvSpPr>
+            <p:spPr>
+              <a:xfrm>
+                <a:off x="2277588" y="4566100"/>
+                <a:ext cx="101201" cy="406644"/>
+              </a:xfrm>
+              <a:prstGeom prst="rect">
+                <a:avLst/>
+              </a:prstGeom>
+              <a:solidFill>
+                <a:schemeClr val="tx1">
+                  <a:lumMod val="95000"/>
+                  <a:lumOff val="5000"/>
+                </a:schemeClr>
+              </a:solidFill>
+              <a:ln>
+                <a:noFill/>
+              </a:ln>
+            </p:spPr>
+            <p:style>
+              <a:lnRef idx="2">
+                <a:schemeClr val="accent1">
+                  <a:shade val="50000"/>
+                </a:schemeClr>
+              </a:lnRef>
+              <a:fillRef idx="1">
+                <a:schemeClr val="accent1"/>
+              </a:fillRef>
+              <a:effectRef idx="0">
+                <a:schemeClr val="accent1"/>
+              </a:effectRef>
+              <a:fontRef idx="minor">
+                <a:schemeClr val="lt1"/>
+              </a:fontRef>
+            </p:style>
+            <p:txBody>
+              <a:bodyPr rtlCol="0" anchor="ctr"/>
+              <a:lstStyle/>
+              <a:p>
+                <a:pPr algn="ctr"/>
+                <a:endParaRPr lang="en-US"/>
+              </a:p>
+            </p:txBody>
+          </p:sp>
+        </p:grpSp>
+        <p:grpSp>
+          <p:nvGrpSpPr>
+            <p:cNvPr id="40" name="Group 39">
+              <a:extLst>
+                <a:ext uri="{FF2B5EF4-FFF2-40B4-BE49-F238E27FC236}">
+                  <a16:creationId xmlns:a16="http://schemas.microsoft.com/office/drawing/2014/main" id="{40677D02-7420-415B-9BEB-D7CEE35461A5}"/>
+                </a:ext>
+              </a:extLst>
+            </p:cNvPr>
+            <p:cNvGrpSpPr/>
+            <p:nvPr/>
+          </p:nvGrpSpPr>
+          <p:grpSpPr>
+            <a:xfrm>
+              <a:off x="7417358" y="4279098"/>
+              <a:ext cx="197212" cy="671684"/>
+              <a:chOff x="7404106" y="4279098"/>
+              <a:chExt cx="197212" cy="671684"/>
+            </a:xfrm>
+          </p:grpSpPr>
+          <p:sp>
+            <p:nvSpPr>
+              <p:cNvPr id="38" name="Rectangle 37">
+                <a:extLst>
+                  <a:ext uri="{FF2B5EF4-FFF2-40B4-BE49-F238E27FC236}">
+                    <a16:creationId xmlns:a16="http://schemas.microsoft.com/office/drawing/2014/main" id="{91E5A4D5-EB89-4BAF-8EAB-778A40FF064F}"/>
+                  </a:ext>
+                </a:extLst>
+              </p:cNvPr>
+              <p:cNvSpPr/>
+              <p:nvPr/>
+            </p:nvSpPr>
+            <p:spPr>
+              <a:xfrm>
+                <a:off x="7404106" y="4279098"/>
+                <a:ext cx="197212" cy="406644"/>
+              </a:xfrm>
+              <a:prstGeom prst="rect">
+                <a:avLst/>
+              </a:prstGeom>
+              <a:solidFill>
+                <a:schemeClr val="accent4">
+                  <a:lumMod val="60000"/>
+                  <a:lumOff val="40000"/>
+                </a:schemeClr>
+              </a:solidFill>
+              <a:ln>
+                <a:noFill/>
+              </a:ln>
+            </p:spPr>
+            <p:style>
+              <a:lnRef idx="2">
+                <a:schemeClr val="accent1">
+                  <a:shade val="50000"/>
+                </a:schemeClr>
+              </a:lnRef>
+              <a:fillRef idx="1">
+                <a:schemeClr val="accent1"/>
+              </a:fillRef>
+              <a:effectRef idx="0">
+                <a:schemeClr val="accent1"/>
+              </a:effectRef>
+              <a:fontRef idx="minor">
+                <a:schemeClr val="lt1"/>
+              </a:fontRef>
+            </p:style>
+            <p:txBody>
+              <a:bodyPr rtlCol="0" anchor="ctr"/>
+              <a:lstStyle/>
+              <a:p>
+                <a:pPr algn="ctr"/>
+                <a:endParaRPr lang="en-US"/>
+              </a:p>
+            </p:txBody>
+          </p:sp>
+          <p:sp>
+            <p:nvSpPr>
+              <p:cNvPr id="39" name="Rectangle 38">
+                <a:extLst>
+                  <a:ext uri="{FF2B5EF4-FFF2-40B4-BE49-F238E27FC236}">
+                    <a16:creationId xmlns:a16="http://schemas.microsoft.com/office/drawing/2014/main" id="{78F4CE68-8CF1-4D7C-B45A-586E25AEC828}"/>
+                  </a:ext>
+                </a:extLst>
+              </p:cNvPr>
+              <p:cNvSpPr/>
+              <p:nvPr/>
+            </p:nvSpPr>
+            <p:spPr>
+              <a:xfrm>
+                <a:off x="7451296" y="4544138"/>
+                <a:ext cx="101201" cy="406644"/>
+              </a:xfrm>
+              <a:prstGeom prst="rect">
+                <a:avLst/>
+              </a:prstGeom>
+              <a:solidFill>
+                <a:schemeClr val="tx1">
+                  <a:lumMod val="95000"/>
+                  <a:lumOff val="5000"/>
+                </a:schemeClr>
+              </a:solidFill>
+              <a:ln>
+                <a:noFill/>
+              </a:ln>
+            </p:spPr>
+            <p:style>
+              <a:lnRef idx="2">
+                <a:schemeClr val="accent1">
+                  <a:shade val="50000"/>
+                </a:schemeClr>
+              </a:lnRef>
+              <a:fillRef idx="1">
+                <a:schemeClr val="accent1"/>
+              </a:fillRef>
+              <a:effectRef idx="0">
+                <a:schemeClr val="accent1"/>
+              </a:effectRef>
+              <a:fontRef idx="minor">
+                <a:schemeClr val="lt1"/>
+              </a:fontRef>
+            </p:style>
+            <p:txBody>
+              <a:bodyPr rtlCol="0" anchor="ctr"/>
+              <a:lstStyle/>
+              <a:p>
+                <a:pPr algn="ctr"/>
+                <a:endParaRPr lang="en-US"/>
+              </a:p>
+            </p:txBody>
+          </p:sp>
+        </p:grpSp>
+        <p:sp>
+          <p:nvSpPr>
+            <p:cNvPr id="7" name="Rectangle 6">
+              <a:extLst>
+                <a:ext uri="{FF2B5EF4-FFF2-40B4-BE49-F238E27FC236}">
+                  <a16:creationId xmlns:a16="http://schemas.microsoft.com/office/drawing/2014/main" id="{97A002F6-D67A-4F06-A72D-5760B7D8DA04}"/>
+                </a:ext>
+              </a:extLst>
+            </p:cNvPr>
+            <p:cNvSpPr/>
+            <p:nvPr/>
+          </p:nvSpPr>
+          <p:spPr>
+            <a:xfrm>
+              <a:off x="2294580" y="1285772"/>
+              <a:ext cx="88575" cy="3119538"/>
+            </a:xfrm>
+            <a:prstGeom prst="rect">
+              <a:avLst/>
+            </a:prstGeom>
+            <a:solidFill>
+              <a:schemeClr val="accent6">
+                <a:lumMod val="75000"/>
+              </a:schemeClr>
+            </a:solidFill>
+            <a:ln>
+              <a:noFill/>
+            </a:ln>
+          </p:spPr>
+          <p:style>
+            <a:lnRef idx="2">
+              <a:schemeClr val="accent1">
+                <a:shade val="50000"/>
+              </a:schemeClr>
+            </a:lnRef>
+            <a:fillRef idx="1">
+              <a:schemeClr val="accent1"/>
+            </a:fillRef>
+            <a:effectRef idx="0">
+              <a:schemeClr val="accent1"/>
+            </a:effectRef>
+            <a:fontRef idx="minor">
+              <a:schemeClr val="lt1"/>
+            </a:fontRef>
+          </p:style>
+          <p:txBody>
+            <a:bodyPr rtlCol="0" anchor="ctr"/>
+            <a:lstStyle/>
+            <a:p>
+              <a:pPr algn="ctr"/>
+              <a:endParaRPr lang="en-US"/>
+            </a:p>
+          </p:txBody>
+        </p:sp>
+        <p:sp>
+          <p:nvSpPr>
+            <p:cNvPr id="5" name="Rectangle 4">
+              <a:extLst>
+                <a:ext uri="{FF2B5EF4-FFF2-40B4-BE49-F238E27FC236}">
+                  <a16:creationId xmlns:a16="http://schemas.microsoft.com/office/drawing/2014/main" id="{688780F1-1052-47A5-B6A4-7E5259D65922}"/>
+                </a:ext>
+              </a:extLst>
+            </p:cNvPr>
+            <p:cNvSpPr/>
+            <p:nvPr/>
+          </p:nvSpPr>
+          <p:spPr>
+            <a:xfrm>
+              <a:off x="2325041" y="1285139"/>
+              <a:ext cx="5215500" cy="71273"/>
+            </a:xfrm>
+            <a:prstGeom prst="rect">
+              <a:avLst/>
+            </a:prstGeom>
+            <a:solidFill>
+              <a:schemeClr val="accent6">
+                <a:lumMod val="75000"/>
+              </a:schemeClr>
+            </a:solidFill>
+            <a:ln>
+              <a:noFill/>
+            </a:ln>
+          </p:spPr>
+          <p:style>
+            <a:lnRef idx="2">
+              <a:schemeClr val="accent1">
+                <a:shade val="50000"/>
+              </a:schemeClr>
+            </a:lnRef>
+            <a:fillRef idx="1">
+              <a:schemeClr val="accent1"/>
+            </a:fillRef>
+            <a:effectRef idx="0">
+              <a:schemeClr val="accent1"/>
+            </a:effectRef>
+            <a:fontRef idx="minor">
+              <a:schemeClr val="lt1"/>
+            </a:fontRef>
+          </p:style>
+          <p:txBody>
+            <a:bodyPr rtlCol="0" anchor="ctr"/>
+            <a:lstStyle/>
+            <a:p>
+              <a:pPr algn="ctr"/>
+              <a:endParaRPr lang="en-US"/>
+            </a:p>
+          </p:txBody>
+        </p:sp>
+        <p:sp>
+          <p:nvSpPr>
+            <p:cNvPr id="8" name="Rectangle 7">
+              <a:extLst>
+                <a:ext uri="{FF2B5EF4-FFF2-40B4-BE49-F238E27FC236}">
+                  <a16:creationId xmlns:a16="http://schemas.microsoft.com/office/drawing/2014/main" id="{FC23F926-3A50-46D3-A595-864A630E178E}"/>
+                </a:ext>
+              </a:extLst>
+            </p:cNvPr>
+            <p:cNvSpPr/>
+            <p:nvPr/>
+          </p:nvSpPr>
+          <p:spPr>
+            <a:xfrm>
+              <a:off x="7456305" y="1279148"/>
+              <a:ext cx="88575" cy="3119538"/>
+            </a:xfrm>
+            <a:prstGeom prst="rect">
+              <a:avLst/>
+            </a:prstGeom>
+            <a:solidFill>
+              <a:schemeClr val="accent6">
+                <a:lumMod val="75000"/>
+              </a:schemeClr>
+            </a:solidFill>
+            <a:ln>
+              <a:noFill/>
+            </a:ln>
+          </p:spPr>
+          <p:style>
+            <a:lnRef idx="2">
+              <a:schemeClr val="accent1">
+                <a:shade val="50000"/>
+              </a:schemeClr>
+            </a:lnRef>
+            <a:fillRef idx="1">
+              <a:schemeClr val="accent1"/>
+            </a:fillRef>
+            <a:effectRef idx="0">
+              <a:schemeClr val="accent1"/>
+            </a:effectRef>
+            <a:fontRef idx="minor">
+              <a:schemeClr val="lt1"/>
+            </a:fontRef>
+          </p:style>
+          <p:txBody>
+            <a:bodyPr rtlCol="0" anchor="ctr"/>
+            <a:lstStyle/>
+            <a:p>
+              <a:pPr algn="ctr"/>
+              <a:endParaRPr lang="en-US"/>
+            </a:p>
+          </p:txBody>
+        </p:sp>
+      </p:grpSp>
+      <p:sp>
+        <p:nvSpPr>
+          <p:cNvPr id="9" name="Rectangle 8">
+            <a:extLst>
+              <a:ext uri="{FF2B5EF4-FFF2-40B4-BE49-F238E27FC236}">
+                <a16:creationId xmlns:a16="http://schemas.microsoft.com/office/drawing/2014/main" id="{9C45EFD0-FD10-47B9-9C0E-43C2A3C2083E}"/>
+              </a:ext>
+            </a:extLst>
+          </p:cNvPr>
+          <p:cNvSpPr/>
+          <p:nvPr/>
+        </p:nvSpPr>
+        <p:spPr>
+          <a:xfrm>
+            <a:off x="5247859" y="1347196"/>
+            <a:ext cx="852329" cy="156779"/>
+          </a:xfrm>
+          <a:prstGeom prst="rect">
+            <a:avLst/>
+          </a:prstGeom>
+          <a:ln>
+            <a:solidFill>
+              <a:schemeClr val="tx1"/>
+            </a:solidFill>
+          </a:ln>
+        </p:spPr>
+        <p:style>
+          <a:lnRef idx="2">
+            <a:schemeClr val="accent1">
+              <a:shade val="50000"/>
+            </a:schemeClr>
+          </a:lnRef>
+          <a:fillRef idx="1">
+            <a:schemeClr val="accent1"/>
+          </a:fillRef>
+          <a:effectRef idx="0">
+            <a:schemeClr val="accent1"/>
+          </a:effectRef>
+          <a:fontRef idx="minor">
+            <a:schemeClr val="lt1"/>
+          </a:fontRef>
+        </p:style>
+        <p:txBody>
+          <a:bodyPr rtlCol="0" anchor="ctr"/>
+          <a:lstStyle/>
+          <a:p>
+            <a:pPr algn="ctr"/>
+            <a:endParaRPr lang="en-US"/>
+          </a:p>
+        </p:txBody>
+      </p:sp>
+      <p:grpSp>
+        <p:nvGrpSpPr>
+          <p:cNvPr id="13" name="Group 12">
+            <a:extLst>
+              <a:ext uri="{FF2B5EF4-FFF2-40B4-BE49-F238E27FC236}">
+                <a16:creationId xmlns:a16="http://schemas.microsoft.com/office/drawing/2014/main" id="{D286C91B-FB2D-43FD-BCCB-BF04AB8F5323}"/>
+              </a:ext>
+            </a:extLst>
+          </p:cNvPr>
+          <p:cNvGrpSpPr/>
+          <p:nvPr/>
+        </p:nvGrpSpPr>
+        <p:grpSpPr>
+          <a:xfrm>
+            <a:off x="5164991" y="1880996"/>
+            <a:ext cx="1031318" cy="254058"/>
+            <a:chOff x="4250593" y="2226364"/>
+            <a:chExt cx="1031318" cy="254058"/>
+          </a:xfrm>
+        </p:grpSpPr>
+        <p:sp>
+          <p:nvSpPr>
+            <p:cNvPr id="10" name="Rectangle 9">
+              <a:extLst>
+                <a:ext uri="{FF2B5EF4-FFF2-40B4-BE49-F238E27FC236}">
+                  <a16:creationId xmlns:a16="http://schemas.microsoft.com/office/drawing/2014/main" id="{EC2B24F8-EA91-45CC-B37C-DBA88FF9CEDC}"/>
+                </a:ext>
+              </a:extLst>
+            </p:cNvPr>
+            <p:cNvSpPr/>
+            <p:nvPr/>
+          </p:nvSpPr>
+          <p:spPr>
+            <a:xfrm>
+              <a:off x="4250593" y="2419977"/>
+              <a:ext cx="1031318" cy="60445"/>
+            </a:xfrm>
+            <a:prstGeom prst="rect">
+              <a:avLst/>
+            </a:prstGeom>
+            <a:solidFill>
+              <a:schemeClr val="accent2">
+                <a:lumMod val="75000"/>
+              </a:schemeClr>
+            </a:solidFill>
+            <a:ln>
+              <a:solidFill>
+                <a:schemeClr val="tx1">
+                  <a:lumMod val="95000"/>
+                  <a:lumOff val="5000"/>
+                </a:schemeClr>
+              </a:solidFill>
+            </a:ln>
+          </p:spPr>
+          <p:style>
+            <a:lnRef idx="2">
+              <a:schemeClr val="accent1">
+                <a:shade val="50000"/>
+              </a:schemeClr>
+            </a:lnRef>
+            <a:fillRef idx="1">
+              <a:schemeClr val="accent1"/>
+            </a:fillRef>
+            <a:effectRef idx="0">
+              <a:schemeClr val="accent1"/>
+            </a:effectRef>
+            <a:fontRef idx="minor">
+              <a:schemeClr val="lt1"/>
+            </a:fontRef>
+          </p:style>
+          <p:txBody>
+            <a:bodyPr rtlCol="0" anchor="ctr"/>
+            <a:lstStyle/>
+            <a:p>
+              <a:pPr algn="ctr"/>
+              <a:endParaRPr lang="en-US"/>
+            </a:p>
+          </p:txBody>
+        </p:sp>
+        <p:sp>
+          <p:nvSpPr>
+            <p:cNvPr id="11" name="Rectangle 10">
+              <a:extLst>
+                <a:ext uri="{FF2B5EF4-FFF2-40B4-BE49-F238E27FC236}">
+                  <a16:creationId xmlns:a16="http://schemas.microsoft.com/office/drawing/2014/main" id="{A87FEA2E-A3CA-46C3-9A49-154DA8409D17}"/>
+                </a:ext>
+              </a:extLst>
+            </p:cNvPr>
+            <p:cNvSpPr/>
+            <p:nvPr/>
+          </p:nvSpPr>
+          <p:spPr>
+            <a:xfrm>
+              <a:off x="4475176" y="2302187"/>
+              <a:ext cx="582153" cy="117790"/>
+            </a:xfrm>
+            <a:prstGeom prst="rect">
+              <a:avLst/>
+            </a:prstGeom>
+            <a:solidFill>
+              <a:schemeClr val="accent2">
+                <a:lumMod val="75000"/>
+              </a:schemeClr>
+            </a:solidFill>
+            <a:ln>
+              <a:solidFill>
+                <a:schemeClr val="tx1"/>
+              </a:solidFill>
+            </a:ln>
+          </p:spPr>
+          <p:style>
+            <a:lnRef idx="2">
+              <a:schemeClr val="accent1">
+                <a:shade val="50000"/>
+              </a:schemeClr>
+            </a:lnRef>
+            <a:fillRef idx="1">
+              <a:schemeClr val="accent1"/>
+            </a:fillRef>
+            <a:effectRef idx="0">
+              <a:schemeClr val="accent1"/>
+            </a:effectRef>
+            <a:fontRef idx="minor">
+              <a:schemeClr val="lt1"/>
+            </a:fontRef>
+          </p:style>
+          <p:txBody>
+            <a:bodyPr rtlCol="0" anchor="ctr"/>
+            <a:lstStyle/>
+            <a:p>
+              <a:pPr algn="ctr"/>
+              <a:endParaRPr lang="en-US"/>
+            </a:p>
+          </p:txBody>
+        </p:sp>
+        <p:sp>
+          <p:nvSpPr>
+            <p:cNvPr id="12" name="Oval 11">
+              <a:extLst>
+                <a:ext uri="{FF2B5EF4-FFF2-40B4-BE49-F238E27FC236}">
+                  <a16:creationId xmlns:a16="http://schemas.microsoft.com/office/drawing/2014/main" id="{0704E9FE-BCAA-4902-9377-AEA65EE5E210}"/>
+                </a:ext>
+              </a:extLst>
+            </p:cNvPr>
+            <p:cNvSpPr/>
+            <p:nvPr/>
+          </p:nvSpPr>
+          <p:spPr>
+            <a:xfrm>
+              <a:off x="4648503" y="2226364"/>
+              <a:ext cx="222243" cy="193613"/>
+            </a:xfrm>
+            <a:prstGeom prst="ellipse">
+              <a:avLst/>
+            </a:prstGeom>
+            <a:solidFill>
+              <a:schemeClr val="accent2">
+                <a:lumMod val="75000"/>
+              </a:schemeClr>
+            </a:solidFill>
+          </p:spPr>
+          <p:style>
+            <a:lnRef idx="2">
+              <a:schemeClr val="accent1">
+                <a:shade val="50000"/>
+              </a:schemeClr>
+            </a:lnRef>
+            <a:fillRef idx="1">
+              <a:schemeClr val="accent1"/>
+            </a:fillRef>
+            <a:effectRef idx="0">
+              <a:schemeClr val="accent1"/>
+            </a:effectRef>
+            <a:fontRef idx="minor">
+              <a:schemeClr val="lt1"/>
+            </a:fontRef>
+          </p:style>
+          <p:txBody>
+            <a:bodyPr rtlCol="0" anchor="ctr"/>
+            <a:lstStyle/>
+            <a:p>
+              <a:pPr algn="ctr"/>
+              <a:endParaRPr lang="en-US"/>
+            </a:p>
+          </p:txBody>
+        </p:sp>
+      </p:grpSp>
+      <p:cxnSp>
+        <p:nvCxnSpPr>
+          <p:cNvPr id="15" name="Straight Connector 14">
+            <a:extLst>
+              <a:ext uri="{FF2B5EF4-FFF2-40B4-BE49-F238E27FC236}">
+                <a16:creationId xmlns:a16="http://schemas.microsoft.com/office/drawing/2014/main" id="{A4B88B25-1654-4DA8-8C98-6395FDC86AD6}"/>
+              </a:ext>
+            </a:extLst>
+          </p:cNvPr>
+          <p:cNvCxnSpPr>
+            <a:stCxn id="12" idx="2"/>
+          </p:cNvCxnSpPr>
+          <p:nvPr/>
+        </p:nvCxnSpPr>
+        <p:spPr>
+          <a:xfrm flipV="1">
+            <a:off x="5562901" y="1503975"/>
+            <a:ext cx="0" cy="473828"/>
+          </a:xfrm>
+          <a:prstGeom prst="line">
+            <a:avLst/>
+          </a:prstGeom>
+          <a:ln>
+            <a:solidFill>
+              <a:schemeClr val="tx1"/>
+            </a:solidFill>
+          </a:ln>
+        </p:spPr>
+        <p:style>
+          <a:lnRef idx="1">
+            <a:schemeClr val="accent1"/>
+          </a:lnRef>
+          <a:fillRef idx="0">
+            <a:schemeClr val="accent1"/>
+          </a:fillRef>
+          <a:effectRef idx="0">
+            <a:schemeClr val="accent1"/>
+          </a:effectRef>
+          <a:fontRef idx="minor">
+            <a:schemeClr val="tx1"/>
+          </a:fontRef>
+        </p:style>
+      </p:cxnSp>
+      <p:cxnSp>
+        <p:nvCxnSpPr>
+          <p:cNvPr id="16" name="Straight Connector 15">
+            <a:extLst>
+              <a:ext uri="{FF2B5EF4-FFF2-40B4-BE49-F238E27FC236}">
+                <a16:creationId xmlns:a16="http://schemas.microsoft.com/office/drawing/2014/main" id="{30511FE9-6BD3-413D-AE5B-BB40DCF3279B}"/>
+              </a:ext>
+            </a:extLst>
+          </p:cNvPr>
+          <p:cNvCxnSpPr/>
+          <p:nvPr/>
+        </p:nvCxnSpPr>
+        <p:spPr>
+          <a:xfrm flipV="1">
+            <a:off x="5794813" y="1510603"/>
+            <a:ext cx="0" cy="473828"/>
+          </a:xfrm>
+          <a:prstGeom prst="line">
+            <a:avLst/>
+          </a:prstGeom>
+          <a:ln>
+            <a:solidFill>
+              <a:schemeClr val="tx1"/>
+            </a:solidFill>
+          </a:ln>
+        </p:spPr>
+        <p:style>
+          <a:lnRef idx="1">
+            <a:schemeClr val="accent1"/>
+          </a:lnRef>
+          <a:fillRef idx="0">
+            <a:schemeClr val="accent1"/>
+          </a:fillRef>
+          <a:effectRef idx="0">
+            <a:schemeClr val="accent1"/>
+          </a:effectRef>
+          <a:fontRef idx="minor">
+            <a:schemeClr val="tx1"/>
+          </a:fontRef>
+        </p:style>
+      </p:cxnSp>
+      <p:cxnSp>
+        <p:nvCxnSpPr>
+          <p:cNvPr id="17" name="Straight Connector 16">
+            <a:extLst>
+              <a:ext uri="{FF2B5EF4-FFF2-40B4-BE49-F238E27FC236}">
+                <a16:creationId xmlns:a16="http://schemas.microsoft.com/office/drawing/2014/main" id="{6AE881B2-12C4-44F2-BD7E-CD31C9F3901A}"/>
+              </a:ext>
+            </a:extLst>
+          </p:cNvPr>
+          <p:cNvCxnSpPr>
+            <a:cxnSpLocks/>
+            <a:stCxn id="12" idx="2"/>
+          </p:cNvCxnSpPr>
+          <p:nvPr/>
+        </p:nvCxnSpPr>
+        <p:spPr>
+          <a:xfrm flipH="1" flipV="1">
+            <a:off x="5277979" y="1347197"/>
+            <a:ext cx="284922" cy="630606"/>
+          </a:xfrm>
+          <a:prstGeom prst="line">
+            <a:avLst/>
+          </a:prstGeom>
+          <a:ln>
+            <a:solidFill>
+              <a:schemeClr val="tx1"/>
+            </a:solidFill>
+          </a:ln>
+        </p:spPr>
+        <p:style>
+          <a:lnRef idx="1">
+            <a:schemeClr val="accent1"/>
+          </a:lnRef>
+          <a:fillRef idx="0">
+            <a:schemeClr val="accent1"/>
+          </a:fillRef>
+          <a:effectRef idx="0">
+            <a:schemeClr val="accent1"/>
+          </a:effectRef>
+          <a:fontRef idx="minor">
+            <a:schemeClr val="tx1"/>
+          </a:fontRef>
+        </p:style>
+      </p:cxnSp>
+      <p:cxnSp>
+        <p:nvCxnSpPr>
+          <p:cNvPr id="19" name="Straight Connector 18">
+            <a:extLst>
+              <a:ext uri="{FF2B5EF4-FFF2-40B4-BE49-F238E27FC236}">
+                <a16:creationId xmlns:a16="http://schemas.microsoft.com/office/drawing/2014/main" id="{5B993EC5-8168-4A44-A665-05796D705240}"/>
+              </a:ext>
+            </a:extLst>
+          </p:cNvPr>
+          <p:cNvCxnSpPr>
+            <a:cxnSpLocks/>
+            <a:stCxn id="12" idx="6"/>
+          </p:cNvCxnSpPr>
+          <p:nvPr/>
+        </p:nvCxnSpPr>
+        <p:spPr>
+          <a:xfrm flipV="1">
+            <a:off x="5785144" y="1370897"/>
+            <a:ext cx="297158" cy="606906"/>
+          </a:xfrm>
+          <a:prstGeom prst="line">
+            <a:avLst/>
+          </a:prstGeom>
+          <a:ln>
+            <a:solidFill>
+              <a:schemeClr val="tx1"/>
+            </a:solidFill>
+          </a:ln>
+        </p:spPr>
+        <p:style>
+          <a:lnRef idx="1">
+            <a:schemeClr val="accent1"/>
+          </a:lnRef>
+          <a:fillRef idx="0">
+            <a:schemeClr val="accent1"/>
+          </a:fillRef>
+          <a:effectRef idx="0">
+            <a:schemeClr val="accent1"/>
+          </a:effectRef>
+          <a:fontRef idx="minor">
+            <a:schemeClr val="tx1"/>
+          </a:fontRef>
+        </p:style>
+      </p:cxnSp>
+      <p:sp>
+        <p:nvSpPr>
+          <p:cNvPr id="22" name="Rectangle 21">
+            <a:extLst>
+              <a:ext uri="{FF2B5EF4-FFF2-40B4-BE49-F238E27FC236}">
+                <a16:creationId xmlns:a16="http://schemas.microsoft.com/office/drawing/2014/main" id="{B0A840CF-3FBF-457F-BF9E-0E23922824C1}"/>
+              </a:ext>
+            </a:extLst>
+          </p:cNvPr>
+          <p:cNvSpPr/>
+          <p:nvPr/>
+        </p:nvSpPr>
+        <p:spPr>
+          <a:xfrm>
+            <a:off x="4073173" y="3673989"/>
+            <a:ext cx="640368" cy="792433"/>
+          </a:xfrm>
+          <a:prstGeom prst="rect">
+            <a:avLst/>
+          </a:prstGeom>
+          <a:solidFill>
+            <a:schemeClr val="tx2">
+              <a:lumMod val="60000"/>
+              <a:lumOff val="40000"/>
+            </a:schemeClr>
+          </a:solidFill>
+          <a:ln>
+            <a:solidFill>
+              <a:schemeClr val="tx1"/>
+            </a:solidFill>
+          </a:ln>
+        </p:spPr>
+        <p:style>
+          <a:lnRef idx="2">
+            <a:schemeClr val="accent1">
+              <a:shade val="50000"/>
+            </a:schemeClr>
+          </a:lnRef>
+          <a:fillRef idx="1">
+            <a:schemeClr val="accent1"/>
+          </a:fillRef>
+          <a:effectRef idx="0">
+            <a:schemeClr val="accent1"/>
+          </a:effectRef>
+          <a:fontRef idx="minor">
+            <a:schemeClr val="lt1"/>
+          </a:fontRef>
+        </p:style>
+        <p:txBody>
+          <a:bodyPr rtlCol="0" anchor="ctr"/>
+          <a:lstStyle/>
+          <a:p>
+            <a:pPr algn="ctr"/>
+            <a:endParaRPr lang="en-US"/>
+          </a:p>
+        </p:txBody>
+      </p:sp>
+      <p:sp>
+        <p:nvSpPr>
+          <p:cNvPr id="23" name="Rectangle 22">
+            <a:extLst>
+              <a:ext uri="{FF2B5EF4-FFF2-40B4-BE49-F238E27FC236}">
+                <a16:creationId xmlns:a16="http://schemas.microsoft.com/office/drawing/2014/main" id="{A9DB7709-9CEA-45C9-BA02-978008434F1E}"/>
+              </a:ext>
+            </a:extLst>
+          </p:cNvPr>
+          <p:cNvSpPr/>
+          <p:nvPr/>
+        </p:nvSpPr>
+        <p:spPr>
+          <a:xfrm>
+            <a:off x="3924575" y="4465141"/>
+            <a:ext cx="937564" cy="172457"/>
+          </a:xfrm>
+          <a:prstGeom prst="rect">
+            <a:avLst/>
+          </a:prstGeom>
+          <a:solidFill>
+            <a:schemeClr val="bg1">
+              <a:lumMod val="50000"/>
+            </a:schemeClr>
+          </a:solidFill>
+          <a:ln>
+            <a:solidFill>
+              <a:schemeClr val="tx1"/>
+            </a:solidFill>
+          </a:ln>
+        </p:spPr>
+        <p:style>
+          <a:lnRef idx="2">
+            <a:schemeClr val="accent1">
+              <a:shade val="50000"/>
+            </a:schemeClr>
+          </a:lnRef>
+          <a:fillRef idx="1">
+            <a:schemeClr val="accent1"/>
+          </a:fillRef>
+          <a:effectRef idx="0">
+            <a:schemeClr val="accent1"/>
+          </a:effectRef>
+          <a:fontRef idx="minor">
+            <a:schemeClr val="lt1"/>
+          </a:fontRef>
+        </p:style>
+        <p:txBody>
+          <a:bodyPr rtlCol="0" anchor="ctr"/>
+          <a:lstStyle/>
+          <a:p>
+            <a:pPr algn="ctr"/>
+            <a:endParaRPr lang="en-US"/>
+          </a:p>
+        </p:txBody>
+      </p:sp>
+      <p:sp>
+        <p:nvSpPr>
+          <p:cNvPr id="24" name="Rectangle 23">
+            <a:extLst>
+              <a:ext uri="{FF2B5EF4-FFF2-40B4-BE49-F238E27FC236}">
+                <a16:creationId xmlns:a16="http://schemas.microsoft.com/office/drawing/2014/main" id="{DC481590-AA46-4C6A-A6E5-7C99564F2A17}"/>
+              </a:ext>
+            </a:extLst>
+          </p:cNvPr>
+          <p:cNvSpPr/>
+          <p:nvPr/>
+        </p:nvSpPr>
+        <p:spPr>
+          <a:xfrm>
+            <a:off x="3919196" y="4646318"/>
+            <a:ext cx="126694" cy="305517"/>
+          </a:xfrm>
+          <a:prstGeom prst="rect">
+            <a:avLst/>
+          </a:prstGeom>
+          <a:solidFill>
+            <a:schemeClr val="tx1">
+              <a:lumMod val="95000"/>
+              <a:lumOff val="5000"/>
+            </a:schemeClr>
+          </a:solidFill>
+          <a:ln>
+            <a:noFill/>
+          </a:ln>
+        </p:spPr>
+        <p:style>
+          <a:lnRef idx="2">
+            <a:schemeClr val="accent1">
+              <a:shade val="50000"/>
+            </a:schemeClr>
+          </a:lnRef>
+          <a:fillRef idx="1">
+            <a:schemeClr val="accent1"/>
+          </a:fillRef>
+          <a:effectRef idx="0">
+            <a:schemeClr val="accent1"/>
+          </a:effectRef>
+          <a:fontRef idx="minor">
+            <a:schemeClr val="lt1"/>
+          </a:fontRef>
+        </p:style>
+        <p:txBody>
+          <a:bodyPr rtlCol="0" anchor="ctr"/>
+          <a:lstStyle/>
+          <a:p>
+            <a:pPr algn="ctr"/>
+            <a:endParaRPr lang="en-US"/>
+          </a:p>
+        </p:txBody>
+      </p:sp>
+      <p:sp>
+        <p:nvSpPr>
+          <p:cNvPr id="26" name="Rectangle 25">
+            <a:extLst>
+              <a:ext uri="{FF2B5EF4-FFF2-40B4-BE49-F238E27FC236}">
+                <a16:creationId xmlns:a16="http://schemas.microsoft.com/office/drawing/2014/main" id="{6DF12ABF-1C6C-4706-902B-A47183C6519A}"/>
+              </a:ext>
+            </a:extLst>
+          </p:cNvPr>
+          <p:cNvSpPr/>
+          <p:nvPr/>
+        </p:nvSpPr>
+        <p:spPr>
+          <a:xfrm>
+            <a:off x="4762710" y="4652538"/>
+            <a:ext cx="126694" cy="305517"/>
+          </a:xfrm>
+          <a:prstGeom prst="rect">
+            <a:avLst/>
+          </a:prstGeom>
+          <a:solidFill>
+            <a:schemeClr val="tx1">
+              <a:lumMod val="95000"/>
+              <a:lumOff val="5000"/>
+            </a:schemeClr>
+          </a:solidFill>
+          <a:ln>
+            <a:noFill/>
+          </a:ln>
+        </p:spPr>
+        <p:style>
+          <a:lnRef idx="2">
+            <a:schemeClr val="accent1">
+              <a:shade val="50000"/>
+            </a:schemeClr>
+          </a:lnRef>
+          <a:fillRef idx="1">
+            <a:schemeClr val="accent1"/>
+          </a:fillRef>
+          <a:effectRef idx="0">
+            <a:schemeClr val="accent1"/>
+          </a:effectRef>
+          <a:fontRef idx="minor">
+            <a:schemeClr val="lt1"/>
+          </a:fontRef>
+        </p:style>
+        <p:txBody>
+          <a:bodyPr rtlCol="0" anchor="ctr"/>
+          <a:lstStyle/>
+          <a:p>
+            <a:pPr algn="ctr"/>
+            <a:endParaRPr lang="en-US"/>
+          </a:p>
+        </p:txBody>
+      </p:sp>
+      <p:sp>
+        <p:nvSpPr>
+          <p:cNvPr id="27" name="Rectangle 26">
+            <a:extLst>
+              <a:ext uri="{FF2B5EF4-FFF2-40B4-BE49-F238E27FC236}">
+                <a16:creationId xmlns:a16="http://schemas.microsoft.com/office/drawing/2014/main" id="{55971AF5-CA3D-4EB4-9937-7AC238DBB59F}"/>
+              </a:ext>
+            </a:extLst>
+          </p:cNvPr>
+          <p:cNvSpPr/>
+          <p:nvPr/>
+        </p:nvSpPr>
+        <p:spPr>
+          <a:xfrm>
+            <a:off x="5458025" y="3681433"/>
+            <a:ext cx="640368" cy="792433"/>
+          </a:xfrm>
+          <a:prstGeom prst="rect">
+            <a:avLst/>
+          </a:prstGeom>
+          <a:solidFill>
+            <a:schemeClr val="tx2">
+              <a:lumMod val="60000"/>
+              <a:lumOff val="40000"/>
+            </a:schemeClr>
+          </a:solidFill>
+          <a:ln>
+            <a:solidFill>
+              <a:schemeClr val="tx1"/>
+            </a:solidFill>
+          </a:ln>
+        </p:spPr>
+        <p:style>
+          <a:lnRef idx="2">
+            <a:schemeClr val="accent1">
+              <a:shade val="50000"/>
+            </a:schemeClr>
+          </a:lnRef>
+          <a:fillRef idx="1">
+            <a:schemeClr val="accent1"/>
+          </a:fillRef>
+          <a:effectRef idx="0">
+            <a:schemeClr val="accent1"/>
+          </a:effectRef>
+          <a:fontRef idx="minor">
+            <a:schemeClr val="lt1"/>
+          </a:fontRef>
+        </p:style>
+        <p:txBody>
+          <a:bodyPr rtlCol="0" anchor="ctr"/>
+          <a:lstStyle/>
+          <a:p>
+            <a:pPr algn="ctr"/>
+            <a:endParaRPr lang="en-US"/>
+          </a:p>
+        </p:txBody>
+      </p:sp>
+      <p:sp>
+        <p:nvSpPr>
+          <p:cNvPr id="28" name="Rectangle 27">
+            <a:extLst>
+              <a:ext uri="{FF2B5EF4-FFF2-40B4-BE49-F238E27FC236}">
+                <a16:creationId xmlns:a16="http://schemas.microsoft.com/office/drawing/2014/main" id="{AC649FF6-64E8-42B2-887D-07BCB86A49F5}"/>
+              </a:ext>
+            </a:extLst>
+          </p:cNvPr>
+          <p:cNvSpPr/>
+          <p:nvPr/>
+        </p:nvSpPr>
+        <p:spPr>
+          <a:xfrm>
+            <a:off x="5309427" y="4471769"/>
+            <a:ext cx="937564" cy="172457"/>
+          </a:xfrm>
+          <a:prstGeom prst="rect">
+            <a:avLst/>
+          </a:prstGeom>
+          <a:solidFill>
+            <a:schemeClr val="bg1">
+              <a:lumMod val="50000"/>
+            </a:schemeClr>
+          </a:solidFill>
+          <a:ln>
+            <a:solidFill>
+              <a:schemeClr val="tx1"/>
+            </a:solidFill>
+          </a:ln>
+        </p:spPr>
+        <p:style>
+          <a:lnRef idx="2">
+            <a:schemeClr val="accent1">
+              <a:shade val="50000"/>
+            </a:schemeClr>
+          </a:lnRef>
+          <a:fillRef idx="1">
+            <a:schemeClr val="accent1"/>
+          </a:fillRef>
+          <a:effectRef idx="0">
+            <a:schemeClr val="accent1"/>
+          </a:effectRef>
+          <a:fontRef idx="minor">
+            <a:schemeClr val="lt1"/>
+          </a:fontRef>
+        </p:style>
+        <p:txBody>
+          <a:bodyPr rtlCol="0" anchor="ctr"/>
+          <a:lstStyle/>
+          <a:p>
+            <a:pPr algn="ctr"/>
+            <a:endParaRPr lang="en-US"/>
+          </a:p>
+        </p:txBody>
+      </p:sp>
+      <p:sp>
+        <p:nvSpPr>
+          <p:cNvPr id="29" name="Rectangle 28">
+            <a:extLst>
+              <a:ext uri="{FF2B5EF4-FFF2-40B4-BE49-F238E27FC236}">
+                <a16:creationId xmlns:a16="http://schemas.microsoft.com/office/drawing/2014/main" id="{AA7F43C8-07AC-42CF-B8B6-6C1CBC798248}"/>
+              </a:ext>
+            </a:extLst>
+          </p:cNvPr>
+          <p:cNvSpPr/>
+          <p:nvPr/>
+        </p:nvSpPr>
+        <p:spPr>
+          <a:xfrm>
+            <a:off x="5303232" y="4652946"/>
+            <a:ext cx="126694" cy="305517"/>
+          </a:xfrm>
+          <a:prstGeom prst="rect">
+            <a:avLst/>
+          </a:prstGeom>
+          <a:solidFill>
+            <a:schemeClr val="tx1">
+              <a:lumMod val="95000"/>
+              <a:lumOff val="5000"/>
+            </a:schemeClr>
+          </a:solidFill>
+          <a:ln>
+            <a:noFill/>
+          </a:ln>
+        </p:spPr>
+        <p:style>
+          <a:lnRef idx="2">
+            <a:schemeClr val="accent1">
+              <a:shade val="50000"/>
+            </a:schemeClr>
+          </a:lnRef>
+          <a:fillRef idx="1">
+            <a:schemeClr val="accent1"/>
+          </a:fillRef>
+          <a:effectRef idx="0">
+            <a:schemeClr val="accent1"/>
+          </a:effectRef>
+          <a:fontRef idx="minor">
+            <a:schemeClr val="lt1"/>
+          </a:fontRef>
+        </p:style>
+        <p:txBody>
+          <a:bodyPr rtlCol="0" anchor="ctr"/>
+          <a:lstStyle/>
+          <a:p>
+            <a:pPr algn="ctr"/>
+            <a:endParaRPr lang="en-US"/>
+          </a:p>
+        </p:txBody>
+      </p:sp>
+      <p:sp>
+        <p:nvSpPr>
+          <p:cNvPr id="30" name="Rectangle 29">
+            <a:extLst>
+              <a:ext uri="{FF2B5EF4-FFF2-40B4-BE49-F238E27FC236}">
+                <a16:creationId xmlns:a16="http://schemas.microsoft.com/office/drawing/2014/main" id="{A0538230-474D-44D8-919D-314DE6B36A88}"/>
+              </a:ext>
+            </a:extLst>
+          </p:cNvPr>
+          <p:cNvSpPr/>
+          <p:nvPr/>
+        </p:nvSpPr>
+        <p:spPr>
+          <a:xfrm>
+            <a:off x="6147562" y="4645914"/>
+            <a:ext cx="126694" cy="305517"/>
+          </a:xfrm>
+          <a:prstGeom prst="rect">
+            <a:avLst/>
+          </a:prstGeom>
+          <a:solidFill>
+            <a:schemeClr val="tx1">
+              <a:lumMod val="95000"/>
+              <a:lumOff val="5000"/>
+            </a:schemeClr>
+          </a:solidFill>
+          <a:ln>
+            <a:noFill/>
+          </a:ln>
+        </p:spPr>
+        <p:style>
+          <a:lnRef idx="2">
+            <a:schemeClr val="accent1">
+              <a:shade val="50000"/>
+            </a:schemeClr>
+          </a:lnRef>
+          <a:fillRef idx="1">
+            <a:schemeClr val="accent1"/>
+          </a:fillRef>
+          <a:effectRef idx="0">
+            <a:schemeClr val="accent1"/>
+          </a:effectRef>
+          <a:fontRef idx="minor">
+            <a:schemeClr val="lt1"/>
+          </a:fontRef>
+        </p:style>
+        <p:txBody>
+          <a:bodyPr rtlCol="0" anchor="ctr"/>
+          <a:lstStyle/>
+          <a:p>
+            <a:pPr algn="ctr"/>
+            <a:endParaRPr lang="en-US"/>
+          </a:p>
+        </p:txBody>
+      </p:sp>
+      <p:sp>
+        <p:nvSpPr>
+          <p:cNvPr id="31" name="Rectangle 30">
+            <a:extLst>
+              <a:ext uri="{FF2B5EF4-FFF2-40B4-BE49-F238E27FC236}">
+                <a16:creationId xmlns:a16="http://schemas.microsoft.com/office/drawing/2014/main" id="{A3A4A81B-F73D-46BA-874E-DC515B98AE4A}"/>
+              </a:ext>
+            </a:extLst>
+          </p:cNvPr>
+          <p:cNvSpPr/>
+          <p:nvPr/>
+        </p:nvSpPr>
+        <p:spPr>
+          <a:xfrm>
+            <a:off x="6876008" y="3681433"/>
+            <a:ext cx="640368" cy="792433"/>
+          </a:xfrm>
+          <a:prstGeom prst="rect">
+            <a:avLst/>
+          </a:prstGeom>
+          <a:solidFill>
+            <a:schemeClr val="tx2">
+              <a:lumMod val="60000"/>
+              <a:lumOff val="40000"/>
+            </a:schemeClr>
+          </a:solidFill>
+          <a:ln>
+            <a:solidFill>
+              <a:schemeClr val="tx1"/>
+            </a:solidFill>
+          </a:ln>
+        </p:spPr>
+        <p:style>
+          <a:lnRef idx="2">
+            <a:schemeClr val="accent1">
+              <a:shade val="50000"/>
+            </a:schemeClr>
+          </a:lnRef>
+          <a:fillRef idx="1">
+            <a:schemeClr val="accent1"/>
+          </a:fillRef>
+          <a:effectRef idx="0">
+            <a:schemeClr val="accent1"/>
+          </a:effectRef>
+          <a:fontRef idx="minor">
+            <a:schemeClr val="lt1"/>
+          </a:fontRef>
+        </p:style>
+        <p:txBody>
+          <a:bodyPr rtlCol="0" anchor="ctr"/>
+          <a:lstStyle/>
+          <a:p>
+            <a:pPr algn="ctr"/>
+            <a:endParaRPr lang="en-US"/>
+          </a:p>
+        </p:txBody>
+      </p:sp>
+      <p:sp>
+        <p:nvSpPr>
+          <p:cNvPr id="32" name="Rectangle 31">
+            <a:extLst>
+              <a:ext uri="{FF2B5EF4-FFF2-40B4-BE49-F238E27FC236}">
+                <a16:creationId xmlns:a16="http://schemas.microsoft.com/office/drawing/2014/main" id="{F5B58EC6-281F-4A95-BDD5-50C9DB682ADB}"/>
+              </a:ext>
+            </a:extLst>
+          </p:cNvPr>
+          <p:cNvSpPr/>
+          <p:nvPr/>
+        </p:nvSpPr>
+        <p:spPr>
+          <a:xfrm>
+            <a:off x="6727410" y="4471769"/>
+            <a:ext cx="937564" cy="172457"/>
+          </a:xfrm>
+          <a:prstGeom prst="rect">
+            <a:avLst/>
+          </a:prstGeom>
+          <a:solidFill>
+            <a:schemeClr val="bg1">
+              <a:lumMod val="50000"/>
+            </a:schemeClr>
+          </a:solidFill>
+          <a:ln>
+            <a:solidFill>
+              <a:schemeClr val="tx1"/>
+            </a:solidFill>
+          </a:ln>
+        </p:spPr>
+        <p:style>
+          <a:lnRef idx="2">
+            <a:schemeClr val="accent1">
+              <a:shade val="50000"/>
+            </a:schemeClr>
+          </a:lnRef>
+          <a:fillRef idx="1">
+            <a:schemeClr val="accent1"/>
+          </a:fillRef>
+          <a:effectRef idx="0">
+            <a:schemeClr val="accent1"/>
+          </a:effectRef>
+          <a:fontRef idx="minor">
+            <a:schemeClr val="lt1"/>
+          </a:fontRef>
+        </p:style>
+        <p:txBody>
+          <a:bodyPr rtlCol="0" anchor="ctr"/>
+          <a:lstStyle/>
+          <a:p>
+            <a:pPr algn="ctr"/>
+            <a:endParaRPr lang="en-US"/>
+          </a:p>
+        </p:txBody>
+      </p:sp>
+      <p:sp>
+        <p:nvSpPr>
+          <p:cNvPr id="33" name="Rectangle 32">
+            <a:extLst>
+              <a:ext uri="{FF2B5EF4-FFF2-40B4-BE49-F238E27FC236}">
+                <a16:creationId xmlns:a16="http://schemas.microsoft.com/office/drawing/2014/main" id="{75AE295A-D263-4613-9A12-A6B5790A4CBB}"/>
+              </a:ext>
+            </a:extLst>
+          </p:cNvPr>
+          <p:cNvSpPr/>
+          <p:nvPr/>
+        </p:nvSpPr>
+        <p:spPr>
+          <a:xfrm>
+            <a:off x="6721215" y="4652946"/>
+            <a:ext cx="126694" cy="305517"/>
+          </a:xfrm>
+          <a:prstGeom prst="rect">
+            <a:avLst/>
+          </a:prstGeom>
+          <a:solidFill>
+            <a:schemeClr val="tx1">
+              <a:lumMod val="95000"/>
+              <a:lumOff val="5000"/>
+            </a:schemeClr>
+          </a:solidFill>
+          <a:ln>
+            <a:noFill/>
+          </a:ln>
+        </p:spPr>
+        <p:style>
+          <a:lnRef idx="2">
+            <a:schemeClr val="accent1">
+              <a:shade val="50000"/>
+            </a:schemeClr>
+          </a:lnRef>
+          <a:fillRef idx="1">
+            <a:schemeClr val="accent1"/>
+          </a:fillRef>
+          <a:effectRef idx="0">
+            <a:schemeClr val="accent1"/>
+          </a:effectRef>
+          <a:fontRef idx="minor">
+            <a:schemeClr val="lt1"/>
+          </a:fontRef>
+        </p:style>
+        <p:txBody>
+          <a:bodyPr rtlCol="0" anchor="ctr"/>
+          <a:lstStyle/>
+          <a:p>
+            <a:pPr algn="ctr"/>
+            <a:endParaRPr lang="en-US"/>
+          </a:p>
+        </p:txBody>
+      </p:sp>
+      <p:sp>
+        <p:nvSpPr>
+          <p:cNvPr id="34" name="Rectangle 33">
+            <a:extLst>
+              <a:ext uri="{FF2B5EF4-FFF2-40B4-BE49-F238E27FC236}">
+                <a16:creationId xmlns:a16="http://schemas.microsoft.com/office/drawing/2014/main" id="{53976A3A-6FD6-4E47-813B-E2B05AB4049C}"/>
+              </a:ext>
+            </a:extLst>
+          </p:cNvPr>
+          <p:cNvSpPr/>
+          <p:nvPr/>
+        </p:nvSpPr>
+        <p:spPr>
+          <a:xfrm>
+            <a:off x="7565545" y="4645914"/>
+            <a:ext cx="126694" cy="305517"/>
+          </a:xfrm>
+          <a:prstGeom prst="rect">
+            <a:avLst/>
+          </a:prstGeom>
+          <a:solidFill>
+            <a:schemeClr val="tx1">
+              <a:lumMod val="95000"/>
+              <a:lumOff val="5000"/>
+            </a:schemeClr>
+          </a:solidFill>
+          <a:ln>
+            <a:noFill/>
+          </a:ln>
+        </p:spPr>
+        <p:style>
+          <a:lnRef idx="2">
+            <a:schemeClr val="accent1">
+              <a:shade val="50000"/>
+            </a:schemeClr>
+          </a:lnRef>
+          <a:fillRef idx="1">
+            <a:schemeClr val="accent1"/>
+          </a:fillRef>
+          <a:effectRef idx="0">
+            <a:schemeClr val="accent1"/>
+          </a:effectRef>
+          <a:fontRef idx="minor">
+            <a:schemeClr val="lt1"/>
+          </a:fontRef>
+        </p:style>
+        <p:txBody>
+          <a:bodyPr rtlCol="0" anchor="ctr"/>
+          <a:lstStyle/>
+          <a:p>
+            <a:pPr algn="ctr"/>
+            <a:endParaRPr lang="en-US"/>
+          </a:p>
+        </p:txBody>
+      </p:sp>
+      <p:grpSp>
+        <p:nvGrpSpPr>
+          <p:cNvPr id="59" name="Group 58">
+            <a:extLst>
+              <a:ext uri="{FF2B5EF4-FFF2-40B4-BE49-F238E27FC236}">
+                <a16:creationId xmlns:a16="http://schemas.microsoft.com/office/drawing/2014/main" id="{2BF60183-1D66-49FE-ADC6-27300A9A6CEE}"/>
+              </a:ext>
+            </a:extLst>
+          </p:cNvPr>
+          <p:cNvGrpSpPr/>
+          <p:nvPr/>
+        </p:nvGrpSpPr>
+        <p:grpSpPr>
+          <a:xfrm>
+            <a:off x="7710223" y="375598"/>
+            <a:ext cx="835551" cy="936172"/>
+            <a:chOff x="6953376" y="122512"/>
+            <a:chExt cx="835551" cy="936172"/>
+          </a:xfrm>
+        </p:grpSpPr>
+        <p:grpSp>
+          <p:nvGrpSpPr>
+            <p:cNvPr id="52" name="Group 51">
+              <a:extLst>
+                <a:ext uri="{FF2B5EF4-FFF2-40B4-BE49-F238E27FC236}">
+                  <a16:creationId xmlns:a16="http://schemas.microsoft.com/office/drawing/2014/main" id="{EBE20FD2-D4EC-43A2-ABC4-F0F108872930}"/>
+                </a:ext>
+              </a:extLst>
+            </p:cNvPr>
+            <p:cNvGrpSpPr/>
+            <p:nvPr/>
+          </p:nvGrpSpPr>
+          <p:grpSpPr>
+            <a:xfrm>
+              <a:off x="7074131" y="446069"/>
+              <a:ext cx="590843" cy="612615"/>
+              <a:chOff x="8862646" y="323557"/>
+              <a:chExt cx="590843" cy="612615"/>
+            </a:xfrm>
+          </p:grpSpPr>
+          <p:cxnSp>
+            <p:nvCxnSpPr>
+              <p:cNvPr id="46" name="Straight Arrow Connector 45">
+                <a:extLst>
+                  <a:ext uri="{FF2B5EF4-FFF2-40B4-BE49-F238E27FC236}">
+                    <a16:creationId xmlns:a16="http://schemas.microsoft.com/office/drawing/2014/main" id="{16E3FA78-8D8F-4AA9-A87F-D86EA1F77853}"/>
+                  </a:ext>
+                </a:extLst>
+              </p:cNvPr>
+              <p:cNvCxnSpPr>
+                <a:cxnSpLocks/>
+              </p:cNvCxnSpPr>
+              <p:nvPr/>
+            </p:nvCxnSpPr>
+            <p:spPr>
+              <a:xfrm flipH="1">
+                <a:off x="8862646" y="928468"/>
+                <a:ext cx="590843" cy="0"/>
+              </a:xfrm>
+              <a:prstGeom prst="straightConnector1">
+                <a:avLst/>
+              </a:prstGeom>
+              <a:ln w="41275">
+                <a:solidFill>
+                  <a:schemeClr val="tx1"/>
+                </a:solidFill>
+                <a:tailEnd type="triangle"/>
+              </a:ln>
+            </p:spPr>
+            <p:style>
+              <a:lnRef idx="1">
+                <a:schemeClr val="accent1"/>
+              </a:lnRef>
+              <a:fillRef idx="0">
+                <a:schemeClr val="accent1"/>
+              </a:fillRef>
+              <a:effectRef idx="0">
+                <a:schemeClr val="accent1"/>
+              </a:effectRef>
+              <a:fontRef idx="minor">
+                <a:schemeClr val="tx1"/>
+              </a:fontRef>
+            </p:style>
+          </p:cxnSp>
+          <p:cxnSp>
+            <p:nvCxnSpPr>
+              <p:cNvPr id="48" name="Straight Arrow Connector 47">
+                <a:extLst>
+                  <a:ext uri="{FF2B5EF4-FFF2-40B4-BE49-F238E27FC236}">
+                    <a16:creationId xmlns:a16="http://schemas.microsoft.com/office/drawing/2014/main" id="{EEF18321-0ACD-4998-8706-9667C189A059}"/>
+                  </a:ext>
+                </a:extLst>
+              </p:cNvPr>
+              <p:cNvCxnSpPr>
+                <a:cxnSpLocks/>
+              </p:cNvCxnSpPr>
+              <p:nvPr/>
+            </p:nvCxnSpPr>
+            <p:spPr>
+              <a:xfrm flipH="1" flipV="1">
+                <a:off x="9439423" y="323557"/>
+                <a:ext cx="1" cy="612615"/>
+              </a:xfrm>
+              <a:prstGeom prst="straightConnector1">
+                <a:avLst/>
+              </a:prstGeom>
+              <a:ln w="41275">
+                <a:solidFill>
+                  <a:schemeClr val="tx1"/>
+                </a:solidFill>
+                <a:tailEnd type="triangle"/>
+              </a:ln>
+            </p:spPr>
+            <p:style>
+              <a:lnRef idx="1">
+                <a:schemeClr val="accent1"/>
+              </a:lnRef>
+              <a:fillRef idx="0">
+                <a:schemeClr val="accent1"/>
+              </a:fillRef>
+              <a:effectRef idx="0">
+                <a:schemeClr val="accent1"/>
+              </a:effectRef>
+              <a:fontRef idx="minor">
+                <a:schemeClr val="tx1"/>
+              </a:fontRef>
+            </p:style>
+          </p:cxnSp>
+        </p:grpSp>
+        <p:sp>
+          <p:nvSpPr>
+            <p:cNvPr id="53" name="TextBox 52">
+              <a:extLst>
+                <a:ext uri="{FF2B5EF4-FFF2-40B4-BE49-F238E27FC236}">
+                  <a16:creationId xmlns:a16="http://schemas.microsoft.com/office/drawing/2014/main" id="{1613DB3F-6726-46E0-9D07-A70D7EE212E6}"/>
+                </a:ext>
+              </a:extLst>
+            </p:cNvPr>
+            <p:cNvSpPr txBox="1"/>
+            <p:nvPr/>
+          </p:nvSpPr>
+          <p:spPr>
+            <a:xfrm>
+              <a:off x="7512889" y="122512"/>
+              <a:ext cx="276038" cy="369332"/>
+            </a:xfrm>
+            <a:prstGeom prst="rect">
+              <a:avLst/>
+            </a:prstGeom>
+            <a:noFill/>
+          </p:spPr>
+          <p:txBody>
+            <a:bodyPr wrap="none" rtlCol="0">
+              <a:spAutoFit/>
+            </a:bodyPr>
+            <a:lstStyle/>
+            <a:p>
+              <a:r>
+                <a:rPr lang="en-US" dirty="0"/>
+                <a:t>z</a:t>
+              </a:r>
+            </a:p>
+          </p:txBody>
+        </p:sp>
+        <p:sp>
+          <p:nvSpPr>
+            <p:cNvPr id="58" name="TextBox 57">
+              <a:extLst>
+                <a:ext uri="{FF2B5EF4-FFF2-40B4-BE49-F238E27FC236}">
+                  <a16:creationId xmlns:a16="http://schemas.microsoft.com/office/drawing/2014/main" id="{25080BBA-BD7F-4DFE-A692-F31063DD52D0}"/>
+                </a:ext>
+              </a:extLst>
+            </p:cNvPr>
+            <p:cNvSpPr txBox="1"/>
+            <p:nvPr/>
+          </p:nvSpPr>
+          <p:spPr>
+            <a:xfrm>
+              <a:off x="6953376" y="670538"/>
+              <a:ext cx="284052" cy="369332"/>
+            </a:xfrm>
+            <a:prstGeom prst="rect">
+              <a:avLst/>
+            </a:prstGeom>
+            <a:noFill/>
+          </p:spPr>
+          <p:txBody>
+            <a:bodyPr wrap="none" rtlCol="0">
+              <a:spAutoFit/>
+            </a:bodyPr>
+            <a:lstStyle/>
+            <a:p>
+              <a:r>
+                <a:rPr lang="en-US" dirty="0"/>
+                <a:t>x</a:t>
+              </a:r>
+            </a:p>
+          </p:txBody>
+        </p:sp>
+      </p:grpSp>
+      <p:grpSp>
+        <p:nvGrpSpPr>
+          <p:cNvPr id="60" name="Group 59">
+            <a:extLst>
+              <a:ext uri="{FF2B5EF4-FFF2-40B4-BE49-F238E27FC236}">
+                <a16:creationId xmlns:a16="http://schemas.microsoft.com/office/drawing/2014/main" id="{7D4F5AA9-B310-4844-9E7E-670186FBE80D}"/>
+              </a:ext>
+            </a:extLst>
+          </p:cNvPr>
+          <p:cNvGrpSpPr/>
+          <p:nvPr/>
+        </p:nvGrpSpPr>
+        <p:grpSpPr>
+          <a:xfrm>
+            <a:off x="5005008" y="498321"/>
+            <a:ext cx="835551" cy="936172"/>
+            <a:chOff x="6953376" y="122512"/>
+            <a:chExt cx="835551" cy="936172"/>
+          </a:xfrm>
+        </p:grpSpPr>
+        <p:grpSp>
+          <p:nvGrpSpPr>
+            <p:cNvPr id="61" name="Group 60">
+              <a:extLst>
+                <a:ext uri="{FF2B5EF4-FFF2-40B4-BE49-F238E27FC236}">
+                  <a16:creationId xmlns:a16="http://schemas.microsoft.com/office/drawing/2014/main" id="{02AE9FC2-05EC-4750-AA02-CB91E078F4D4}"/>
+                </a:ext>
+              </a:extLst>
+            </p:cNvPr>
+            <p:cNvGrpSpPr/>
+            <p:nvPr/>
+          </p:nvGrpSpPr>
+          <p:grpSpPr>
+            <a:xfrm>
+              <a:off x="7074131" y="446069"/>
+              <a:ext cx="590843" cy="612615"/>
+              <a:chOff x="8862646" y="323557"/>
+              <a:chExt cx="590843" cy="612615"/>
+            </a:xfrm>
+          </p:grpSpPr>
+          <p:cxnSp>
+            <p:nvCxnSpPr>
+              <p:cNvPr id="64" name="Straight Arrow Connector 63">
+                <a:extLst>
+                  <a:ext uri="{FF2B5EF4-FFF2-40B4-BE49-F238E27FC236}">
+                    <a16:creationId xmlns:a16="http://schemas.microsoft.com/office/drawing/2014/main" id="{D77BF4D3-27DF-4E11-817F-4429C9C260FC}"/>
+                  </a:ext>
+                </a:extLst>
+              </p:cNvPr>
+              <p:cNvCxnSpPr>
+                <a:cxnSpLocks/>
+              </p:cNvCxnSpPr>
+              <p:nvPr/>
+            </p:nvCxnSpPr>
+            <p:spPr>
+              <a:xfrm flipH="1">
+                <a:off x="8862646" y="928468"/>
+                <a:ext cx="590843" cy="0"/>
+              </a:xfrm>
+              <a:prstGeom prst="straightConnector1">
+                <a:avLst/>
+              </a:prstGeom>
+              <a:ln w="41275">
+                <a:solidFill>
+                  <a:schemeClr val="tx1"/>
+                </a:solidFill>
+                <a:tailEnd type="triangle"/>
+              </a:ln>
+            </p:spPr>
+            <p:style>
+              <a:lnRef idx="1">
+                <a:schemeClr val="accent1"/>
+              </a:lnRef>
+              <a:fillRef idx="0">
+                <a:schemeClr val="accent1"/>
+              </a:fillRef>
+              <a:effectRef idx="0">
+                <a:schemeClr val="accent1"/>
+              </a:effectRef>
+              <a:fontRef idx="minor">
+                <a:schemeClr val="tx1"/>
+              </a:fontRef>
+            </p:style>
+          </p:cxnSp>
+          <p:cxnSp>
+            <p:nvCxnSpPr>
+              <p:cNvPr id="65" name="Straight Arrow Connector 64">
+                <a:extLst>
+                  <a:ext uri="{FF2B5EF4-FFF2-40B4-BE49-F238E27FC236}">
+                    <a16:creationId xmlns:a16="http://schemas.microsoft.com/office/drawing/2014/main" id="{CE195B13-D358-454B-9355-2E545572124D}"/>
+                  </a:ext>
+                </a:extLst>
+              </p:cNvPr>
+              <p:cNvCxnSpPr>
+                <a:cxnSpLocks/>
+              </p:cNvCxnSpPr>
+              <p:nvPr/>
+            </p:nvCxnSpPr>
+            <p:spPr>
+              <a:xfrm flipH="1" flipV="1">
+                <a:off x="9439423" y="323557"/>
+                <a:ext cx="1" cy="612615"/>
+              </a:xfrm>
+              <a:prstGeom prst="straightConnector1">
+                <a:avLst/>
+              </a:prstGeom>
+              <a:ln w="41275">
+                <a:solidFill>
+                  <a:schemeClr val="tx1"/>
+                </a:solidFill>
+                <a:tailEnd type="triangle"/>
+              </a:ln>
+            </p:spPr>
+            <p:style>
+              <a:lnRef idx="1">
+                <a:schemeClr val="accent1"/>
+              </a:lnRef>
+              <a:fillRef idx="0">
+                <a:schemeClr val="accent1"/>
+              </a:fillRef>
+              <a:effectRef idx="0">
+                <a:schemeClr val="accent1"/>
+              </a:effectRef>
+              <a:fontRef idx="minor">
+                <a:schemeClr val="tx1"/>
+              </a:fontRef>
+            </p:style>
+          </p:cxnSp>
+        </p:grpSp>
+        <p:sp>
+          <p:nvSpPr>
+            <p:cNvPr id="62" name="TextBox 61">
+              <a:extLst>
+                <a:ext uri="{FF2B5EF4-FFF2-40B4-BE49-F238E27FC236}">
+                  <a16:creationId xmlns:a16="http://schemas.microsoft.com/office/drawing/2014/main" id="{CC19D65D-3FE1-45FD-8606-E5AD6DA21B69}"/>
+                </a:ext>
+              </a:extLst>
+            </p:cNvPr>
+            <p:cNvSpPr txBox="1"/>
+            <p:nvPr/>
+          </p:nvSpPr>
+          <p:spPr>
+            <a:xfrm>
+              <a:off x="7512889" y="122512"/>
+              <a:ext cx="276038" cy="369332"/>
+            </a:xfrm>
+            <a:prstGeom prst="rect">
+              <a:avLst/>
+            </a:prstGeom>
+            <a:noFill/>
+          </p:spPr>
+          <p:txBody>
+            <a:bodyPr wrap="none" rtlCol="0">
+              <a:spAutoFit/>
+            </a:bodyPr>
+            <a:lstStyle/>
+            <a:p>
+              <a:r>
+                <a:rPr lang="en-US" dirty="0"/>
+                <a:t>z</a:t>
+              </a:r>
+            </a:p>
+          </p:txBody>
+        </p:sp>
+        <p:sp>
+          <p:nvSpPr>
+            <p:cNvPr id="63" name="TextBox 62">
+              <a:extLst>
+                <a:ext uri="{FF2B5EF4-FFF2-40B4-BE49-F238E27FC236}">
+                  <a16:creationId xmlns:a16="http://schemas.microsoft.com/office/drawing/2014/main" id="{F0627F96-DD41-4760-85AB-10E284EFF09D}"/>
+                </a:ext>
+              </a:extLst>
+            </p:cNvPr>
+            <p:cNvSpPr txBox="1"/>
+            <p:nvPr/>
+          </p:nvSpPr>
+          <p:spPr>
+            <a:xfrm>
+              <a:off x="6953376" y="670538"/>
+              <a:ext cx="284052" cy="369332"/>
+            </a:xfrm>
+            <a:prstGeom prst="rect">
+              <a:avLst/>
+            </a:prstGeom>
+            <a:noFill/>
+          </p:spPr>
+          <p:txBody>
+            <a:bodyPr wrap="none" rtlCol="0">
+              <a:spAutoFit/>
+            </a:bodyPr>
+            <a:lstStyle/>
+            <a:p>
+              <a:r>
+                <a:rPr lang="en-US" dirty="0"/>
+                <a:t>x</a:t>
+              </a:r>
+            </a:p>
+          </p:txBody>
+        </p:sp>
+      </p:grpSp>
+      <p:grpSp>
+        <p:nvGrpSpPr>
+          <p:cNvPr id="72" name="Group 71">
+            <a:extLst>
+              <a:ext uri="{FF2B5EF4-FFF2-40B4-BE49-F238E27FC236}">
+                <a16:creationId xmlns:a16="http://schemas.microsoft.com/office/drawing/2014/main" id="{D53E13BF-8017-490B-8A5E-EAAF9EC9F463}"/>
+              </a:ext>
+            </a:extLst>
+          </p:cNvPr>
+          <p:cNvGrpSpPr/>
+          <p:nvPr/>
+        </p:nvGrpSpPr>
+        <p:grpSpPr>
+          <a:xfrm>
+            <a:off x="8505871" y="4014610"/>
+            <a:ext cx="714796" cy="936172"/>
+            <a:chOff x="7074131" y="122512"/>
+            <a:chExt cx="714796" cy="936172"/>
+          </a:xfrm>
+        </p:grpSpPr>
+        <p:grpSp>
+          <p:nvGrpSpPr>
+            <p:cNvPr id="73" name="Group 72">
+              <a:extLst>
+                <a:ext uri="{FF2B5EF4-FFF2-40B4-BE49-F238E27FC236}">
+                  <a16:creationId xmlns:a16="http://schemas.microsoft.com/office/drawing/2014/main" id="{E8E9F8F5-7211-4C26-BAD2-202CBF01FFF2}"/>
+                </a:ext>
+              </a:extLst>
+            </p:cNvPr>
+            <p:cNvGrpSpPr/>
+            <p:nvPr/>
+          </p:nvGrpSpPr>
+          <p:grpSpPr>
+            <a:xfrm>
+              <a:off x="7074131" y="446069"/>
+              <a:ext cx="590843" cy="612615"/>
+              <a:chOff x="8862646" y="323557"/>
+              <a:chExt cx="590843" cy="612615"/>
+            </a:xfrm>
+          </p:grpSpPr>
+          <p:cxnSp>
+            <p:nvCxnSpPr>
+              <p:cNvPr id="76" name="Straight Arrow Connector 75">
+                <a:extLst>
+                  <a:ext uri="{FF2B5EF4-FFF2-40B4-BE49-F238E27FC236}">
+                    <a16:creationId xmlns:a16="http://schemas.microsoft.com/office/drawing/2014/main" id="{05A7E404-F966-4DC6-80C8-4EF4925589E5}"/>
+                  </a:ext>
+                </a:extLst>
+              </p:cNvPr>
+              <p:cNvCxnSpPr>
+                <a:cxnSpLocks/>
+              </p:cNvCxnSpPr>
+              <p:nvPr/>
+            </p:nvCxnSpPr>
+            <p:spPr>
+              <a:xfrm flipH="1">
+                <a:off x="8862646" y="928468"/>
+                <a:ext cx="590843" cy="0"/>
+              </a:xfrm>
+              <a:prstGeom prst="straightConnector1">
+                <a:avLst/>
+              </a:prstGeom>
+              <a:ln w="41275">
+                <a:solidFill>
+                  <a:schemeClr val="tx1"/>
+                </a:solidFill>
+                <a:tailEnd type="triangle"/>
+              </a:ln>
+            </p:spPr>
+            <p:style>
+              <a:lnRef idx="1">
+                <a:schemeClr val="accent1"/>
+              </a:lnRef>
+              <a:fillRef idx="0">
+                <a:schemeClr val="accent1"/>
+              </a:fillRef>
+              <a:effectRef idx="0">
+                <a:schemeClr val="accent1"/>
+              </a:effectRef>
+              <a:fontRef idx="minor">
+                <a:schemeClr val="tx1"/>
+              </a:fontRef>
+            </p:style>
+          </p:cxnSp>
+          <p:cxnSp>
+            <p:nvCxnSpPr>
+              <p:cNvPr id="77" name="Straight Arrow Connector 76">
+                <a:extLst>
+                  <a:ext uri="{FF2B5EF4-FFF2-40B4-BE49-F238E27FC236}">
+                    <a16:creationId xmlns:a16="http://schemas.microsoft.com/office/drawing/2014/main" id="{A80656DB-AE9E-4EE4-8E87-233984F290D6}"/>
+                  </a:ext>
+                </a:extLst>
+              </p:cNvPr>
+              <p:cNvCxnSpPr>
+                <a:cxnSpLocks/>
+              </p:cNvCxnSpPr>
+              <p:nvPr/>
+            </p:nvCxnSpPr>
+            <p:spPr>
+              <a:xfrm flipH="1" flipV="1">
+                <a:off x="9439423" y="323557"/>
+                <a:ext cx="1" cy="612615"/>
+              </a:xfrm>
+              <a:prstGeom prst="straightConnector1">
+                <a:avLst/>
+              </a:prstGeom>
+              <a:ln w="41275">
+                <a:solidFill>
+                  <a:schemeClr val="tx1"/>
+                </a:solidFill>
+                <a:tailEnd type="triangle"/>
+              </a:ln>
+            </p:spPr>
+            <p:style>
+              <a:lnRef idx="1">
+                <a:schemeClr val="accent1"/>
+              </a:lnRef>
+              <a:fillRef idx="0">
+                <a:schemeClr val="accent1"/>
+              </a:fillRef>
+              <a:effectRef idx="0">
+                <a:schemeClr val="accent1"/>
+              </a:effectRef>
+              <a:fontRef idx="minor">
+                <a:schemeClr val="tx1"/>
+              </a:fontRef>
+            </p:style>
+          </p:cxnSp>
+        </p:grpSp>
+        <p:sp>
+          <p:nvSpPr>
+            <p:cNvPr id="74" name="TextBox 73">
+              <a:extLst>
+                <a:ext uri="{FF2B5EF4-FFF2-40B4-BE49-F238E27FC236}">
+                  <a16:creationId xmlns:a16="http://schemas.microsoft.com/office/drawing/2014/main" id="{1DE979AB-1096-4F5F-8C03-38F269F4CA8B}"/>
+                </a:ext>
+              </a:extLst>
+            </p:cNvPr>
+            <p:cNvSpPr txBox="1"/>
+            <p:nvPr/>
+          </p:nvSpPr>
+          <p:spPr>
+            <a:xfrm>
+              <a:off x="7512889" y="122512"/>
+              <a:ext cx="276038" cy="369332"/>
+            </a:xfrm>
+            <a:prstGeom prst="rect">
+              <a:avLst/>
+            </a:prstGeom>
+            <a:noFill/>
+          </p:spPr>
+          <p:txBody>
+            <a:bodyPr wrap="none" rtlCol="0">
+              <a:spAutoFit/>
+            </a:bodyPr>
+            <a:lstStyle/>
+            <a:p>
+              <a:r>
+                <a:rPr lang="en-US" dirty="0"/>
+                <a:t>z</a:t>
+              </a:r>
+            </a:p>
+          </p:txBody>
+        </p:sp>
+        <p:sp>
+          <p:nvSpPr>
+            <p:cNvPr id="75" name="TextBox 74">
+              <a:extLst>
+                <a:ext uri="{FF2B5EF4-FFF2-40B4-BE49-F238E27FC236}">
+                  <a16:creationId xmlns:a16="http://schemas.microsoft.com/office/drawing/2014/main" id="{C7638235-2383-4B57-B8FB-56293BFA34A4}"/>
+                </a:ext>
+              </a:extLst>
+            </p:cNvPr>
+            <p:cNvSpPr txBox="1"/>
+            <p:nvPr/>
+          </p:nvSpPr>
+          <p:spPr>
+            <a:xfrm>
+              <a:off x="7079988" y="670538"/>
+              <a:ext cx="284052" cy="369332"/>
+            </a:xfrm>
+            <a:prstGeom prst="rect">
+              <a:avLst/>
+            </a:prstGeom>
+            <a:noFill/>
+          </p:spPr>
+          <p:txBody>
+            <a:bodyPr wrap="none" rtlCol="0">
+              <a:spAutoFit/>
+            </a:bodyPr>
+            <a:lstStyle/>
+            <a:p>
+              <a:r>
+                <a:rPr lang="en-US" dirty="0"/>
+                <a:t>x</a:t>
+              </a:r>
+            </a:p>
+          </p:txBody>
+        </p:sp>
+      </p:grpSp>
+      <p:sp>
+        <p:nvSpPr>
+          <p:cNvPr id="78" name="TextBox 77">
+            <a:extLst>
+              <a:ext uri="{FF2B5EF4-FFF2-40B4-BE49-F238E27FC236}">
+                <a16:creationId xmlns:a16="http://schemas.microsoft.com/office/drawing/2014/main" id="{B951398C-9FD4-4CA6-A043-EB5547CDCA8F}"/>
+              </a:ext>
+            </a:extLst>
+          </p:cNvPr>
+          <p:cNvSpPr txBox="1"/>
+          <p:nvPr/>
+        </p:nvSpPr>
+        <p:spPr>
+          <a:xfrm>
+            <a:off x="8414990" y="937946"/>
+            <a:ext cx="330540" cy="369332"/>
+          </a:xfrm>
+          <a:prstGeom prst="rect">
+            <a:avLst/>
+          </a:prstGeom>
+          <a:noFill/>
+        </p:spPr>
+        <p:txBody>
+          <a:bodyPr wrap="none" rtlCol="0">
+            <a:spAutoFit/>
+          </a:bodyPr>
+          <a:lstStyle/>
+          <a:p>
+            <a:r>
+              <a:rPr lang="en-US" dirty="0"/>
+              <a:t>G</a:t>
+            </a:r>
+          </a:p>
+        </p:txBody>
+      </p:sp>
+      <p:sp>
+        <p:nvSpPr>
+          <p:cNvPr id="80" name="TextBox 79">
+            <a:extLst>
+              <a:ext uri="{FF2B5EF4-FFF2-40B4-BE49-F238E27FC236}">
+                <a16:creationId xmlns:a16="http://schemas.microsoft.com/office/drawing/2014/main" id="{514F79E4-2E7E-438B-9F1F-8F54ED49DD79}"/>
+              </a:ext>
+            </a:extLst>
+          </p:cNvPr>
+          <p:cNvSpPr txBox="1"/>
+          <p:nvPr/>
+        </p:nvSpPr>
+        <p:spPr>
+          <a:xfrm>
+            <a:off x="5716323" y="1008551"/>
+            <a:ext cx="296876" cy="369332"/>
+          </a:xfrm>
+          <a:prstGeom prst="rect">
+            <a:avLst/>
+          </a:prstGeom>
+          <a:noFill/>
+        </p:spPr>
+        <p:txBody>
+          <a:bodyPr wrap="none" rtlCol="0">
+            <a:spAutoFit/>
+          </a:bodyPr>
+          <a:lstStyle/>
+          <a:p>
+            <a:r>
+              <a:rPr lang="en-US" dirty="0"/>
+              <a:t>T</a:t>
+            </a:r>
+          </a:p>
+        </p:txBody>
+      </p:sp>
+      <p:sp>
+        <p:nvSpPr>
+          <p:cNvPr id="81" name="TextBox 80">
+            <a:extLst>
+              <a:ext uri="{FF2B5EF4-FFF2-40B4-BE49-F238E27FC236}">
+                <a16:creationId xmlns:a16="http://schemas.microsoft.com/office/drawing/2014/main" id="{F938623F-413A-4A1D-B266-9EC9F504CA9E}"/>
+              </a:ext>
+            </a:extLst>
+          </p:cNvPr>
+          <p:cNvSpPr txBox="1"/>
+          <p:nvPr/>
+        </p:nvSpPr>
+        <p:spPr>
+          <a:xfrm>
+            <a:off x="9127172" y="4766116"/>
+            <a:ext cx="290464" cy="369332"/>
+          </a:xfrm>
+          <a:prstGeom prst="rect">
+            <a:avLst/>
+          </a:prstGeom>
+          <a:noFill/>
+        </p:spPr>
+        <p:txBody>
+          <a:bodyPr wrap="none" rtlCol="0">
+            <a:spAutoFit/>
+          </a:bodyPr>
+          <a:lstStyle/>
+          <a:p>
+            <a:r>
+              <a:rPr lang="en-US" dirty="0"/>
+              <a:t>F</a:t>
+            </a:r>
+          </a:p>
+        </p:txBody>
+      </p:sp>
+    </p:spTree>
+    <p:extLst>
+      <p:ext uri="{BB962C8B-B14F-4D97-AF65-F5344CB8AC3E}">
+        <p14:creationId xmlns:p14="http://schemas.microsoft.com/office/powerpoint/2010/main" val="2778162912"/>
+      </p:ext>
+    </p:extLst>
+  </p:cSld>
+  <p:clrMapOvr>
+    <a:masterClrMapping/>
+  </p:clrMapOvr>
+</p:sld>
+</file>
+
+<file path=ppt/slides/slide3.xml><?xml version="1.0" encoding="utf-8"?>
+<p:sld xmlns:a="http://schemas.openxmlformats.org/drawingml/2006/main" xmlns:r="http://schemas.openxmlformats.org/officeDocument/2006/relationships" xmlns:p="http://schemas.openxmlformats.org/presentationml/2006/main">
+  <p:cSld>
+    <p:spTree>
+      <p:nvGrpSpPr>
+        <p:cNvPr id="1" name=""/>
+        <p:cNvGrpSpPr/>
+        <p:nvPr/>
+      </p:nvGrpSpPr>
+      <p:grpSpPr>
+        <a:xfrm>
+          <a:off x="0" y="0"/>
+          <a:ext cx="0" cy="0"/>
+          <a:chOff x="0" y="0"/>
+          <a:chExt cx="0" cy="0"/>
+        </a:xfrm>
+      </p:grpSpPr>
+      <p:grpSp>
+        <p:nvGrpSpPr>
+          <p:cNvPr id="18" name="Group 17">
+            <a:extLst>
+              <a:ext uri="{FF2B5EF4-FFF2-40B4-BE49-F238E27FC236}">
+                <a16:creationId xmlns:a16="http://schemas.microsoft.com/office/drawing/2014/main" id="{ECF68E6A-BEFA-413E-A9B4-1145219A93D3}"/>
+              </a:ext>
+            </a:extLst>
+          </p:cNvPr>
+          <p:cNvGrpSpPr/>
+          <p:nvPr/>
+        </p:nvGrpSpPr>
+        <p:grpSpPr>
+          <a:xfrm>
+            <a:off x="1514661" y="3681433"/>
+            <a:ext cx="3079635" cy="1271575"/>
+            <a:chOff x="1514661" y="3681433"/>
+            <a:chExt cx="3079635" cy="1271575"/>
+          </a:xfrm>
+        </p:grpSpPr>
+        <p:sp>
+          <p:nvSpPr>
+            <p:cNvPr id="59" name="Rectangle 58">
+              <a:extLst>
+                <a:ext uri="{FF2B5EF4-FFF2-40B4-BE49-F238E27FC236}">
+                  <a16:creationId xmlns:a16="http://schemas.microsoft.com/office/drawing/2014/main" id="{D8D13EC2-6641-418D-9179-47ED51EEC96F}"/>
+                </a:ext>
+              </a:extLst>
+            </p:cNvPr>
+            <p:cNvSpPr/>
+            <p:nvPr/>
+          </p:nvSpPr>
+          <p:spPr>
+            <a:xfrm>
+              <a:off x="1702920" y="3681433"/>
+              <a:ext cx="2674980" cy="792433"/>
+            </a:xfrm>
+            <a:prstGeom prst="rect">
+              <a:avLst/>
+            </a:prstGeom>
+            <a:solidFill>
+              <a:schemeClr val="tx2">
+                <a:lumMod val="60000"/>
+                <a:lumOff val="40000"/>
+                <a:alpha val="25000"/>
+              </a:schemeClr>
+            </a:solidFill>
+            <a:ln>
+              <a:noFill/>
+            </a:ln>
+          </p:spPr>
+          <p:style>
+            <a:lnRef idx="2">
+              <a:schemeClr val="accent1">
+                <a:shade val="50000"/>
+              </a:schemeClr>
+            </a:lnRef>
+            <a:fillRef idx="1">
+              <a:schemeClr val="accent1"/>
+            </a:fillRef>
+            <a:effectRef idx="0">
+              <a:schemeClr val="accent1"/>
+            </a:effectRef>
+            <a:fontRef idx="minor">
+              <a:schemeClr val="lt1"/>
+            </a:fontRef>
+          </p:style>
+          <p:txBody>
+            <a:bodyPr rtlCol="0" anchor="ctr"/>
+            <a:lstStyle/>
+            <a:p>
+              <a:pPr algn="ctr"/>
+              <a:endParaRPr lang="en-US"/>
+            </a:p>
+          </p:txBody>
+        </p:sp>
+        <p:sp>
+          <p:nvSpPr>
+            <p:cNvPr id="61" name="Rectangle 60">
+              <a:extLst>
+                <a:ext uri="{FF2B5EF4-FFF2-40B4-BE49-F238E27FC236}">
+                  <a16:creationId xmlns:a16="http://schemas.microsoft.com/office/drawing/2014/main" id="{C541FB4C-B04E-4E22-A14D-B4718FAAD35A}"/>
+                </a:ext>
+              </a:extLst>
+            </p:cNvPr>
+            <p:cNvSpPr/>
+            <p:nvPr/>
+          </p:nvSpPr>
+          <p:spPr>
+            <a:xfrm>
+              <a:off x="1514661" y="4471769"/>
+              <a:ext cx="3079635" cy="172457"/>
+            </a:xfrm>
+            <a:prstGeom prst="rect">
+              <a:avLst/>
+            </a:prstGeom>
+            <a:solidFill>
+              <a:schemeClr val="tx2">
+                <a:lumMod val="60000"/>
+                <a:lumOff val="40000"/>
+                <a:alpha val="25000"/>
+              </a:schemeClr>
+            </a:solidFill>
+            <a:ln>
+              <a:noFill/>
+            </a:ln>
+          </p:spPr>
+          <p:style>
+            <a:lnRef idx="2">
+              <a:schemeClr val="accent1">
+                <a:shade val="50000"/>
+              </a:schemeClr>
+            </a:lnRef>
+            <a:fillRef idx="1">
+              <a:schemeClr val="accent1"/>
+            </a:fillRef>
+            <a:effectRef idx="0">
+              <a:schemeClr val="accent1"/>
+            </a:effectRef>
+            <a:fontRef idx="minor">
+              <a:schemeClr val="lt1"/>
+            </a:fontRef>
+          </p:style>
+          <p:txBody>
+            <a:bodyPr rtlCol="0" anchor="ctr"/>
+            <a:lstStyle/>
+            <a:p>
+              <a:pPr algn="ctr"/>
+              <a:endParaRPr lang="en-US"/>
+            </a:p>
+          </p:txBody>
+        </p:sp>
+        <p:sp>
+          <p:nvSpPr>
+            <p:cNvPr id="62" name="Oval 61">
+              <a:extLst>
+                <a:ext uri="{FF2B5EF4-FFF2-40B4-BE49-F238E27FC236}">
+                  <a16:creationId xmlns:a16="http://schemas.microsoft.com/office/drawing/2014/main" id="{53468681-6FB2-485C-A7CA-E5875B98006F}"/>
+                </a:ext>
+              </a:extLst>
+            </p:cNvPr>
+            <p:cNvSpPr/>
+            <p:nvPr/>
+          </p:nvSpPr>
+          <p:spPr>
+            <a:xfrm>
+              <a:off x="1688856" y="4646041"/>
+              <a:ext cx="324731" cy="306967"/>
+            </a:xfrm>
+            <a:prstGeom prst="ellipse">
+              <a:avLst/>
+            </a:prstGeom>
+            <a:solidFill>
+              <a:schemeClr val="tx2">
+                <a:lumMod val="60000"/>
+                <a:lumOff val="40000"/>
+                <a:alpha val="25000"/>
+              </a:schemeClr>
+            </a:solidFill>
+            <a:ln>
+              <a:noFill/>
+            </a:ln>
+          </p:spPr>
+          <p:style>
+            <a:lnRef idx="2">
+              <a:schemeClr val="accent1">
+                <a:shade val="50000"/>
+              </a:schemeClr>
+            </a:lnRef>
+            <a:fillRef idx="1">
+              <a:schemeClr val="accent1"/>
+            </a:fillRef>
+            <a:effectRef idx="0">
+              <a:schemeClr val="accent1"/>
+            </a:effectRef>
+            <a:fontRef idx="minor">
+              <a:schemeClr val="lt1"/>
+            </a:fontRef>
+          </p:style>
+          <p:txBody>
+            <a:bodyPr rtlCol="0" anchor="ctr"/>
+            <a:lstStyle/>
+            <a:p>
+              <a:pPr algn="ctr"/>
+              <a:endParaRPr lang="en-US"/>
+            </a:p>
+          </p:txBody>
+        </p:sp>
+        <p:sp>
+          <p:nvSpPr>
+            <p:cNvPr id="63" name="Oval 62">
+              <a:extLst>
+                <a:ext uri="{FF2B5EF4-FFF2-40B4-BE49-F238E27FC236}">
+                  <a16:creationId xmlns:a16="http://schemas.microsoft.com/office/drawing/2014/main" id="{0F44E14F-F211-4B18-B231-06DFCB19790A}"/>
+                </a:ext>
+              </a:extLst>
+            </p:cNvPr>
+            <p:cNvSpPr/>
+            <p:nvPr/>
+          </p:nvSpPr>
+          <p:spPr>
+            <a:xfrm>
+              <a:off x="4022152" y="4646040"/>
+              <a:ext cx="324731" cy="306967"/>
+            </a:xfrm>
+            <a:prstGeom prst="ellipse">
+              <a:avLst/>
+            </a:prstGeom>
+            <a:solidFill>
+              <a:schemeClr val="tx2">
+                <a:lumMod val="60000"/>
+                <a:lumOff val="40000"/>
+                <a:alpha val="25000"/>
+              </a:schemeClr>
+            </a:solidFill>
+            <a:ln>
+              <a:noFill/>
+            </a:ln>
+          </p:spPr>
+          <p:style>
+            <a:lnRef idx="2">
+              <a:schemeClr val="accent1">
+                <a:shade val="50000"/>
+              </a:schemeClr>
+            </a:lnRef>
+            <a:fillRef idx="1">
+              <a:schemeClr val="accent1"/>
+            </a:fillRef>
+            <a:effectRef idx="0">
+              <a:schemeClr val="accent1"/>
+            </a:effectRef>
+            <a:fontRef idx="minor">
+              <a:schemeClr val="lt1"/>
+            </a:fontRef>
+          </p:style>
+          <p:txBody>
+            <a:bodyPr rtlCol="0" anchor="ctr"/>
+            <a:lstStyle/>
+            <a:p>
+              <a:pPr algn="ctr"/>
+              <a:endParaRPr lang="en-US"/>
+            </a:p>
+          </p:txBody>
+        </p:sp>
+        <p:sp>
+          <p:nvSpPr>
+            <p:cNvPr id="64" name="Oval 63">
+              <a:extLst>
+                <a:ext uri="{FF2B5EF4-FFF2-40B4-BE49-F238E27FC236}">
+                  <a16:creationId xmlns:a16="http://schemas.microsoft.com/office/drawing/2014/main" id="{7BC5CB6F-2228-4192-BE19-50E300020E4C}"/>
+                </a:ext>
+              </a:extLst>
+            </p:cNvPr>
+            <p:cNvSpPr/>
+            <p:nvPr/>
+          </p:nvSpPr>
+          <p:spPr>
+            <a:xfrm>
+              <a:off x="2855504" y="4646039"/>
+              <a:ext cx="324731" cy="306967"/>
+            </a:xfrm>
+            <a:prstGeom prst="ellipse">
+              <a:avLst/>
+            </a:prstGeom>
+            <a:solidFill>
+              <a:schemeClr val="tx2">
+                <a:lumMod val="60000"/>
+                <a:lumOff val="40000"/>
+                <a:alpha val="25000"/>
+              </a:schemeClr>
+            </a:solidFill>
+            <a:ln>
+              <a:noFill/>
+            </a:ln>
+          </p:spPr>
+          <p:style>
+            <a:lnRef idx="2">
+              <a:schemeClr val="accent1">
+                <a:shade val="50000"/>
+              </a:schemeClr>
+            </a:lnRef>
+            <a:fillRef idx="1">
+              <a:schemeClr val="accent1"/>
+            </a:fillRef>
+            <a:effectRef idx="0">
+              <a:schemeClr val="accent1"/>
+            </a:effectRef>
+            <a:fontRef idx="minor">
+              <a:schemeClr val="lt1"/>
+            </a:fontRef>
+          </p:style>
+          <p:txBody>
+            <a:bodyPr rtlCol="0" anchor="ctr"/>
+            <a:lstStyle/>
+            <a:p>
+              <a:pPr algn="ctr"/>
+              <a:endParaRPr lang="en-US"/>
+            </a:p>
+          </p:txBody>
+        </p:sp>
+      </p:grpSp>
+      <p:grpSp>
+        <p:nvGrpSpPr>
+          <p:cNvPr id="20" name="Group 19">
+            <a:extLst>
+              <a:ext uri="{FF2B5EF4-FFF2-40B4-BE49-F238E27FC236}">
+                <a16:creationId xmlns:a16="http://schemas.microsoft.com/office/drawing/2014/main" id="{7F43A981-C00D-4A39-83B6-E2FE06EACF68}"/>
+              </a:ext>
+            </a:extLst>
+          </p:cNvPr>
+          <p:cNvGrpSpPr/>
+          <p:nvPr/>
+        </p:nvGrpSpPr>
+        <p:grpSpPr>
+          <a:xfrm>
+            <a:off x="7862457" y="3660741"/>
+            <a:ext cx="3079635" cy="1285643"/>
+            <a:chOff x="7890593" y="3660741"/>
+            <a:chExt cx="3079635" cy="1285643"/>
+          </a:xfrm>
+        </p:grpSpPr>
+        <p:sp>
+          <p:nvSpPr>
+            <p:cNvPr id="53" name="Rectangle 52">
+              <a:extLst>
+                <a:ext uri="{FF2B5EF4-FFF2-40B4-BE49-F238E27FC236}">
+                  <a16:creationId xmlns:a16="http://schemas.microsoft.com/office/drawing/2014/main" id="{5B078568-4124-4F68-B345-755EFCA38CA1}"/>
+                </a:ext>
+              </a:extLst>
+            </p:cNvPr>
+            <p:cNvSpPr/>
+            <p:nvPr/>
+          </p:nvSpPr>
+          <p:spPr>
+            <a:xfrm>
+              <a:off x="8078852" y="3660741"/>
+              <a:ext cx="2674980" cy="792433"/>
+            </a:xfrm>
+            <a:prstGeom prst="rect">
+              <a:avLst/>
+            </a:prstGeom>
+            <a:solidFill>
+              <a:schemeClr val="tx2">
+                <a:lumMod val="60000"/>
+                <a:lumOff val="40000"/>
+                <a:alpha val="25000"/>
+              </a:schemeClr>
+            </a:solidFill>
+            <a:ln>
+              <a:noFill/>
+            </a:ln>
+          </p:spPr>
+          <p:style>
+            <a:lnRef idx="2">
+              <a:schemeClr val="accent1">
+                <a:shade val="50000"/>
+              </a:schemeClr>
+            </a:lnRef>
+            <a:fillRef idx="1">
+              <a:schemeClr val="accent1"/>
+            </a:fillRef>
+            <a:effectRef idx="0">
+              <a:schemeClr val="accent1"/>
+            </a:effectRef>
+            <a:fontRef idx="minor">
+              <a:schemeClr val="lt1"/>
+            </a:fontRef>
+          </p:style>
+          <p:txBody>
+            <a:bodyPr rtlCol="0" anchor="ctr"/>
+            <a:lstStyle/>
+            <a:p>
+              <a:pPr algn="ctr"/>
+              <a:endParaRPr lang="en-US"/>
+            </a:p>
+          </p:txBody>
+        </p:sp>
+        <p:sp>
+          <p:nvSpPr>
+            <p:cNvPr id="55" name="Rectangle 54">
+              <a:extLst>
+                <a:ext uri="{FF2B5EF4-FFF2-40B4-BE49-F238E27FC236}">
+                  <a16:creationId xmlns:a16="http://schemas.microsoft.com/office/drawing/2014/main" id="{E1E79E80-0247-4E11-8060-74553803BBAF}"/>
+                </a:ext>
+              </a:extLst>
+            </p:cNvPr>
+            <p:cNvSpPr/>
+            <p:nvPr/>
+          </p:nvSpPr>
+          <p:spPr>
+            <a:xfrm>
+              <a:off x="7890593" y="4465145"/>
+              <a:ext cx="3079635" cy="172457"/>
+            </a:xfrm>
+            <a:prstGeom prst="rect">
+              <a:avLst/>
+            </a:prstGeom>
+            <a:solidFill>
+              <a:schemeClr val="tx2">
+                <a:lumMod val="60000"/>
+                <a:lumOff val="40000"/>
+                <a:alpha val="25000"/>
+              </a:schemeClr>
+            </a:solidFill>
+            <a:ln>
+              <a:noFill/>
+            </a:ln>
+          </p:spPr>
+          <p:style>
+            <a:lnRef idx="2">
+              <a:schemeClr val="accent1">
+                <a:shade val="50000"/>
+              </a:schemeClr>
+            </a:lnRef>
+            <a:fillRef idx="1">
+              <a:schemeClr val="accent1"/>
+            </a:fillRef>
+            <a:effectRef idx="0">
+              <a:schemeClr val="accent1"/>
+            </a:effectRef>
+            <a:fontRef idx="minor">
+              <a:schemeClr val="lt1"/>
+            </a:fontRef>
+          </p:style>
+          <p:txBody>
+            <a:bodyPr rtlCol="0" anchor="ctr"/>
+            <a:lstStyle/>
+            <a:p>
+              <a:pPr algn="ctr"/>
+              <a:endParaRPr lang="en-US"/>
+            </a:p>
+          </p:txBody>
+        </p:sp>
+        <p:sp>
+          <p:nvSpPr>
+            <p:cNvPr id="56" name="Oval 55">
+              <a:extLst>
+                <a:ext uri="{FF2B5EF4-FFF2-40B4-BE49-F238E27FC236}">
+                  <a16:creationId xmlns:a16="http://schemas.microsoft.com/office/drawing/2014/main" id="{9DE1F225-0C82-4C03-8D57-46549513B9CA}"/>
+                </a:ext>
+              </a:extLst>
+            </p:cNvPr>
+            <p:cNvSpPr/>
+            <p:nvPr/>
+          </p:nvSpPr>
+          <p:spPr>
+            <a:xfrm>
+              <a:off x="8064788" y="4639417"/>
+              <a:ext cx="324731" cy="306967"/>
+            </a:xfrm>
+            <a:prstGeom prst="ellipse">
+              <a:avLst/>
+            </a:prstGeom>
+            <a:solidFill>
+              <a:schemeClr val="tx2">
+                <a:lumMod val="60000"/>
+                <a:lumOff val="40000"/>
+                <a:alpha val="25000"/>
+              </a:schemeClr>
+            </a:solidFill>
+            <a:ln>
+              <a:noFill/>
+            </a:ln>
+          </p:spPr>
+          <p:style>
+            <a:lnRef idx="2">
+              <a:schemeClr val="accent1">
+                <a:shade val="50000"/>
+              </a:schemeClr>
+            </a:lnRef>
+            <a:fillRef idx="1">
+              <a:schemeClr val="accent1"/>
+            </a:fillRef>
+            <a:effectRef idx="0">
+              <a:schemeClr val="accent1"/>
+            </a:effectRef>
+            <a:fontRef idx="minor">
+              <a:schemeClr val="lt1"/>
+            </a:fontRef>
+          </p:style>
+          <p:txBody>
+            <a:bodyPr rtlCol="0" anchor="ctr"/>
+            <a:lstStyle/>
+            <a:p>
+              <a:pPr algn="ctr"/>
+              <a:endParaRPr lang="en-US"/>
+            </a:p>
+          </p:txBody>
+        </p:sp>
+        <p:sp>
+          <p:nvSpPr>
+            <p:cNvPr id="57" name="Oval 56">
+              <a:extLst>
+                <a:ext uri="{FF2B5EF4-FFF2-40B4-BE49-F238E27FC236}">
+                  <a16:creationId xmlns:a16="http://schemas.microsoft.com/office/drawing/2014/main" id="{FB2451F5-1B9F-4751-9946-533EBB248AD4}"/>
+                </a:ext>
+              </a:extLst>
+            </p:cNvPr>
+            <p:cNvSpPr/>
+            <p:nvPr/>
+          </p:nvSpPr>
+          <p:spPr>
+            <a:xfrm>
+              <a:off x="10398084" y="4639416"/>
+              <a:ext cx="324731" cy="306967"/>
+            </a:xfrm>
+            <a:prstGeom prst="ellipse">
+              <a:avLst/>
+            </a:prstGeom>
+            <a:solidFill>
+              <a:schemeClr val="tx2">
+                <a:lumMod val="60000"/>
+                <a:lumOff val="40000"/>
+                <a:alpha val="25000"/>
+              </a:schemeClr>
+            </a:solidFill>
+            <a:ln>
+              <a:noFill/>
+            </a:ln>
+          </p:spPr>
+          <p:style>
+            <a:lnRef idx="2">
+              <a:schemeClr val="accent1">
+                <a:shade val="50000"/>
+              </a:schemeClr>
+            </a:lnRef>
+            <a:fillRef idx="1">
+              <a:schemeClr val="accent1"/>
+            </a:fillRef>
+            <a:effectRef idx="0">
+              <a:schemeClr val="accent1"/>
+            </a:effectRef>
+            <a:fontRef idx="minor">
+              <a:schemeClr val="lt1"/>
+            </a:fontRef>
+          </p:style>
+          <p:txBody>
+            <a:bodyPr rtlCol="0" anchor="ctr"/>
+            <a:lstStyle/>
+            <a:p>
+              <a:pPr algn="ctr"/>
+              <a:endParaRPr lang="en-US"/>
+            </a:p>
+          </p:txBody>
+        </p:sp>
+        <p:sp>
+          <p:nvSpPr>
+            <p:cNvPr id="58" name="Oval 57">
+              <a:extLst>
+                <a:ext uri="{FF2B5EF4-FFF2-40B4-BE49-F238E27FC236}">
+                  <a16:creationId xmlns:a16="http://schemas.microsoft.com/office/drawing/2014/main" id="{95CBF24D-78BC-4D55-BF48-A162FE53FC5A}"/>
+                </a:ext>
+              </a:extLst>
+            </p:cNvPr>
+            <p:cNvSpPr/>
+            <p:nvPr/>
+          </p:nvSpPr>
+          <p:spPr>
+            <a:xfrm>
+              <a:off x="9231436" y="4639415"/>
+              <a:ext cx="324731" cy="306967"/>
+            </a:xfrm>
+            <a:prstGeom prst="ellipse">
+              <a:avLst/>
+            </a:prstGeom>
+            <a:solidFill>
+              <a:schemeClr val="tx2">
+                <a:lumMod val="60000"/>
+                <a:lumOff val="40000"/>
+                <a:alpha val="25000"/>
+              </a:schemeClr>
+            </a:solidFill>
+            <a:ln>
+              <a:noFill/>
+            </a:ln>
+          </p:spPr>
+          <p:style>
+            <a:lnRef idx="2">
+              <a:schemeClr val="accent1">
+                <a:shade val="50000"/>
+              </a:schemeClr>
+            </a:lnRef>
+            <a:fillRef idx="1">
+              <a:schemeClr val="accent1"/>
+            </a:fillRef>
+            <a:effectRef idx="0">
+              <a:schemeClr val="accent1"/>
+            </a:effectRef>
+            <a:fontRef idx="minor">
+              <a:schemeClr val="lt1"/>
+            </a:fontRef>
+          </p:style>
+          <p:txBody>
+            <a:bodyPr rtlCol="0" anchor="ctr"/>
+            <a:lstStyle/>
+            <a:p>
+              <a:pPr algn="ctr"/>
+              <a:endParaRPr lang="en-US"/>
+            </a:p>
+          </p:txBody>
+        </p:sp>
+      </p:grpSp>
+      <p:sp>
+        <p:nvSpPr>
+          <p:cNvPr id="4" name="Rectangle 3">
+            <a:extLst>
+              <a:ext uri="{FF2B5EF4-FFF2-40B4-BE49-F238E27FC236}">
+                <a16:creationId xmlns:a16="http://schemas.microsoft.com/office/drawing/2014/main" id="{838BD938-B4A0-41EE-B65C-9541C1A77E86}"/>
+              </a:ext>
+            </a:extLst>
+          </p:cNvPr>
+          <p:cNvSpPr/>
+          <p:nvPr/>
+        </p:nvSpPr>
+        <p:spPr>
+          <a:xfrm>
+            <a:off x="1575583" y="4956806"/>
+            <a:ext cx="9394645" cy="459359"/>
+          </a:xfrm>
+          <a:prstGeom prst="rect">
+            <a:avLst/>
+          </a:prstGeom>
+          <a:solidFill>
+            <a:schemeClr val="bg2">
+              <a:lumMod val="75000"/>
+            </a:schemeClr>
+          </a:solidFill>
+        </p:spPr>
+        <p:style>
+          <a:lnRef idx="2">
+            <a:schemeClr val="accent1">
+              <a:shade val="50000"/>
+            </a:schemeClr>
+          </a:lnRef>
+          <a:fillRef idx="1">
+            <a:schemeClr val="accent1"/>
+          </a:fillRef>
+          <a:effectRef idx="0">
+            <a:schemeClr val="accent1"/>
+          </a:effectRef>
+          <a:fontRef idx="minor">
+            <a:schemeClr val="lt1"/>
+          </a:fontRef>
+        </p:style>
+        <p:txBody>
+          <a:bodyPr rtlCol="0" anchor="ctr"/>
+          <a:lstStyle/>
+          <a:p>
+            <a:pPr algn="ctr"/>
+            <a:endParaRPr lang="en-US"/>
+          </a:p>
+        </p:txBody>
+      </p:sp>
+      <p:grpSp>
+        <p:nvGrpSpPr>
+          <p:cNvPr id="25" name="Group 24">
+            <a:extLst>
+              <a:ext uri="{FF2B5EF4-FFF2-40B4-BE49-F238E27FC236}">
+                <a16:creationId xmlns:a16="http://schemas.microsoft.com/office/drawing/2014/main" id="{51648DE5-A5BB-4C39-9405-F7488B1B50F2}"/>
+              </a:ext>
+            </a:extLst>
+          </p:cNvPr>
+          <p:cNvGrpSpPr/>
+          <p:nvPr/>
+        </p:nvGrpSpPr>
+        <p:grpSpPr>
+          <a:xfrm>
+            <a:off x="3978668" y="1279148"/>
+            <a:ext cx="4741364" cy="3126162"/>
+            <a:chOff x="3978668" y="1279148"/>
+            <a:chExt cx="4741364" cy="3126162"/>
+          </a:xfrm>
+        </p:grpSpPr>
+        <p:sp>
+          <p:nvSpPr>
+            <p:cNvPr id="5" name="Rectangle 4">
+              <a:extLst>
+                <a:ext uri="{FF2B5EF4-FFF2-40B4-BE49-F238E27FC236}">
+                  <a16:creationId xmlns:a16="http://schemas.microsoft.com/office/drawing/2014/main" id="{688780F1-1052-47A5-B6A4-7E5259D65922}"/>
+                </a:ext>
+              </a:extLst>
+            </p:cNvPr>
+            <p:cNvSpPr/>
+            <p:nvPr/>
+          </p:nvSpPr>
+          <p:spPr>
+            <a:xfrm>
+              <a:off x="3978668" y="1281183"/>
+              <a:ext cx="4741364" cy="79185"/>
+            </a:xfrm>
+            <a:prstGeom prst="rect">
+              <a:avLst/>
+            </a:prstGeom>
+            <a:solidFill>
+              <a:schemeClr val="accent6">
+                <a:lumMod val="75000"/>
+              </a:schemeClr>
+            </a:solidFill>
+            <a:ln>
+              <a:noFill/>
+            </a:ln>
+          </p:spPr>
+          <p:style>
+            <a:lnRef idx="2">
+              <a:schemeClr val="accent1">
+                <a:shade val="50000"/>
+              </a:schemeClr>
+            </a:lnRef>
+            <a:fillRef idx="1">
+              <a:schemeClr val="accent1"/>
+            </a:fillRef>
+            <a:effectRef idx="0">
+              <a:schemeClr val="accent1"/>
+            </a:effectRef>
+            <a:fontRef idx="minor">
+              <a:schemeClr val="lt1"/>
+            </a:fontRef>
+          </p:style>
+          <p:txBody>
+            <a:bodyPr rtlCol="0" anchor="ctr"/>
+            <a:lstStyle/>
+            <a:p>
+              <a:pPr algn="ctr"/>
+              <a:endParaRPr lang="en-US"/>
+            </a:p>
+          </p:txBody>
+        </p:sp>
+        <p:sp>
+          <p:nvSpPr>
+            <p:cNvPr id="7" name="Rectangle 6">
+              <a:extLst>
+                <a:ext uri="{FF2B5EF4-FFF2-40B4-BE49-F238E27FC236}">
+                  <a16:creationId xmlns:a16="http://schemas.microsoft.com/office/drawing/2014/main" id="{97A002F6-D67A-4F06-A72D-5760B7D8DA04}"/>
+                </a:ext>
+              </a:extLst>
+            </p:cNvPr>
+            <p:cNvSpPr/>
+            <p:nvPr/>
+          </p:nvSpPr>
+          <p:spPr>
+            <a:xfrm>
+              <a:off x="4347243" y="1285772"/>
+              <a:ext cx="88575" cy="3119538"/>
+            </a:xfrm>
+            <a:prstGeom prst="rect">
+              <a:avLst/>
+            </a:prstGeom>
+            <a:solidFill>
+              <a:schemeClr val="accent6">
+                <a:lumMod val="75000"/>
+              </a:schemeClr>
+            </a:solidFill>
+            <a:ln>
+              <a:noFill/>
+            </a:ln>
+          </p:spPr>
+          <p:style>
+            <a:lnRef idx="2">
+              <a:schemeClr val="accent1">
+                <a:shade val="50000"/>
+              </a:schemeClr>
+            </a:lnRef>
+            <a:fillRef idx="1">
+              <a:schemeClr val="accent1"/>
+            </a:fillRef>
+            <a:effectRef idx="0">
+              <a:schemeClr val="accent1"/>
+            </a:effectRef>
+            <a:fontRef idx="minor">
+              <a:schemeClr val="lt1"/>
+            </a:fontRef>
+          </p:style>
+          <p:txBody>
+            <a:bodyPr rtlCol="0" anchor="ctr"/>
+            <a:lstStyle/>
+            <a:p>
+              <a:pPr algn="ctr"/>
+              <a:endParaRPr lang="en-US"/>
+            </a:p>
+          </p:txBody>
+        </p:sp>
+        <p:sp>
+          <p:nvSpPr>
+            <p:cNvPr id="8" name="Rectangle 7">
+              <a:extLst>
+                <a:ext uri="{FF2B5EF4-FFF2-40B4-BE49-F238E27FC236}">
+                  <a16:creationId xmlns:a16="http://schemas.microsoft.com/office/drawing/2014/main" id="{FC23F926-3A50-46D3-A595-864A630E178E}"/>
+                </a:ext>
+              </a:extLst>
+            </p:cNvPr>
+            <p:cNvSpPr/>
+            <p:nvPr/>
+          </p:nvSpPr>
+          <p:spPr>
+            <a:xfrm>
+              <a:off x="8223499" y="1279148"/>
+              <a:ext cx="88575" cy="3119538"/>
+            </a:xfrm>
+            <a:prstGeom prst="rect">
+              <a:avLst/>
+            </a:prstGeom>
+            <a:solidFill>
+              <a:schemeClr val="accent6">
+                <a:lumMod val="75000"/>
+              </a:schemeClr>
+            </a:solidFill>
+            <a:ln>
+              <a:noFill/>
+            </a:ln>
+          </p:spPr>
+          <p:style>
+            <a:lnRef idx="2">
+              <a:schemeClr val="accent1">
+                <a:shade val="50000"/>
+              </a:schemeClr>
+            </a:lnRef>
+            <a:fillRef idx="1">
+              <a:schemeClr val="accent1"/>
+            </a:fillRef>
+            <a:effectRef idx="0">
+              <a:schemeClr val="accent1"/>
+            </a:effectRef>
+            <a:fontRef idx="minor">
+              <a:schemeClr val="lt1"/>
+            </a:fontRef>
+          </p:style>
+          <p:txBody>
+            <a:bodyPr rtlCol="0" anchor="ctr"/>
+            <a:lstStyle/>
+            <a:p>
+              <a:pPr algn="ctr"/>
+              <a:endParaRPr lang="en-US"/>
+            </a:p>
+          </p:txBody>
+        </p:sp>
+      </p:grpSp>
+      <p:grpSp>
+        <p:nvGrpSpPr>
+          <p:cNvPr id="3" name="Group 2">
+            <a:extLst>
+              <a:ext uri="{FF2B5EF4-FFF2-40B4-BE49-F238E27FC236}">
+                <a16:creationId xmlns:a16="http://schemas.microsoft.com/office/drawing/2014/main" id="{6E2E15EA-378D-4E81-A32B-D8A363A3D27D}"/>
+              </a:ext>
+            </a:extLst>
+          </p:cNvPr>
+          <p:cNvGrpSpPr/>
+          <p:nvPr/>
+        </p:nvGrpSpPr>
+        <p:grpSpPr>
+          <a:xfrm>
+            <a:off x="4199123" y="4247013"/>
+            <a:ext cx="392924" cy="717021"/>
+            <a:chOff x="2623540" y="4247013"/>
+            <a:chExt cx="392924" cy="717021"/>
+          </a:xfrm>
+        </p:grpSpPr>
+        <p:sp>
+          <p:nvSpPr>
+            <p:cNvPr id="2" name="Oval 1">
+              <a:extLst>
+                <a:ext uri="{FF2B5EF4-FFF2-40B4-BE49-F238E27FC236}">
+                  <a16:creationId xmlns:a16="http://schemas.microsoft.com/office/drawing/2014/main" id="{4800B2FA-B0D4-475C-BB06-FD4C62FDD037}"/>
+                </a:ext>
+              </a:extLst>
+            </p:cNvPr>
+            <p:cNvSpPr/>
+            <p:nvPr/>
+          </p:nvSpPr>
+          <p:spPr>
+            <a:xfrm>
+              <a:off x="2623540" y="4592604"/>
+              <a:ext cx="392924" cy="371430"/>
+            </a:xfrm>
+            <a:prstGeom prst="ellipse">
+              <a:avLst/>
+            </a:prstGeom>
+            <a:solidFill>
+              <a:schemeClr val="tx1">
+                <a:lumMod val="95000"/>
+                <a:lumOff val="5000"/>
+              </a:schemeClr>
+            </a:solidFill>
+            <a:ln>
+              <a:noFill/>
+            </a:ln>
+          </p:spPr>
+          <p:style>
+            <a:lnRef idx="2">
+              <a:schemeClr val="accent1">
+                <a:shade val="50000"/>
+              </a:schemeClr>
+            </a:lnRef>
+            <a:fillRef idx="1">
+              <a:schemeClr val="accent1"/>
+            </a:fillRef>
+            <a:effectRef idx="0">
+              <a:schemeClr val="accent1"/>
+            </a:effectRef>
+            <a:fontRef idx="minor">
+              <a:schemeClr val="lt1"/>
+            </a:fontRef>
+          </p:style>
+          <p:txBody>
+            <a:bodyPr rtlCol="0" anchor="ctr"/>
+            <a:lstStyle/>
+            <a:p>
+              <a:pPr algn="ctr"/>
+              <a:endParaRPr lang="en-US"/>
+            </a:p>
+          </p:txBody>
+        </p:sp>
+        <p:sp>
+          <p:nvSpPr>
+            <p:cNvPr id="37" name="Rectangle 36">
+              <a:extLst>
+                <a:ext uri="{FF2B5EF4-FFF2-40B4-BE49-F238E27FC236}">
+                  <a16:creationId xmlns:a16="http://schemas.microsoft.com/office/drawing/2014/main" id="{AAF87F40-DDDD-4E8B-83AE-C1C18EC15F57}"/>
+                </a:ext>
+              </a:extLst>
+            </p:cNvPr>
+            <p:cNvSpPr/>
+            <p:nvPr/>
+          </p:nvSpPr>
+          <p:spPr>
+            <a:xfrm>
+              <a:off x="2728877" y="4247013"/>
+              <a:ext cx="179284" cy="541243"/>
+            </a:xfrm>
+            <a:prstGeom prst="rect">
+              <a:avLst/>
+            </a:prstGeom>
+            <a:solidFill>
+              <a:schemeClr val="accent4">
+                <a:lumMod val="60000"/>
+                <a:lumOff val="40000"/>
+              </a:schemeClr>
+            </a:solidFill>
+            <a:ln>
+              <a:noFill/>
+            </a:ln>
+          </p:spPr>
+          <p:style>
+            <a:lnRef idx="2">
+              <a:schemeClr val="accent1">
+                <a:shade val="50000"/>
+              </a:schemeClr>
+            </a:lnRef>
+            <a:fillRef idx="1">
+              <a:schemeClr val="accent1"/>
+            </a:fillRef>
+            <a:effectRef idx="0">
+              <a:schemeClr val="accent1"/>
+            </a:effectRef>
+            <a:fontRef idx="minor">
+              <a:schemeClr val="lt1"/>
+            </a:fontRef>
+          </p:style>
+          <p:txBody>
+            <a:bodyPr rtlCol="0" anchor="ctr"/>
+            <a:lstStyle/>
+            <a:p>
+              <a:pPr algn="ctr"/>
+              <a:endParaRPr lang="en-US"/>
+            </a:p>
+          </p:txBody>
+        </p:sp>
+      </p:grpSp>
+      <p:grpSp>
+        <p:nvGrpSpPr>
+          <p:cNvPr id="6" name="Group 5">
+            <a:extLst>
+              <a:ext uri="{FF2B5EF4-FFF2-40B4-BE49-F238E27FC236}">
+                <a16:creationId xmlns:a16="http://schemas.microsoft.com/office/drawing/2014/main" id="{3D01949F-82F4-4E1B-9970-C0227E6172A3}"/>
+              </a:ext>
+            </a:extLst>
+          </p:cNvPr>
+          <p:cNvGrpSpPr/>
+          <p:nvPr/>
+        </p:nvGrpSpPr>
+        <p:grpSpPr>
+          <a:xfrm>
+            <a:off x="8090289" y="4243399"/>
+            <a:ext cx="392924" cy="717021"/>
+            <a:chOff x="6514706" y="4243399"/>
+            <a:chExt cx="392924" cy="717021"/>
+          </a:xfrm>
+        </p:grpSpPr>
+        <p:sp>
+          <p:nvSpPr>
+            <p:cNvPr id="45" name="Oval 44">
+              <a:extLst>
+                <a:ext uri="{FF2B5EF4-FFF2-40B4-BE49-F238E27FC236}">
+                  <a16:creationId xmlns:a16="http://schemas.microsoft.com/office/drawing/2014/main" id="{D387244B-33A4-4244-B925-6BB270DBDB44}"/>
+                </a:ext>
+              </a:extLst>
+            </p:cNvPr>
+            <p:cNvSpPr/>
+            <p:nvPr/>
+          </p:nvSpPr>
+          <p:spPr>
+            <a:xfrm>
+              <a:off x="6514706" y="4588990"/>
+              <a:ext cx="392924" cy="371430"/>
+            </a:xfrm>
+            <a:prstGeom prst="ellipse">
+              <a:avLst/>
+            </a:prstGeom>
+            <a:solidFill>
+              <a:schemeClr val="tx1">
+                <a:lumMod val="95000"/>
+                <a:lumOff val="5000"/>
+              </a:schemeClr>
+            </a:solidFill>
+            <a:ln>
+              <a:noFill/>
+            </a:ln>
+          </p:spPr>
+          <p:style>
+            <a:lnRef idx="2">
+              <a:schemeClr val="accent1">
+                <a:shade val="50000"/>
+              </a:schemeClr>
+            </a:lnRef>
+            <a:fillRef idx="1">
+              <a:schemeClr val="accent1"/>
+            </a:fillRef>
+            <a:effectRef idx="0">
+              <a:schemeClr val="accent1"/>
+            </a:effectRef>
+            <a:fontRef idx="minor">
+              <a:schemeClr val="lt1"/>
+            </a:fontRef>
+          </p:style>
+          <p:txBody>
+            <a:bodyPr rtlCol="0" anchor="ctr"/>
+            <a:lstStyle/>
+            <a:p>
+              <a:pPr algn="ctr"/>
+              <a:endParaRPr lang="en-US"/>
+            </a:p>
+          </p:txBody>
+        </p:sp>
+        <p:sp>
+          <p:nvSpPr>
+            <p:cNvPr id="46" name="Rectangle 45">
+              <a:extLst>
+                <a:ext uri="{FF2B5EF4-FFF2-40B4-BE49-F238E27FC236}">
+                  <a16:creationId xmlns:a16="http://schemas.microsoft.com/office/drawing/2014/main" id="{028E1C00-9E1E-4D86-90D2-5DF6232A2661}"/>
+                </a:ext>
+              </a:extLst>
+            </p:cNvPr>
+            <p:cNvSpPr/>
+            <p:nvPr/>
+          </p:nvSpPr>
+          <p:spPr>
+            <a:xfrm>
+              <a:off x="6620043" y="4243399"/>
+              <a:ext cx="179284" cy="541243"/>
+            </a:xfrm>
+            <a:prstGeom prst="rect">
+              <a:avLst/>
+            </a:prstGeom>
+            <a:solidFill>
+              <a:schemeClr val="accent4">
+                <a:lumMod val="60000"/>
+                <a:lumOff val="40000"/>
+              </a:schemeClr>
+            </a:solidFill>
+            <a:ln>
+              <a:noFill/>
+            </a:ln>
+          </p:spPr>
+          <p:style>
+            <a:lnRef idx="2">
+              <a:schemeClr val="accent1">
+                <a:shade val="50000"/>
+              </a:schemeClr>
+            </a:lnRef>
+            <a:fillRef idx="1">
+              <a:schemeClr val="accent1"/>
+            </a:fillRef>
+            <a:effectRef idx="0">
+              <a:schemeClr val="accent1"/>
+            </a:effectRef>
+            <a:fontRef idx="minor">
+              <a:schemeClr val="lt1"/>
+            </a:fontRef>
+          </p:style>
+          <p:txBody>
+            <a:bodyPr rtlCol="0" anchor="ctr"/>
+            <a:lstStyle/>
+            <a:p>
+              <a:pPr algn="ctr"/>
+              <a:endParaRPr lang="en-US"/>
+            </a:p>
+          </p:txBody>
+        </p:sp>
+      </p:grpSp>
+      <p:grpSp>
+        <p:nvGrpSpPr>
+          <p:cNvPr id="21" name="Group 20">
+            <a:extLst>
+              <a:ext uri="{FF2B5EF4-FFF2-40B4-BE49-F238E27FC236}">
+                <a16:creationId xmlns:a16="http://schemas.microsoft.com/office/drawing/2014/main" id="{2CAD7F32-F12C-4B43-94BE-48E05AF13BDD}"/>
+              </a:ext>
+            </a:extLst>
+          </p:cNvPr>
+          <p:cNvGrpSpPr/>
+          <p:nvPr/>
+        </p:nvGrpSpPr>
+        <p:grpSpPr>
+          <a:xfrm>
+            <a:off x="4702625" y="3667365"/>
+            <a:ext cx="3079635" cy="1285643"/>
+            <a:chOff x="4702625" y="3667365"/>
+            <a:chExt cx="3079635" cy="1285643"/>
+          </a:xfrm>
+        </p:grpSpPr>
+        <p:sp>
+          <p:nvSpPr>
+            <p:cNvPr id="27" name="Rectangle 26">
+              <a:extLst>
+                <a:ext uri="{FF2B5EF4-FFF2-40B4-BE49-F238E27FC236}">
+                  <a16:creationId xmlns:a16="http://schemas.microsoft.com/office/drawing/2014/main" id="{55971AF5-CA3D-4EB4-9937-7AC238DBB59F}"/>
+                </a:ext>
+              </a:extLst>
+            </p:cNvPr>
+            <p:cNvSpPr/>
+            <p:nvPr/>
+          </p:nvSpPr>
+          <p:spPr>
+            <a:xfrm>
+              <a:off x="4904952" y="3667365"/>
+              <a:ext cx="2674980" cy="792433"/>
+            </a:xfrm>
+            <a:prstGeom prst="rect">
+              <a:avLst/>
+            </a:prstGeom>
+            <a:solidFill>
+              <a:schemeClr val="tx2">
+                <a:lumMod val="60000"/>
+                <a:lumOff val="40000"/>
+              </a:schemeClr>
+            </a:solidFill>
+            <a:ln>
+              <a:solidFill>
+                <a:schemeClr val="tx1"/>
+              </a:solidFill>
+            </a:ln>
+          </p:spPr>
+          <p:style>
+            <a:lnRef idx="2">
+              <a:schemeClr val="accent1">
+                <a:shade val="50000"/>
+              </a:schemeClr>
+            </a:lnRef>
+            <a:fillRef idx="1">
+              <a:schemeClr val="accent1"/>
+            </a:fillRef>
+            <a:effectRef idx="0">
+              <a:schemeClr val="accent1"/>
+            </a:effectRef>
+            <a:fontRef idx="minor">
+              <a:schemeClr val="lt1"/>
+            </a:fontRef>
+          </p:style>
+          <p:txBody>
+            <a:bodyPr rtlCol="0" anchor="ctr"/>
+            <a:lstStyle/>
+            <a:p>
+              <a:pPr algn="ctr"/>
+              <a:endParaRPr lang="en-US"/>
+            </a:p>
+          </p:txBody>
+        </p:sp>
+        <p:sp>
+          <p:nvSpPr>
+            <p:cNvPr id="28" name="Rectangle 27">
+              <a:extLst>
+                <a:ext uri="{FF2B5EF4-FFF2-40B4-BE49-F238E27FC236}">
+                  <a16:creationId xmlns:a16="http://schemas.microsoft.com/office/drawing/2014/main" id="{AC649FF6-64E8-42B2-887D-07BCB86A49F5}"/>
+                </a:ext>
+              </a:extLst>
+            </p:cNvPr>
+            <p:cNvSpPr/>
+            <p:nvPr/>
+          </p:nvSpPr>
+          <p:spPr>
+            <a:xfrm>
+              <a:off x="4702625" y="4471769"/>
+              <a:ext cx="3079635" cy="172457"/>
+            </a:xfrm>
+            <a:prstGeom prst="rect">
+              <a:avLst/>
+            </a:prstGeom>
+            <a:solidFill>
+              <a:schemeClr val="bg1">
+                <a:lumMod val="50000"/>
+              </a:schemeClr>
+            </a:solidFill>
+            <a:ln>
+              <a:solidFill>
+                <a:schemeClr val="tx1"/>
+              </a:solidFill>
+            </a:ln>
+          </p:spPr>
+          <p:style>
+            <a:lnRef idx="2">
+              <a:schemeClr val="accent1">
+                <a:shade val="50000"/>
+              </a:schemeClr>
+            </a:lnRef>
+            <a:fillRef idx="1">
+              <a:schemeClr val="accent1"/>
+            </a:fillRef>
+            <a:effectRef idx="0">
+              <a:schemeClr val="accent1"/>
+            </a:effectRef>
+            <a:fontRef idx="minor">
+              <a:schemeClr val="lt1"/>
+            </a:fontRef>
+          </p:style>
+          <p:txBody>
+            <a:bodyPr rtlCol="0" anchor="ctr"/>
+            <a:lstStyle/>
+            <a:p>
+              <a:pPr algn="ctr"/>
+              <a:endParaRPr lang="en-US"/>
+            </a:p>
+          </p:txBody>
+        </p:sp>
+        <p:sp>
+          <p:nvSpPr>
+            <p:cNvPr id="43" name="Oval 42">
+              <a:extLst>
+                <a:ext uri="{FF2B5EF4-FFF2-40B4-BE49-F238E27FC236}">
+                  <a16:creationId xmlns:a16="http://schemas.microsoft.com/office/drawing/2014/main" id="{5067AA66-4C85-4AB4-9EF5-5BD0E167FFB4}"/>
+                </a:ext>
+              </a:extLst>
+            </p:cNvPr>
+            <p:cNvSpPr/>
+            <p:nvPr/>
+          </p:nvSpPr>
+          <p:spPr>
+            <a:xfrm>
+              <a:off x="4876820" y="4646041"/>
+              <a:ext cx="324731" cy="306967"/>
+            </a:xfrm>
+            <a:prstGeom prst="ellipse">
+              <a:avLst/>
+            </a:prstGeom>
+            <a:solidFill>
+              <a:schemeClr val="tx1">
+                <a:lumMod val="95000"/>
+                <a:lumOff val="5000"/>
+              </a:schemeClr>
+            </a:solidFill>
+            <a:ln>
+              <a:noFill/>
+            </a:ln>
+          </p:spPr>
+          <p:style>
+            <a:lnRef idx="2">
+              <a:schemeClr val="accent1">
+                <a:shade val="50000"/>
+              </a:schemeClr>
+            </a:lnRef>
+            <a:fillRef idx="1">
+              <a:schemeClr val="accent1"/>
+            </a:fillRef>
+            <a:effectRef idx="0">
+              <a:schemeClr val="accent1"/>
+            </a:effectRef>
+            <a:fontRef idx="minor">
+              <a:schemeClr val="lt1"/>
+            </a:fontRef>
+          </p:style>
+          <p:txBody>
+            <a:bodyPr rtlCol="0" anchor="ctr"/>
+            <a:lstStyle/>
+            <a:p>
+              <a:pPr algn="ctr"/>
+              <a:endParaRPr lang="en-US"/>
+            </a:p>
+          </p:txBody>
+        </p:sp>
+        <p:sp>
+          <p:nvSpPr>
+            <p:cNvPr id="47" name="Oval 46">
+              <a:extLst>
+                <a:ext uri="{FF2B5EF4-FFF2-40B4-BE49-F238E27FC236}">
+                  <a16:creationId xmlns:a16="http://schemas.microsoft.com/office/drawing/2014/main" id="{5522D644-92B5-4C08-91A9-25407BF79AF7}"/>
+                </a:ext>
+              </a:extLst>
+            </p:cNvPr>
+            <p:cNvSpPr/>
+            <p:nvPr/>
+          </p:nvSpPr>
+          <p:spPr>
+            <a:xfrm>
+              <a:off x="7210116" y="4646040"/>
+              <a:ext cx="324731" cy="306967"/>
+            </a:xfrm>
+            <a:prstGeom prst="ellipse">
+              <a:avLst/>
+            </a:prstGeom>
+            <a:solidFill>
+              <a:schemeClr val="tx1">
+                <a:lumMod val="95000"/>
+                <a:lumOff val="5000"/>
+              </a:schemeClr>
+            </a:solidFill>
+            <a:ln>
+              <a:noFill/>
+            </a:ln>
+          </p:spPr>
+          <p:style>
+            <a:lnRef idx="2">
+              <a:schemeClr val="accent1">
+                <a:shade val="50000"/>
+              </a:schemeClr>
+            </a:lnRef>
+            <a:fillRef idx="1">
+              <a:schemeClr val="accent1"/>
+            </a:fillRef>
+            <a:effectRef idx="0">
+              <a:schemeClr val="accent1"/>
+            </a:effectRef>
+            <a:fontRef idx="minor">
+              <a:schemeClr val="lt1"/>
+            </a:fontRef>
+          </p:style>
+          <p:txBody>
+            <a:bodyPr rtlCol="0" anchor="ctr"/>
+            <a:lstStyle/>
+            <a:p>
+              <a:pPr algn="ctr"/>
+              <a:endParaRPr lang="en-US"/>
+            </a:p>
+          </p:txBody>
+        </p:sp>
+        <p:sp>
+          <p:nvSpPr>
+            <p:cNvPr id="48" name="Oval 47">
+              <a:extLst>
+                <a:ext uri="{FF2B5EF4-FFF2-40B4-BE49-F238E27FC236}">
+                  <a16:creationId xmlns:a16="http://schemas.microsoft.com/office/drawing/2014/main" id="{A5D7FB99-2248-4EC9-A1D1-76E84F65AF73}"/>
+                </a:ext>
+              </a:extLst>
+            </p:cNvPr>
+            <p:cNvSpPr/>
+            <p:nvPr/>
+          </p:nvSpPr>
+          <p:spPr>
+            <a:xfrm>
+              <a:off x="6043468" y="4646039"/>
+              <a:ext cx="324731" cy="306967"/>
+            </a:xfrm>
+            <a:prstGeom prst="ellipse">
+              <a:avLst/>
+            </a:prstGeom>
+            <a:solidFill>
+              <a:schemeClr val="tx1">
+                <a:lumMod val="95000"/>
+                <a:lumOff val="5000"/>
+              </a:schemeClr>
+            </a:solidFill>
+            <a:ln>
+              <a:noFill/>
+            </a:ln>
+          </p:spPr>
+          <p:style>
+            <a:lnRef idx="2">
+              <a:schemeClr val="accent1">
+                <a:shade val="50000"/>
+              </a:schemeClr>
+            </a:lnRef>
+            <a:fillRef idx="1">
+              <a:schemeClr val="accent1"/>
+            </a:fillRef>
+            <a:effectRef idx="0">
+              <a:schemeClr val="accent1"/>
+            </a:effectRef>
+            <a:fontRef idx="minor">
+              <a:schemeClr val="lt1"/>
+            </a:fontRef>
+          </p:style>
+          <p:txBody>
+            <a:bodyPr rtlCol="0" anchor="ctr"/>
+            <a:lstStyle/>
+            <a:p>
+              <a:pPr algn="ctr"/>
+              <a:endParaRPr lang="en-US"/>
+            </a:p>
+          </p:txBody>
+        </p:sp>
+      </p:grpSp>
+      <p:grpSp>
+        <p:nvGrpSpPr>
+          <p:cNvPr id="65" name="Group 64">
+            <a:extLst>
+              <a:ext uri="{FF2B5EF4-FFF2-40B4-BE49-F238E27FC236}">
+                <a16:creationId xmlns:a16="http://schemas.microsoft.com/office/drawing/2014/main" id="{03CCF79F-FE7B-4C9E-9B91-5400726DA538}"/>
+              </a:ext>
+            </a:extLst>
+          </p:cNvPr>
+          <p:cNvGrpSpPr/>
+          <p:nvPr/>
+        </p:nvGrpSpPr>
+        <p:grpSpPr>
+          <a:xfrm>
+            <a:off x="4863972" y="1361264"/>
+            <a:ext cx="2949100" cy="801110"/>
+            <a:chOff x="4863972" y="1361264"/>
+            <a:chExt cx="2949100" cy="801110"/>
+          </a:xfrm>
+        </p:grpSpPr>
+        <p:sp>
+          <p:nvSpPr>
+            <p:cNvPr id="9" name="Rectangle 8">
+              <a:extLst>
+                <a:ext uri="{FF2B5EF4-FFF2-40B4-BE49-F238E27FC236}">
+                  <a16:creationId xmlns:a16="http://schemas.microsoft.com/office/drawing/2014/main" id="{9C45EFD0-FD10-47B9-9C0E-43C2A3C2083E}"/>
+                </a:ext>
+              </a:extLst>
+            </p:cNvPr>
+            <p:cNvSpPr/>
+            <p:nvPr/>
+          </p:nvSpPr>
+          <p:spPr>
+            <a:xfrm>
+              <a:off x="4863972" y="1361264"/>
+              <a:ext cx="2942473" cy="156779"/>
+            </a:xfrm>
+            <a:prstGeom prst="rect">
+              <a:avLst/>
+            </a:prstGeom>
+            <a:ln>
+              <a:solidFill>
+                <a:schemeClr val="tx1"/>
+              </a:solidFill>
+            </a:ln>
+          </p:spPr>
+          <p:style>
+            <a:lnRef idx="2">
+              <a:schemeClr val="accent1">
+                <a:shade val="50000"/>
+              </a:schemeClr>
+            </a:lnRef>
+            <a:fillRef idx="1">
+              <a:schemeClr val="accent1"/>
+            </a:fillRef>
+            <a:effectRef idx="0">
+              <a:schemeClr val="accent1"/>
+            </a:effectRef>
+            <a:fontRef idx="minor">
+              <a:schemeClr val="lt1"/>
+            </a:fontRef>
+          </p:style>
+          <p:txBody>
+            <a:bodyPr rtlCol="0" anchor="ctr"/>
+            <a:lstStyle/>
+            <a:p>
+              <a:pPr algn="ctr"/>
+              <a:endParaRPr lang="en-US"/>
+            </a:p>
+          </p:txBody>
+        </p:sp>
+        <p:sp>
+          <p:nvSpPr>
+            <p:cNvPr id="10" name="Rectangle 9">
+              <a:extLst>
+                <a:ext uri="{FF2B5EF4-FFF2-40B4-BE49-F238E27FC236}">
+                  <a16:creationId xmlns:a16="http://schemas.microsoft.com/office/drawing/2014/main" id="{EC2B24F8-EA91-45CC-B37C-DBA88FF9CEDC}"/>
+                </a:ext>
+              </a:extLst>
+            </p:cNvPr>
+            <p:cNvSpPr/>
+            <p:nvPr/>
+          </p:nvSpPr>
+          <p:spPr>
+            <a:xfrm>
+              <a:off x="4870599" y="2101929"/>
+              <a:ext cx="2942473" cy="60445"/>
+            </a:xfrm>
+            <a:prstGeom prst="rect">
+              <a:avLst/>
+            </a:prstGeom>
+            <a:solidFill>
+              <a:schemeClr val="accent2">
+                <a:lumMod val="75000"/>
+              </a:schemeClr>
+            </a:solidFill>
+            <a:ln>
+              <a:solidFill>
+                <a:schemeClr val="tx1">
+                  <a:lumMod val="95000"/>
+                  <a:lumOff val="5000"/>
+                </a:schemeClr>
+              </a:solidFill>
+            </a:ln>
+          </p:spPr>
+          <p:style>
+            <a:lnRef idx="2">
+              <a:schemeClr val="accent1">
+                <a:shade val="50000"/>
+              </a:schemeClr>
+            </a:lnRef>
+            <a:fillRef idx="1">
+              <a:schemeClr val="accent1"/>
+            </a:fillRef>
+            <a:effectRef idx="0">
+              <a:schemeClr val="accent1"/>
+            </a:effectRef>
+            <a:fontRef idx="minor">
+              <a:schemeClr val="lt1"/>
+            </a:fontRef>
+          </p:style>
+          <p:txBody>
+            <a:bodyPr rtlCol="0" anchor="ctr"/>
+            <a:lstStyle/>
+            <a:p>
+              <a:pPr algn="ctr"/>
+              <a:endParaRPr lang="en-US"/>
+            </a:p>
+          </p:txBody>
+        </p:sp>
+        <p:cxnSp>
+          <p:nvCxnSpPr>
+            <p:cNvPr id="15" name="Straight Connector 14">
+              <a:extLst>
+                <a:ext uri="{FF2B5EF4-FFF2-40B4-BE49-F238E27FC236}">
+                  <a16:creationId xmlns:a16="http://schemas.microsoft.com/office/drawing/2014/main" id="{A4B88B25-1654-4DA8-8C98-6395FDC86AD6}"/>
+                </a:ext>
+              </a:extLst>
+            </p:cNvPr>
+            <p:cNvCxnSpPr>
+              <a:cxnSpLocks/>
+            </p:cNvCxnSpPr>
+            <p:nvPr/>
+          </p:nvCxnSpPr>
+          <p:spPr>
+            <a:xfrm flipV="1">
+              <a:off x="5105445" y="1525534"/>
+              <a:ext cx="0" cy="464492"/>
+            </a:xfrm>
+            <a:prstGeom prst="line">
+              <a:avLst/>
+            </a:prstGeom>
+            <a:ln>
+              <a:solidFill>
+                <a:schemeClr val="tx1"/>
+              </a:solidFill>
+            </a:ln>
+          </p:spPr>
+          <p:style>
+            <a:lnRef idx="1">
+              <a:schemeClr val="accent1"/>
+            </a:lnRef>
+            <a:fillRef idx="0">
+              <a:schemeClr val="accent1"/>
+            </a:fillRef>
+            <a:effectRef idx="0">
+              <a:schemeClr val="accent1"/>
+            </a:effectRef>
+            <a:fontRef idx="minor">
+              <a:schemeClr val="tx1"/>
+            </a:fontRef>
+          </p:style>
+        </p:cxnSp>
+        <p:cxnSp>
+          <p:nvCxnSpPr>
+            <p:cNvPr id="16" name="Straight Connector 15">
+              <a:extLst>
+                <a:ext uri="{FF2B5EF4-FFF2-40B4-BE49-F238E27FC236}">
+                  <a16:creationId xmlns:a16="http://schemas.microsoft.com/office/drawing/2014/main" id="{30511FE9-6BD3-413D-AE5B-BB40DCF3279B}"/>
+                </a:ext>
+              </a:extLst>
+            </p:cNvPr>
+            <p:cNvCxnSpPr/>
+            <p:nvPr/>
+          </p:nvCxnSpPr>
+          <p:spPr>
+            <a:xfrm flipV="1">
+              <a:off x="6031930" y="1529339"/>
+              <a:ext cx="0" cy="464492"/>
+            </a:xfrm>
+            <a:prstGeom prst="line">
+              <a:avLst/>
+            </a:prstGeom>
+            <a:ln>
+              <a:solidFill>
+                <a:schemeClr val="tx1"/>
+              </a:solidFill>
+            </a:ln>
+          </p:spPr>
+          <p:style>
+            <a:lnRef idx="1">
+              <a:schemeClr val="accent1"/>
+            </a:lnRef>
+            <a:fillRef idx="0">
+              <a:schemeClr val="accent1"/>
+            </a:fillRef>
+            <a:effectRef idx="0">
+              <a:schemeClr val="accent1"/>
+            </a:effectRef>
+            <a:fontRef idx="minor">
+              <a:schemeClr val="tx1"/>
+            </a:fontRef>
+          </p:style>
+        </p:cxnSp>
+        <p:cxnSp>
+          <p:nvCxnSpPr>
+            <p:cNvPr id="36" name="Straight Connector 35">
+              <a:extLst>
+                <a:ext uri="{FF2B5EF4-FFF2-40B4-BE49-F238E27FC236}">
+                  <a16:creationId xmlns:a16="http://schemas.microsoft.com/office/drawing/2014/main" id="{85DAADFA-E93C-4CAC-8E58-D7EDFE4C8C18}"/>
+                </a:ext>
+              </a:extLst>
+            </p:cNvPr>
+            <p:cNvCxnSpPr/>
+            <p:nvPr/>
+          </p:nvCxnSpPr>
+          <p:spPr>
+            <a:xfrm flipV="1">
+              <a:off x="6519417" y="1518043"/>
+              <a:ext cx="0" cy="464492"/>
+            </a:xfrm>
+            <a:prstGeom prst="line">
+              <a:avLst/>
+            </a:prstGeom>
+            <a:ln>
+              <a:solidFill>
+                <a:schemeClr val="tx1"/>
+              </a:solidFill>
+            </a:ln>
+          </p:spPr>
+          <p:style>
+            <a:lnRef idx="1">
+              <a:schemeClr val="accent1"/>
+            </a:lnRef>
+            <a:fillRef idx="0">
+              <a:schemeClr val="accent1"/>
+            </a:fillRef>
+            <a:effectRef idx="0">
+              <a:schemeClr val="accent1"/>
+            </a:effectRef>
+            <a:fontRef idx="minor">
+              <a:schemeClr val="tx1"/>
+            </a:fontRef>
+          </p:style>
+        </p:cxnSp>
+        <p:cxnSp>
+          <p:nvCxnSpPr>
+            <p:cNvPr id="42" name="Straight Connector 41">
+              <a:extLst>
+                <a:ext uri="{FF2B5EF4-FFF2-40B4-BE49-F238E27FC236}">
+                  <a16:creationId xmlns:a16="http://schemas.microsoft.com/office/drawing/2014/main" id="{4DC4086A-EDDE-444D-8024-278381B48853}"/>
+                </a:ext>
+              </a:extLst>
+            </p:cNvPr>
+            <p:cNvCxnSpPr/>
+            <p:nvPr/>
+          </p:nvCxnSpPr>
+          <p:spPr>
+            <a:xfrm flipV="1">
+              <a:off x="7433430" y="1529339"/>
+              <a:ext cx="0" cy="464492"/>
+            </a:xfrm>
+            <a:prstGeom prst="line">
+              <a:avLst/>
+            </a:prstGeom>
+            <a:ln>
+              <a:solidFill>
+                <a:schemeClr val="tx1"/>
+              </a:solidFill>
+            </a:ln>
+          </p:spPr>
+          <p:style>
+            <a:lnRef idx="1">
+              <a:schemeClr val="accent1"/>
+            </a:lnRef>
+            <a:fillRef idx="0">
+              <a:schemeClr val="accent1"/>
+            </a:fillRef>
+            <a:effectRef idx="0">
+              <a:schemeClr val="accent1"/>
+            </a:effectRef>
+            <a:fontRef idx="minor">
+              <a:schemeClr val="tx1"/>
+            </a:fontRef>
+          </p:style>
+        </p:cxnSp>
+        <p:cxnSp>
+          <p:nvCxnSpPr>
+            <p:cNvPr id="49" name="Straight Connector 48">
+              <a:extLst>
+                <a:ext uri="{FF2B5EF4-FFF2-40B4-BE49-F238E27FC236}">
+                  <a16:creationId xmlns:a16="http://schemas.microsoft.com/office/drawing/2014/main" id="{9AAFF847-E1C7-4D51-8022-E82B71E84CD7}"/>
+                </a:ext>
+              </a:extLst>
+            </p:cNvPr>
+            <p:cNvCxnSpPr/>
+            <p:nvPr/>
+          </p:nvCxnSpPr>
+          <p:spPr>
+            <a:xfrm flipV="1">
+              <a:off x="6086565" y="1518043"/>
+              <a:ext cx="0" cy="464492"/>
+            </a:xfrm>
+            <a:prstGeom prst="line">
+              <a:avLst/>
+            </a:prstGeom>
+            <a:ln>
+              <a:solidFill>
+                <a:schemeClr val="tx1"/>
+              </a:solidFill>
+            </a:ln>
+          </p:spPr>
+          <p:style>
+            <a:lnRef idx="1">
+              <a:schemeClr val="accent1"/>
+            </a:lnRef>
+            <a:fillRef idx="0">
+              <a:schemeClr val="accent1"/>
+            </a:fillRef>
+            <a:effectRef idx="0">
+              <a:schemeClr val="accent1"/>
+            </a:effectRef>
+            <a:fontRef idx="minor">
+              <a:schemeClr val="tx1"/>
+            </a:fontRef>
+          </p:style>
+        </p:cxnSp>
+        <p:cxnSp>
+          <p:nvCxnSpPr>
+            <p:cNvPr id="50" name="Straight Connector 49">
+              <a:extLst>
+                <a:ext uri="{FF2B5EF4-FFF2-40B4-BE49-F238E27FC236}">
+                  <a16:creationId xmlns:a16="http://schemas.microsoft.com/office/drawing/2014/main" id="{4287A2D9-F07F-40EA-B0CC-37B15DEEA720}"/>
+                </a:ext>
+              </a:extLst>
+            </p:cNvPr>
+            <p:cNvCxnSpPr/>
+            <p:nvPr/>
+          </p:nvCxnSpPr>
+          <p:spPr>
+            <a:xfrm flipV="1">
+              <a:off x="6565801" y="1525534"/>
+              <a:ext cx="0" cy="464492"/>
+            </a:xfrm>
+            <a:prstGeom prst="line">
+              <a:avLst/>
+            </a:prstGeom>
+            <a:ln>
+              <a:solidFill>
+                <a:schemeClr val="tx1"/>
+              </a:solidFill>
+            </a:ln>
+          </p:spPr>
+          <p:style>
+            <a:lnRef idx="1">
+              <a:schemeClr val="accent1"/>
+            </a:lnRef>
+            <a:fillRef idx="0">
+              <a:schemeClr val="accent1"/>
+            </a:fillRef>
+            <a:effectRef idx="0">
+              <a:schemeClr val="accent1"/>
+            </a:effectRef>
+            <a:fontRef idx="minor">
+              <a:schemeClr val="tx1"/>
+            </a:fontRef>
+          </p:style>
+        </p:cxnSp>
+        <p:cxnSp>
+          <p:nvCxnSpPr>
+            <p:cNvPr id="51" name="Straight Connector 50">
+              <a:extLst>
+                <a:ext uri="{FF2B5EF4-FFF2-40B4-BE49-F238E27FC236}">
+                  <a16:creationId xmlns:a16="http://schemas.microsoft.com/office/drawing/2014/main" id="{41DB5479-4EAC-4257-9096-704FB28D847A}"/>
+                </a:ext>
+              </a:extLst>
+            </p:cNvPr>
+            <p:cNvCxnSpPr/>
+            <p:nvPr/>
+          </p:nvCxnSpPr>
+          <p:spPr>
+            <a:xfrm flipV="1">
+              <a:off x="7482225" y="1525534"/>
+              <a:ext cx="0" cy="464492"/>
+            </a:xfrm>
+            <a:prstGeom prst="line">
+              <a:avLst/>
+            </a:prstGeom>
+            <a:ln>
+              <a:solidFill>
+                <a:schemeClr val="tx1"/>
+              </a:solidFill>
+            </a:ln>
+          </p:spPr>
+          <p:style>
+            <a:lnRef idx="1">
+              <a:schemeClr val="accent1"/>
+            </a:lnRef>
+            <a:fillRef idx="0">
+              <a:schemeClr val="accent1"/>
+            </a:fillRef>
+            <a:effectRef idx="0">
+              <a:schemeClr val="accent1"/>
+            </a:effectRef>
+            <a:fontRef idx="minor">
+              <a:schemeClr val="tx1"/>
+            </a:fontRef>
+          </p:style>
+        </p:cxnSp>
+        <p:cxnSp>
+          <p:nvCxnSpPr>
+            <p:cNvPr id="52" name="Straight Connector 51">
+              <a:extLst>
+                <a:ext uri="{FF2B5EF4-FFF2-40B4-BE49-F238E27FC236}">
+                  <a16:creationId xmlns:a16="http://schemas.microsoft.com/office/drawing/2014/main" id="{85AA99A4-8C70-4CED-A09A-2D4D919D90D3}"/>
+                </a:ext>
+              </a:extLst>
+            </p:cNvPr>
+            <p:cNvCxnSpPr>
+              <a:cxnSpLocks/>
+            </p:cNvCxnSpPr>
+            <p:nvPr/>
+          </p:nvCxnSpPr>
+          <p:spPr>
+            <a:xfrm flipV="1">
+              <a:off x="5148543" y="1525534"/>
+              <a:ext cx="0" cy="464492"/>
+            </a:xfrm>
+            <a:prstGeom prst="line">
+              <a:avLst/>
+            </a:prstGeom>
+            <a:ln>
+              <a:solidFill>
+                <a:schemeClr val="tx1"/>
+              </a:solidFill>
+            </a:ln>
+          </p:spPr>
+          <p:style>
+            <a:lnRef idx="1">
+              <a:schemeClr val="accent1"/>
+            </a:lnRef>
+            <a:fillRef idx="0">
+              <a:schemeClr val="accent1"/>
+            </a:fillRef>
+            <a:effectRef idx="0">
+              <a:schemeClr val="accent1"/>
+            </a:effectRef>
+            <a:fontRef idx="minor">
+              <a:schemeClr val="tx1"/>
+            </a:fontRef>
+          </p:style>
+        </p:cxnSp>
+        <p:sp>
+          <p:nvSpPr>
+            <p:cNvPr id="11" name="Rectangle 10">
+              <a:extLst>
+                <a:ext uri="{FF2B5EF4-FFF2-40B4-BE49-F238E27FC236}">
+                  <a16:creationId xmlns:a16="http://schemas.microsoft.com/office/drawing/2014/main" id="{A87FEA2E-A3CA-46C3-9A49-154DA8409D17}"/>
+                </a:ext>
+              </a:extLst>
+            </p:cNvPr>
+            <p:cNvSpPr/>
+            <p:nvPr/>
+          </p:nvSpPr>
+          <p:spPr>
+            <a:xfrm>
+              <a:off x="5004345" y="1984139"/>
+              <a:ext cx="2674980" cy="117790"/>
+            </a:xfrm>
+            <a:prstGeom prst="rect">
+              <a:avLst/>
+            </a:prstGeom>
+            <a:solidFill>
+              <a:schemeClr val="accent2">
+                <a:lumMod val="75000"/>
+              </a:schemeClr>
+            </a:solidFill>
+            <a:ln>
+              <a:solidFill>
+                <a:schemeClr val="tx1"/>
+              </a:solidFill>
+            </a:ln>
+          </p:spPr>
+          <p:style>
+            <a:lnRef idx="2">
+              <a:schemeClr val="accent1">
+                <a:shade val="50000"/>
+              </a:schemeClr>
+            </a:lnRef>
+            <a:fillRef idx="1">
+              <a:schemeClr val="accent1"/>
+            </a:fillRef>
+            <a:effectRef idx="0">
+              <a:schemeClr val="accent1"/>
+            </a:effectRef>
+            <a:fontRef idx="minor">
+              <a:schemeClr val="lt1"/>
+            </a:fontRef>
+          </p:style>
+          <p:txBody>
+            <a:bodyPr rtlCol="0" anchor="ctr"/>
+            <a:lstStyle/>
+            <a:p>
+              <a:pPr algn="ctr"/>
+              <a:endParaRPr lang="en-US"/>
+            </a:p>
+          </p:txBody>
+        </p:sp>
+      </p:grpSp>
+      <p:grpSp>
+        <p:nvGrpSpPr>
+          <p:cNvPr id="66" name="Group 65">
+            <a:extLst>
+              <a:ext uri="{FF2B5EF4-FFF2-40B4-BE49-F238E27FC236}">
+                <a16:creationId xmlns:a16="http://schemas.microsoft.com/office/drawing/2014/main" id="{045C68E4-572E-4FDB-94E1-8E407E65E2E4}"/>
+              </a:ext>
+            </a:extLst>
+          </p:cNvPr>
+          <p:cNvGrpSpPr/>
+          <p:nvPr/>
+        </p:nvGrpSpPr>
+        <p:grpSpPr>
+          <a:xfrm>
+            <a:off x="5614133" y="530346"/>
+            <a:ext cx="835551" cy="936172"/>
+            <a:chOff x="6953376" y="122512"/>
+            <a:chExt cx="835551" cy="936172"/>
+          </a:xfrm>
+        </p:grpSpPr>
+        <p:grpSp>
+          <p:nvGrpSpPr>
+            <p:cNvPr id="67" name="Group 66">
+              <a:extLst>
+                <a:ext uri="{FF2B5EF4-FFF2-40B4-BE49-F238E27FC236}">
+                  <a16:creationId xmlns:a16="http://schemas.microsoft.com/office/drawing/2014/main" id="{B425E9CC-5A1F-4CBB-9C1D-00748E04908F}"/>
+                </a:ext>
+              </a:extLst>
+            </p:cNvPr>
+            <p:cNvGrpSpPr/>
+            <p:nvPr/>
+          </p:nvGrpSpPr>
+          <p:grpSpPr>
+            <a:xfrm>
+              <a:off x="7074131" y="446069"/>
+              <a:ext cx="590843" cy="612615"/>
+              <a:chOff x="8862646" y="323557"/>
+              <a:chExt cx="590843" cy="612615"/>
+            </a:xfrm>
+          </p:grpSpPr>
+          <p:cxnSp>
+            <p:nvCxnSpPr>
+              <p:cNvPr id="70" name="Straight Arrow Connector 69">
+                <a:extLst>
+                  <a:ext uri="{FF2B5EF4-FFF2-40B4-BE49-F238E27FC236}">
+                    <a16:creationId xmlns:a16="http://schemas.microsoft.com/office/drawing/2014/main" id="{2227EFA8-7E54-4632-885E-B3A66AA5F505}"/>
+                  </a:ext>
+                </a:extLst>
+              </p:cNvPr>
+              <p:cNvCxnSpPr>
+                <a:cxnSpLocks/>
+              </p:cNvCxnSpPr>
+              <p:nvPr/>
+            </p:nvCxnSpPr>
+            <p:spPr>
+              <a:xfrm flipH="1">
+                <a:off x="8862646" y="928468"/>
+                <a:ext cx="590843" cy="0"/>
+              </a:xfrm>
+              <a:prstGeom prst="straightConnector1">
+                <a:avLst/>
+              </a:prstGeom>
+              <a:ln w="41275">
+                <a:solidFill>
+                  <a:schemeClr val="tx1"/>
+                </a:solidFill>
+                <a:tailEnd type="triangle"/>
+              </a:ln>
+            </p:spPr>
+            <p:style>
+              <a:lnRef idx="1">
+                <a:schemeClr val="accent1"/>
+              </a:lnRef>
+              <a:fillRef idx="0">
+                <a:schemeClr val="accent1"/>
+              </a:fillRef>
+              <a:effectRef idx="0">
+                <a:schemeClr val="accent1"/>
+              </a:effectRef>
+              <a:fontRef idx="minor">
+                <a:schemeClr val="tx1"/>
+              </a:fontRef>
+            </p:style>
+          </p:cxnSp>
+          <p:cxnSp>
+            <p:nvCxnSpPr>
+              <p:cNvPr id="71" name="Straight Arrow Connector 70">
+                <a:extLst>
+                  <a:ext uri="{FF2B5EF4-FFF2-40B4-BE49-F238E27FC236}">
+                    <a16:creationId xmlns:a16="http://schemas.microsoft.com/office/drawing/2014/main" id="{22AF88DE-A5E2-4CAC-AC19-0EC0E551C754}"/>
+                  </a:ext>
+                </a:extLst>
+              </p:cNvPr>
+              <p:cNvCxnSpPr>
+                <a:cxnSpLocks/>
+              </p:cNvCxnSpPr>
+              <p:nvPr/>
+            </p:nvCxnSpPr>
+            <p:spPr>
+              <a:xfrm flipH="1" flipV="1">
+                <a:off x="9439423" y="323557"/>
+                <a:ext cx="1" cy="612615"/>
+              </a:xfrm>
+              <a:prstGeom prst="straightConnector1">
+                <a:avLst/>
+              </a:prstGeom>
+              <a:ln w="41275">
+                <a:solidFill>
+                  <a:schemeClr val="tx1"/>
+                </a:solidFill>
+                <a:tailEnd type="triangle"/>
+              </a:ln>
+            </p:spPr>
+            <p:style>
+              <a:lnRef idx="1">
+                <a:schemeClr val="accent1"/>
+              </a:lnRef>
+              <a:fillRef idx="0">
+                <a:schemeClr val="accent1"/>
+              </a:fillRef>
+              <a:effectRef idx="0">
+                <a:schemeClr val="accent1"/>
+              </a:effectRef>
+              <a:fontRef idx="minor">
+                <a:schemeClr val="tx1"/>
+              </a:fontRef>
+            </p:style>
+          </p:cxnSp>
+        </p:grpSp>
+        <p:sp>
+          <p:nvSpPr>
+            <p:cNvPr id="68" name="TextBox 67">
+              <a:extLst>
+                <a:ext uri="{FF2B5EF4-FFF2-40B4-BE49-F238E27FC236}">
+                  <a16:creationId xmlns:a16="http://schemas.microsoft.com/office/drawing/2014/main" id="{B3E1B8BF-0930-4EAB-8A1C-3CD20080374F}"/>
+                </a:ext>
+              </a:extLst>
+            </p:cNvPr>
+            <p:cNvSpPr txBox="1"/>
+            <p:nvPr/>
+          </p:nvSpPr>
+          <p:spPr>
+            <a:xfrm>
+              <a:off x="7512889" y="122512"/>
+              <a:ext cx="276038" cy="369332"/>
+            </a:xfrm>
+            <a:prstGeom prst="rect">
+              <a:avLst/>
+            </a:prstGeom>
+            <a:noFill/>
+          </p:spPr>
+          <p:txBody>
+            <a:bodyPr wrap="none" rtlCol="0">
+              <a:spAutoFit/>
+            </a:bodyPr>
+            <a:lstStyle/>
+            <a:p>
+              <a:r>
+                <a:rPr lang="en-US" dirty="0"/>
+                <a:t>z</a:t>
+              </a:r>
+            </a:p>
+          </p:txBody>
+        </p:sp>
+        <p:sp>
+          <p:nvSpPr>
+            <p:cNvPr id="69" name="TextBox 68">
+              <a:extLst>
+                <a:ext uri="{FF2B5EF4-FFF2-40B4-BE49-F238E27FC236}">
+                  <a16:creationId xmlns:a16="http://schemas.microsoft.com/office/drawing/2014/main" id="{DA15E824-5488-45C6-AA0D-1E8F3274E88B}"/>
+                </a:ext>
+              </a:extLst>
+            </p:cNvPr>
+            <p:cNvSpPr txBox="1"/>
+            <p:nvPr/>
+          </p:nvSpPr>
+          <p:spPr>
+            <a:xfrm>
+              <a:off x="6953376" y="670538"/>
+              <a:ext cx="288862" cy="369332"/>
+            </a:xfrm>
+            <a:prstGeom prst="rect">
+              <a:avLst/>
+            </a:prstGeom>
+            <a:noFill/>
+          </p:spPr>
+          <p:txBody>
+            <a:bodyPr wrap="none" rtlCol="0">
+              <a:spAutoFit/>
+            </a:bodyPr>
+            <a:lstStyle/>
+            <a:p>
+              <a:r>
+                <a:rPr lang="en-US" dirty="0"/>
+                <a:t>y</a:t>
+              </a:r>
+            </a:p>
+          </p:txBody>
+        </p:sp>
+      </p:grpSp>
+      <p:sp>
+        <p:nvSpPr>
+          <p:cNvPr id="72" name="TextBox 71">
+            <a:extLst>
+              <a:ext uri="{FF2B5EF4-FFF2-40B4-BE49-F238E27FC236}">
+                <a16:creationId xmlns:a16="http://schemas.microsoft.com/office/drawing/2014/main" id="{151D2E46-0A5F-468E-AFB4-315E150D7A95}"/>
+              </a:ext>
+            </a:extLst>
+          </p:cNvPr>
+          <p:cNvSpPr txBox="1"/>
+          <p:nvPr/>
+        </p:nvSpPr>
+        <p:spPr>
+          <a:xfrm>
+            <a:off x="6318900" y="1092694"/>
+            <a:ext cx="296876" cy="369332"/>
+          </a:xfrm>
+          <a:prstGeom prst="rect">
+            <a:avLst/>
+          </a:prstGeom>
+          <a:noFill/>
+        </p:spPr>
+        <p:txBody>
+          <a:bodyPr wrap="none" rtlCol="0">
+            <a:spAutoFit/>
+          </a:bodyPr>
+          <a:lstStyle/>
+          <a:p>
+            <a:r>
+              <a:rPr lang="en-US" dirty="0"/>
+              <a:t>T</a:t>
+            </a:r>
+          </a:p>
+        </p:txBody>
+      </p:sp>
+      <p:grpSp>
+        <p:nvGrpSpPr>
+          <p:cNvPr id="73" name="Group 72">
+            <a:extLst>
+              <a:ext uri="{FF2B5EF4-FFF2-40B4-BE49-F238E27FC236}">
+                <a16:creationId xmlns:a16="http://schemas.microsoft.com/office/drawing/2014/main" id="{80C1DA42-80BF-4C88-BE92-488A79C0C55A}"/>
+              </a:ext>
+            </a:extLst>
+          </p:cNvPr>
+          <p:cNvGrpSpPr/>
+          <p:nvPr/>
+        </p:nvGrpSpPr>
+        <p:grpSpPr>
+          <a:xfrm>
+            <a:off x="3040112" y="4021326"/>
+            <a:ext cx="835551" cy="936172"/>
+            <a:chOff x="6953376" y="122512"/>
+            <a:chExt cx="835551" cy="936172"/>
+          </a:xfrm>
+        </p:grpSpPr>
+        <p:grpSp>
+          <p:nvGrpSpPr>
+            <p:cNvPr id="74" name="Group 73">
+              <a:extLst>
+                <a:ext uri="{FF2B5EF4-FFF2-40B4-BE49-F238E27FC236}">
+                  <a16:creationId xmlns:a16="http://schemas.microsoft.com/office/drawing/2014/main" id="{AF4A6711-8E19-4DB0-B1FF-0E97880BAD1E}"/>
+                </a:ext>
+              </a:extLst>
+            </p:cNvPr>
+            <p:cNvGrpSpPr/>
+            <p:nvPr/>
+          </p:nvGrpSpPr>
+          <p:grpSpPr>
+            <a:xfrm>
+              <a:off x="7074131" y="446069"/>
+              <a:ext cx="590843" cy="612615"/>
+              <a:chOff x="8862646" y="323557"/>
+              <a:chExt cx="590843" cy="612615"/>
+            </a:xfrm>
+          </p:grpSpPr>
+          <p:cxnSp>
+            <p:nvCxnSpPr>
+              <p:cNvPr id="77" name="Straight Arrow Connector 76">
+                <a:extLst>
+                  <a:ext uri="{FF2B5EF4-FFF2-40B4-BE49-F238E27FC236}">
+                    <a16:creationId xmlns:a16="http://schemas.microsoft.com/office/drawing/2014/main" id="{D35C862C-2120-40E4-B014-AFE2C7647AF2}"/>
+                  </a:ext>
+                </a:extLst>
+              </p:cNvPr>
+              <p:cNvCxnSpPr>
+                <a:cxnSpLocks/>
+              </p:cNvCxnSpPr>
+              <p:nvPr/>
+            </p:nvCxnSpPr>
+            <p:spPr>
+              <a:xfrm flipH="1">
+                <a:off x="8862646" y="928468"/>
+                <a:ext cx="590843" cy="0"/>
+              </a:xfrm>
+              <a:prstGeom prst="straightConnector1">
+                <a:avLst/>
+              </a:prstGeom>
+              <a:ln w="41275">
+                <a:solidFill>
+                  <a:schemeClr val="tx1"/>
+                </a:solidFill>
+                <a:tailEnd type="triangle"/>
+              </a:ln>
+            </p:spPr>
+            <p:style>
+              <a:lnRef idx="1">
+                <a:schemeClr val="accent1"/>
+              </a:lnRef>
+              <a:fillRef idx="0">
+                <a:schemeClr val="accent1"/>
+              </a:fillRef>
+              <a:effectRef idx="0">
+                <a:schemeClr val="accent1"/>
+              </a:effectRef>
+              <a:fontRef idx="minor">
+                <a:schemeClr val="tx1"/>
+              </a:fontRef>
+            </p:style>
+          </p:cxnSp>
+          <p:cxnSp>
+            <p:nvCxnSpPr>
+              <p:cNvPr id="78" name="Straight Arrow Connector 77">
+                <a:extLst>
+                  <a:ext uri="{FF2B5EF4-FFF2-40B4-BE49-F238E27FC236}">
+                    <a16:creationId xmlns:a16="http://schemas.microsoft.com/office/drawing/2014/main" id="{AE595283-80D8-4C27-8DB7-3F8ECE32B850}"/>
+                  </a:ext>
+                </a:extLst>
+              </p:cNvPr>
+              <p:cNvCxnSpPr>
+                <a:cxnSpLocks/>
+              </p:cNvCxnSpPr>
+              <p:nvPr/>
+            </p:nvCxnSpPr>
+            <p:spPr>
+              <a:xfrm flipH="1" flipV="1">
+                <a:off x="9439423" y="323557"/>
+                <a:ext cx="1" cy="612615"/>
+              </a:xfrm>
+              <a:prstGeom prst="straightConnector1">
+                <a:avLst/>
+              </a:prstGeom>
+              <a:ln w="41275">
+                <a:solidFill>
+                  <a:schemeClr val="tx1"/>
+                </a:solidFill>
+                <a:tailEnd type="triangle"/>
+              </a:ln>
+            </p:spPr>
+            <p:style>
+              <a:lnRef idx="1">
+                <a:schemeClr val="accent1"/>
+              </a:lnRef>
+              <a:fillRef idx="0">
+                <a:schemeClr val="accent1"/>
+              </a:fillRef>
+              <a:effectRef idx="0">
+                <a:schemeClr val="accent1"/>
+              </a:effectRef>
+              <a:fontRef idx="minor">
+                <a:schemeClr val="tx1"/>
+              </a:fontRef>
+            </p:style>
+          </p:cxnSp>
+        </p:grpSp>
+        <p:sp>
+          <p:nvSpPr>
+            <p:cNvPr id="75" name="TextBox 74">
+              <a:extLst>
+                <a:ext uri="{FF2B5EF4-FFF2-40B4-BE49-F238E27FC236}">
+                  <a16:creationId xmlns:a16="http://schemas.microsoft.com/office/drawing/2014/main" id="{62927AFD-0D7A-42AE-8C15-F83E371C0822}"/>
+                </a:ext>
+              </a:extLst>
+            </p:cNvPr>
+            <p:cNvSpPr txBox="1"/>
+            <p:nvPr/>
+          </p:nvSpPr>
+          <p:spPr>
+            <a:xfrm>
+              <a:off x="7512889" y="122512"/>
+              <a:ext cx="276038" cy="369332"/>
+            </a:xfrm>
+            <a:prstGeom prst="rect">
+              <a:avLst/>
+            </a:prstGeom>
+            <a:noFill/>
+          </p:spPr>
+          <p:txBody>
+            <a:bodyPr wrap="none" rtlCol="0">
+              <a:spAutoFit/>
+            </a:bodyPr>
+            <a:lstStyle/>
+            <a:p>
+              <a:r>
+                <a:rPr lang="en-US" dirty="0"/>
+                <a:t>z</a:t>
+              </a:r>
+            </a:p>
+          </p:txBody>
+        </p:sp>
+        <p:sp>
+          <p:nvSpPr>
+            <p:cNvPr id="76" name="TextBox 75">
+              <a:extLst>
+                <a:ext uri="{FF2B5EF4-FFF2-40B4-BE49-F238E27FC236}">
+                  <a16:creationId xmlns:a16="http://schemas.microsoft.com/office/drawing/2014/main" id="{32D2AF19-7D7A-4C25-8191-D6BC266BF490}"/>
+                </a:ext>
+              </a:extLst>
+            </p:cNvPr>
+            <p:cNvSpPr txBox="1"/>
+            <p:nvPr/>
+          </p:nvSpPr>
+          <p:spPr>
+            <a:xfrm>
+              <a:off x="6953376" y="670538"/>
+              <a:ext cx="288862" cy="369332"/>
+            </a:xfrm>
+            <a:prstGeom prst="rect">
+              <a:avLst/>
+            </a:prstGeom>
+            <a:noFill/>
+          </p:spPr>
+          <p:txBody>
+            <a:bodyPr wrap="none" rtlCol="0">
+              <a:spAutoFit/>
+            </a:bodyPr>
+            <a:lstStyle/>
+            <a:p>
+              <a:r>
+                <a:rPr lang="en-US" dirty="0"/>
+                <a:t>y</a:t>
+              </a:r>
+            </a:p>
+          </p:txBody>
+        </p:sp>
+      </p:grpSp>
+      <p:sp>
+        <p:nvSpPr>
+          <p:cNvPr id="79" name="TextBox 78">
+            <a:extLst>
+              <a:ext uri="{FF2B5EF4-FFF2-40B4-BE49-F238E27FC236}">
+                <a16:creationId xmlns:a16="http://schemas.microsoft.com/office/drawing/2014/main" id="{D8338889-CF8C-4CCC-8303-8CCC4CB90940}"/>
+              </a:ext>
+            </a:extLst>
+          </p:cNvPr>
+          <p:cNvSpPr txBox="1"/>
+          <p:nvPr/>
+        </p:nvSpPr>
+        <p:spPr>
+          <a:xfrm>
+            <a:off x="3744879" y="4583674"/>
+            <a:ext cx="290464" cy="369332"/>
+          </a:xfrm>
+          <a:prstGeom prst="rect">
+            <a:avLst/>
+          </a:prstGeom>
+          <a:noFill/>
+        </p:spPr>
+        <p:txBody>
+          <a:bodyPr wrap="none" rtlCol="0">
+            <a:spAutoFit/>
+          </a:bodyPr>
+          <a:lstStyle/>
+          <a:p>
+            <a:r>
+              <a:rPr lang="en-US" dirty="0"/>
+              <a:t>F</a:t>
+            </a:r>
+          </a:p>
+        </p:txBody>
+      </p:sp>
+      <p:grpSp>
+        <p:nvGrpSpPr>
+          <p:cNvPr id="80" name="Group 79">
+            <a:extLst>
+              <a:ext uri="{FF2B5EF4-FFF2-40B4-BE49-F238E27FC236}">
+                <a16:creationId xmlns:a16="http://schemas.microsoft.com/office/drawing/2014/main" id="{4D0959B3-3290-46B4-A67F-46BB3463EFDF}"/>
+              </a:ext>
+            </a:extLst>
+          </p:cNvPr>
+          <p:cNvGrpSpPr/>
+          <p:nvPr/>
+        </p:nvGrpSpPr>
+        <p:grpSpPr>
+          <a:xfrm>
+            <a:off x="3731051" y="377677"/>
+            <a:ext cx="835551" cy="936172"/>
+            <a:chOff x="6953376" y="122512"/>
+            <a:chExt cx="835551" cy="936172"/>
+          </a:xfrm>
+        </p:grpSpPr>
+        <p:grpSp>
+          <p:nvGrpSpPr>
+            <p:cNvPr id="81" name="Group 80">
+              <a:extLst>
+                <a:ext uri="{FF2B5EF4-FFF2-40B4-BE49-F238E27FC236}">
+                  <a16:creationId xmlns:a16="http://schemas.microsoft.com/office/drawing/2014/main" id="{CC55E760-763F-41C3-A75E-237DFC40E3FD}"/>
+                </a:ext>
+              </a:extLst>
+            </p:cNvPr>
+            <p:cNvGrpSpPr/>
+            <p:nvPr/>
+          </p:nvGrpSpPr>
+          <p:grpSpPr>
+            <a:xfrm>
+              <a:off x="7074131" y="446069"/>
+              <a:ext cx="590843" cy="612615"/>
+              <a:chOff x="8862646" y="323557"/>
+              <a:chExt cx="590843" cy="612615"/>
+            </a:xfrm>
+          </p:grpSpPr>
+          <p:cxnSp>
+            <p:nvCxnSpPr>
+              <p:cNvPr id="84" name="Straight Arrow Connector 83">
+                <a:extLst>
+                  <a:ext uri="{FF2B5EF4-FFF2-40B4-BE49-F238E27FC236}">
+                    <a16:creationId xmlns:a16="http://schemas.microsoft.com/office/drawing/2014/main" id="{DF58C5EE-7B73-420A-9ABC-1BFCE6151B34}"/>
+                  </a:ext>
+                </a:extLst>
+              </p:cNvPr>
+              <p:cNvCxnSpPr>
+                <a:cxnSpLocks/>
+              </p:cNvCxnSpPr>
+              <p:nvPr/>
+            </p:nvCxnSpPr>
+            <p:spPr>
+              <a:xfrm flipH="1">
+                <a:off x="8862646" y="928468"/>
+                <a:ext cx="590843" cy="0"/>
+              </a:xfrm>
+              <a:prstGeom prst="straightConnector1">
+                <a:avLst/>
+              </a:prstGeom>
+              <a:ln w="41275">
+                <a:solidFill>
+                  <a:schemeClr val="tx1"/>
+                </a:solidFill>
+                <a:tailEnd type="triangle"/>
+              </a:ln>
+            </p:spPr>
+            <p:style>
+              <a:lnRef idx="1">
+                <a:schemeClr val="accent1"/>
+              </a:lnRef>
+              <a:fillRef idx="0">
+                <a:schemeClr val="accent1"/>
+              </a:fillRef>
+              <a:effectRef idx="0">
+                <a:schemeClr val="accent1"/>
+              </a:effectRef>
+              <a:fontRef idx="minor">
+                <a:schemeClr val="tx1"/>
+              </a:fontRef>
+            </p:style>
+          </p:cxnSp>
+          <p:cxnSp>
+            <p:nvCxnSpPr>
+              <p:cNvPr id="85" name="Straight Arrow Connector 84">
+                <a:extLst>
+                  <a:ext uri="{FF2B5EF4-FFF2-40B4-BE49-F238E27FC236}">
+                    <a16:creationId xmlns:a16="http://schemas.microsoft.com/office/drawing/2014/main" id="{7CF65358-5540-45E1-A856-3E482A03A5CB}"/>
+                  </a:ext>
+                </a:extLst>
+              </p:cNvPr>
+              <p:cNvCxnSpPr>
+                <a:cxnSpLocks/>
+              </p:cNvCxnSpPr>
+              <p:nvPr/>
+            </p:nvCxnSpPr>
+            <p:spPr>
+              <a:xfrm flipH="1" flipV="1">
+                <a:off x="9439423" y="323557"/>
+                <a:ext cx="1" cy="612615"/>
+              </a:xfrm>
+              <a:prstGeom prst="straightConnector1">
+                <a:avLst/>
+              </a:prstGeom>
+              <a:ln w="41275">
+                <a:solidFill>
+                  <a:schemeClr val="tx1"/>
+                </a:solidFill>
+                <a:tailEnd type="triangle"/>
+              </a:ln>
+            </p:spPr>
+            <p:style>
+              <a:lnRef idx="1">
+                <a:schemeClr val="accent1"/>
+              </a:lnRef>
+              <a:fillRef idx="0">
+                <a:schemeClr val="accent1"/>
+              </a:fillRef>
+              <a:effectRef idx="0">
+                <a:schemeClr val="accent1"/>
+              </a:effectRef>
+              <a:fontRef idx="minor">
+                <a:schemeClr val="tx1"/>
+              </a:fontRef>
+            </p:style>
+          </p:cxnSp>
+        </p:grpSp>
+        <p:sp>
+          <p:nvSpPr>
+            <p:cNvPr id="82" name="TextBox 81">
+              <a:extLst>
+                <a:ext uri="{FF2B5EF4-FFF2-40B4-BE49-F238E27FC236}">
+                  <a16:creationId xmlns:a16="http://schemas.microsoft.com/office/drawing/2014/main" id="{55ED083D-2FDB-4087-B675-183405987601}"/>
+                </a:ext>
+              </a:extLst>
+            </p:cNvPr>
+            <p:cNvSpPr txBox="1"/>
+            <p:nvPr/>
+          </p:nvSpPr>
+          <p:spPr>
+            <a:xfrm>
+              <a:off x="7512889" y="122512"/>
+              <a:ext cx="276038" cy="369332"/>
+            </a:xfrm>
+            <a:prstGeom prst="rect">
+              <a:avLst/>
+            </a:prstGeom>
+            <a:noFill/>
+          </p:spPr>
+          <p:txBody>
+            <a:bodyPr wrap="none" rtlCol="0">
+              <a:spAutoFit/>
+            </a:bodyPr>
+            <a:lstStyle/>
+            <a:p>
+              <a:r>
+                <a:rPr lang="en-US" dirty="0"/>
+                <a:t>z</a:t>
+              </a:r>
+            </a:p>
+          </p:txBody>
+        </p:sp>
+        <p:sp>
+          <p:nvSpPr>
+            <p:cNvPr id="83" name="TextBox 82">
+              <a:extLst>
+                <a:ext uri="{FF2B5EF4-FFF2-40B4-BE49-F238E27FC236}">
+                  <a16:creationId xmlns:a16="http://schemas.microsoft.com/office/drawing/2014/main" id="{7695AEF9-900D-4139-A387-304784A96CAA}"/>
+                </a:ext>
+              </a:extLst>
+            </p:cNvPr>
+            <p:cNvSpPr txBox="1"/>
+            <p:nvPr/>
+          </p:nvSpPr>
+          <p:spPr>
+            <a:xfrm>
+              <a:off x="6953376" y="670538"/>
+              <a:ext cx="288862" cy="369332"/>
+            </a:xfrm>
+            <a:prstGeom prst="rect">
+              <a:avLst/>
+            </a:prstGeom>
+            <a:noFill/>
+          </p:spPr>
+          <p:txBody>
+            <a:bodyPr wrap="none" rtlCol="0">
+              <a:spAutoFit/>
+            </a:bodyPr>
+            <a:lstStyle/>
+            <a:p>
+              <a:r>
+                <a:rPr lang="en-US" dirty="0"/>
+                <a:t>y</a:t>
+              </a:r>
+            </a:p>
+          </p:txBody>
+        </p:sp>
+      </p:grpSp>
+      <p:sp>
+        <p:nvSpPr>
+          <p:cNvPr id="86" name="TextBox 85">
+            <a:extLst>
+              <a:ext uri="{FF2B5EF4-FFF2-40B4-BE49-F238E27FC236}">
+                <a16:creationId xmlns:a16="http://schemas.microsoft.com/office/drawing/2014/main" id="{AC81A69A-0881-4D0C-9AA9-1ECAC99FE2BF}"/>
+              </a:ext>
+            </a:extLst>
+          </p:cNvPr>
+          <p:cNvSpPr txBox="1"/>
+          <p:nvPr/>
+        </p:nvSpPr>
+        <p:spPr>
+          <a:xfrm>
+            <a:off x="4435818" y="940025"/>
+            <a:ext cx="330540" cy="369332"/>
+          </a:xfrm>
+          <a:prstGeom prst="rect">
+            <a:avLst/>
+          </a:prstGeom>
+          <a:noFill/>
+        </p:spPr>
+        <p:txBody>
+          <a:bodyPr wrap="none" rtlCol="0">
+            <a:spAutoFit/>
+          </a:bodyPr>
+          <a:lstStyle/>
+          <a:p>
+            <a:r>
+              <a:rPr lang="en-US" dirty="0"/>
+              <a:t>G</a:t>
+            </a:r>
+          </a:p>
+        </p:txBody>
+      </p:sp>
+    </p:spTree>
+    <p:extLst>
+      <p:ext uri="{BB962C8B-B14F-4D97-AF65-F5344CB8AC3E}">
+        <p14:creationId xmlns:p14="http://schemas.microsoft.com/office/powerpoint/2010/main" val="3927520195"/>
       </p:ext>
     </p:extLst>
   </p:cSld>

</xml_diff>

<commit_message>
updated gantry images, application section with greater details
</commit_message>
<xml_diff>
--- a/Tex/img/image_drafts.pptx
+++ b/Tex/img/image_drafts.pptx
@@ -261,7 +261,7 @@
           <a:p>
             <a:fld id="{ADE3E4B1-CA40-4531-9E55-38EAC9A4A4BF}" type="datetimeFigureOut">
               <a:rPr lang="en-US" smtClean="0"/>
-              <a:t>12/15/2021</a:t>
+              <a:t>12/16/2021</a:t>
             </a:fld>
             <a:endParaRPr lang="en-US"/>
           </a:p>
@@ -459,7 +459,7 @@
           <a:p>
             <a:fld id="{ADE3E4B1-CA40-4531-9E55-38EAC9A4A4BF}" type="datetimeFigureOut">
               <a:rPr lang="en-US" smtClean="0"/>
-              <a:t>12/15/2021</a:t>
+              <a:t>12/16/2021</a:t>
             </a:fld>
             <a:endParaRPr lang="en-US"/>
           </a:p>
@@ -667,7 +667,7 @@
           <a:p>
             <a:fld id="{ADE3E4B1-CA40-4531-9E55-38EAC9A4A4BF}" type="datetimeFigureOut">
               <a:rPr lang="en-US" smtClean="0"/>
-              <a:t>12/15/2021</a:t>
+              <a:t>12/16/2021</a:t>
             </a:fld>
             <a:endParaRPr lang="en-US"/>
           </a:p>
@@ -865,7 +865,7 @@
           <a:p>
             <a:fld id="{ADE3E4B1-CA40-4531-9E55-38EAC9A4A4BF}" type="datetimeFigureOut">
               <a:rPr lang="en-US" smtClean="0"/>
-              <a:t>12/15/2021</a:t>
+              <a:t>12/16/2021</a:t>
             </a:fld>
             <a:endParaRPr lang="en-US"/>
           </a:p>
@@ -1140,7 +1140,7 @@
           <a:p>
             <a:fld id="{ADE3E4B1-CA40-4531-9E55-38EAC9A4A4BF}" type="datetimeFigureOut">
               <a:rPr lang="en-US" smtClean="0"/>
-              <a:t>12/15/2021</a:t>
+              <a:t>12/16/2021</a:t>
             </a:fld>
             <a:endParaRPr lang="en-US"/>
           </a:p>
@@ -1405,7 +1405,7 @@
           <a:p>
             <a:fld id="{ADE3E4B1-CA40-4531-9E55-38EAC9A4A4BF}" type="datetimeFigureOut">
               <a:rPr lang="en-US" smtClean="0"/>
-              <a:t>12/15/2021</a:t>
+              <a:t>12/16/2021</a:t>
             </a:fld>
             <a:endParaRPr lang="en-US"/>
           </a:p>
@@ -1817,7 +1817,7 @@
           <a:p>
             <a:fld id="{ADE3E4B1-CA40-4531-9E55-38EAC9A4A4BF}" type="datetimeFigureOut">
               <a:rPr lang="en-US" smtClean="0"/>
-              <a:t>12/15/2021</a:t>
+              <a:t>12/16/2021</a:t>
             </a:fld>
             <a:endParaRPr lang="en-US"/>
           </a:p>
@@ -1958,7 +1958,7 @@
           <a:p>
             <a:fld id="{ADE3E4B1-CA40-4531-9E55-38EAC9A4A4BF}" type="datetimeFigureOut">
               <a:rPr lang="en-US" smtClean="0"/>
-              <a:t>12/15/2021</a:t>
+              <a:t>12/16/2021</a:t>
             </a:fld>
             <a:endParaRPr lang="en-US"/>
           </a:p>
@@ -2071,7 +2071,7 @@
           <a:p>
             <a:fld id="{ADE3E4B1-CA40-4531-9E55-38EAC9A4A4BF}" type="datetimeFigureOut">
               <a:rPr lang="en-US" smtClean="0"/>
-              <a:t>12/15/2021</a:t>
+              <a:t>12/16/2021</a:t>
             </a:fld>
             <a:endParaRPr lang="en-US"/>
           </a:p>
@@ -2382,7 +2382,7 @@
           <a:p>
             <a:fld id="{ADE3E4B1-CA40-4531-9E55-38EAC9A4A4BF}" type="datetimeFigureOut">
               <a:rPr lang="en-US" smtClean="0"/>
-              <a:t>12/15/2021</a:t>
+              <a:t>12/16/2021</a:t>
             </a:fld>
             <a:endParaRPr lang="en-US"/>
           </a:p>
@@ -2670,7 +2670,7 @@
           <a:p>
             <a:fld id="{ADE3E4B1-CA40-4531-9E55-38EAC9A4A4BF}" type="datetimeFigureOut">
               <a:rPr lang="en-US" smtClean="0"/>
-              <a:t>12/15/2021</a:t>
+              <a:t>12/16/2021</a:t>
             </a:fld>
             <a:endParaRPr lang="en-US"/>
           </a:p>
@@ -2911,7 +2911,7 @@
           <a:p>
             <a:fld id="{ADE3E4B1-CA40-4531-9E55-38EAC9A4A4BF}" type="datetimeFigureOut">
               <a:rPr lang="en-US" smtClean="0"/>
-              <a:t>12/15/2021</a:t>
+              <a:t>12/16/2021</a:t>
             </a:fld>
             <a:endParaRPr lang="en-US"/>
           </a:p>
@@ -4263,10 +4263,10 @@
       </p:cxnSp>
       <p:pic>
         <p:nvPicPr>
-          <p:cNvPr id="24" name="Picture 23">
-            <a:extLst>
-              <a:ext uri="{FF2B5EF4-FFF2-40B4-BE49-F238E27FC236}">
-                <a16:creationId xmlns:a16="http://schemas.microsoft.com/office/drawing/2014/main" id="{7E9ECD38-9DE4-41B9-9EAF-535BCB60ABAE}"/>
+          <p:cNvPr id="3" name="Picture 2">
+            <a:extLst>
+              <a:ext uri="{FF2B5EF4-FFF2-40B4-BE49-F238E27FC236}">
+                <a16:creationId xmlns:a16="http://schemas.microsoft.com/office/drawing/2014/main" id="{B8875E04-8521-4A14-BF13-B95FFE4CFDEB}"/>
               </a:ext>
             </a:extLst>
           </p:cNvPr>
@@ -4293,8 +4293,8 @@
         </p:blipFill>
         <p:spPr>
           <a:xfrm>
-            <a:off x="6601199" y="5538932"/>
-            <a:ext cx="235291" cy="214221"/>
+            <a:off x="6608579" y="5533021"/>
+            <a:ext cx="147538" cy="146755"/>
           </a:xfrm>
           <a:prstGeom prst="rect">
             <a:avLst/>
@@ -5222,6 +5222,11 @@
           <a:prstGeom prst="rect">
             <a:avLst/>
           </a:prstGeom>
+          <a:solidFill>
+            <a:schemeClr val="accent4">
+              <a:lumMod val="75000"/>
+            </a:schemeClr>
+          </a:solidFill>
           <a:ln>
             <a:solidFill>
               <a:schemeClr val="tx1"/>
@@ -6283,10 +6288,10 @@
       </p:sp>
       <p:grpSp>
         <p:nvGrpSpPr>
-          <p:cNvPr id="59" name="Group 58">
-            <a:extLst>
-              <a:ext uri="{FF2B5EF4-FFF2-40B4-BE49-F238E27FC236}">
-                <a16:creationId xmlns:a16="http://schemas.microsoft.com/office/drawing/2014/main" id="{2BF60183-1D66-49FE-ADC6-27300A9A6CEE}"/>
+          <p:cNvPr id="52" name="Group 51">
+            <a:extLst>
+              <a:ext uri="{FF2B5EF4-FFF2-40B4-BE49-F238E27FC236}">
+                <a16:creationId xmlns:a16="http://schemas.microsoft.com/office/drawing/2014/main" id="{EBE20FD2-D4EC-43A2-ABC4-F0F108872930}"/>
               </a:ext>
             </a:extLst>
           </p:cNvPr>
@@ -6295,198 +6300,890 @@
         </p:nvGrpSpPr>
         <p:grpSpPr>
           <a:xfrm>
-            <a:off x="7710223" y="375598"/>
-            <a:ext cx="835551" cy="936172"/>
-            <a:chOff x="6953376" y="122512"/>
-            <a:chExt cx="835551" cy="936172"/>
+            <a:off x="7830978" y="699155"/>
+            <a:ext cx="590843" cy="612615"/>
+            <a:chOff x="8862646" y="323557"/>
+            <a:chExt cx="590843" cy="612615"/>
           </a:xfrm>
         </p:grpSpPr>
-        <p:grpSp>
-          <p:nvGrpSpPr>
-            <p:cNvPr id="52" name="Group 51">
+        <p:cxnSp>
+          <p:nvCxnSpPr>
+            <p:cNvPr id="46" name="Straight Arrow Connector 45">
               <a:extLst>
                 <a:ext uri="{FF2B5EF4-FFF2-40B4-BE49-F238E27FC236}">
-                  <a16:creationId xmlns:a16="http://schemas.microsoft.com/office/drawing/2014/main" id="{EBE20FD2-D4EC-43A2-ABC4-F0F108872930}"/>
+                  <a16:creationId xmlns:a16="http://schemas.microsoft.com/office/drawing/2014/main" id="{16E3FA78-8D8F-4AA9-A87F-D86EA1F77853}"/>
                 </a:ext>
               </a:extLst>
             </p:cNvPr>
-            <p:cNvGrpSpPr/>
+            <p:cNvCxnSpPr>
+              <a:cxnSpLocks/>
+            </p:cNvCxnSpPr>
             <p:nvPr/>
-          </p:nvGrpSpPr>
-          <p:grpSpPr>
-            <a:xfrm>
-              <a:off x="7074131" y="446069"/>
-              <a:ext cx="590843" cy="612615"/>
-              <a:chOff x="8862646" y="323557"/>
-              <a:chExt cx="590843" cy="612615"/>
+          </p:nvCxnSpPr>
+          <p:spPr>
+            <a:xfrm flipH="1">
+              <a:off x="8862646" y="928468"/>
+              <a:ext cx="590843" cy="0"/>
             </a:xfrm>
-          </p:grpSpPr>
-          <p:cxnSp>
-            <p:nvCxnSpPr>
-              <p:cNvPr id="46" name="Straight Arrow Connector 45">
-                <a:extLst>
-                  <a:ext uri="{FF2B5EF4-FFF2-40B4-BE49-F238E27FC236}">
-                    <a16:creationId xmlns:a16="http://schemas.microsoft.com/office/drawing/2014/main" id="{16E3FA78-8D8F-4AA9-A87F-D86EA1F77853}"/>
-                  </a:ext>
-                </a:extLst>
-              </p:cNvPr>
-              <p:cNvCxnSpPr>
-                <a:cxnSpLocks/>
-              </p:cNvCxnSpPr>
-              <p:nvPr/>
-            </p:nvCxnSpPr>
-            <p:spPr>
-              <a:xfrm flipH="1">
-                <a:off x="8862646" y="928468"/>
-                <a:ext cx="590843" cy="0"/>
-              </a:xfrm>
-              <a:prstGeom prst="straightConnector1">
-                <a:avLst/>
-              </a:prstGeom>
-              <a:ln w="41275">
-                <a:solidFill>
-                  <a:schemeClr val="tx1"/>
-                </a:solidFill>
-                <a:tailEnd type="triangle"/>
-              </a:ln>
-            </p:spPr>
-            <p:style>
-              <a:lnRef idx="1">
-                <a:schemeClr val="accent1"/>
-              </a:lnRef>
-              <a:fillRef idx="0">
-                <a:schemeClr val="accent1"/>
-              </a:fillRef>
-              <a:effectRef idx="0">
-                <a:schemeClr val="accent1"/>
-              </a:effectRef>
-              <a:fontRef idx="minor">
-                <a:schemeClr val="tx1"/>
-              </a:fontRef>
-            </p:style>
-          </p:cxnSp>
-          <p:cxnSp>
-            <p:nvCxnSpPr>
-              <p:cNvPr id="48" name="Straight Arrow Connector 47">
-                <a:extLst>
-                  <a:ext uri="{FF2B5EF4-FFF2-40B4-BE49-F238E27FC236}">
-                    <a16:creationId xmlns:a16="http://schemas.microsoft.com/office/drawing/2014/main" id="{EEF18321-0ACD-4998-8706-9667C189A059}"/>
-                  </a:ext>
-                </a:extLst>
-              </p:cNvPr>
-              <p:cNvCxnSpPr>
-                <a:cxnSpLocks/>
-              </p:cNvCxnSpPr>
-              <p:nvPr/>
-            </p:nvCxnSpPr>
-            <p:spPr>
-              <a:xfrm flipH="1" flipV="1">
-                <a:off x="9439423" y="323557"/>
-                <a:ext cx="1" cy="612615"/>
-              </a:xfrm>
-              <a:prstGeom prst="straightConnector1">
-                <a:avLst/>
-              </a:prstGeom>
-              <a:ln w="41275">
-                <a:solidFill>
-                  <a:schemeClr val="tx1"/>
-                </a:solidFill>
-                <a:tailEnd type="triangle"/>
-              </a:ln>
-            </p:spPr>
-            <p:style>
-              <a:lnRef idx="1">
-                <a:schemeClr val="accent1"/>
-              </a:lnRef>
-              <a:fillRef idx="0">
-                <a:schemeClr val="accent1"/>
-              </a:fillRef>
-              <a:effectRef idx="0">
-                <a:schemeClr val="accent1"/>
-              </a:effectRef>
-              <a:fontRef idx="minor">
-                <a:schemeClr val="tx1"/>
-              </a:fontRef>
-            </p:style>
-          </p:cxnSp>
-        </p:grpSp>
-        <p:sp>
-          <p:nvSpPr>
-            <p:cNvPr id="53" name="TextBox 52">
+            <a:prstGeom prst="straightConnector1">
+              <a:avLst/>
+            </a:prstGeom>
+            <a:ln w="41275">
+              <a:solidFill>
+                <a:schemeClr val="accent1">
+                  <a:lumMod val="75000"/>
+                </a:schemeClr>
+              </a:solidFill>
+              <a:tailEnd type="triangle"/>
+            </a:ln>
+          </p:spPr>
+          <p:style>
+            <a:lnRef idx="1">
+              <a:schemeClr val="accent1"/>
+            </a:lnRef>
+            <a:fillRef idx="0">
+              <a:schemeClr val="accent1"/>
+            </a:fillRef>
+            <a:effectRef idx="0">
+              <a:schemeClr val="accent1"/>
+            </a:effectRef>
+            <a:fontRef idx="minor">
+              <a:schemeClr val="tx1"/>
+            </a:fontRef>
+          </p:style>
+        </p:cxnSp>
+        <p:cxnSp>
+          <p:nvCxnSpPr>
+            <p:cNvPr id="48" name="Straight Arrow Connector 47">
               <a:extLst>
                 <a:ext uri="{FF2B5EF4-FFF2-40B4-BE49-F238E27FC236}">
-                  <a16:creationId xmlns:a16="http://schemas.microsoft.com/office/drawing/2014/main" id="{1613DB3F-6726-46E0-9D07-A70D7EE212E6}"/>
+                  <a16:creationId xmlns:a16="http://schemas.microsoft.com/office/drawing/2014/main" id="{EEF18321-0ACD-4998-8706-9667C189A059}"/>
                 </a:ext>
               </a:extLst>
             </p:cNvPr>
-            <p:cNvSpPr txBox="1"/>
+            <p:cNvCxnSpPr>
+              <a:cxnSpLocks/>
+            </p:cNvCxnSpPr>
+            <p:nvPr/>
+          </p:nvCxnSpPr>
+          <p:spPr>
+            <a:xfrm flipH="1" flipV="1">
+              <a:off x="9439423" y="323557"/>
+              <a:ext cx="1" cy="612615"/>
+            </a:xfrm>
+            <a:prstGeom prst="straightConnector1">
+              <a:avLst/>
+            </a:prstGeom>
+            <a:ln w="41275">
+              <a:solidFill>
+                <a:schemeClr val="accent1">
+                  <a:lumMod val="75000"/>
+                </a:schemeClr>
+              </a:solidFill>
+              <a:tailEnd type="triangle"/>
+            </a:ln>
+          </p:spPr>
+          <p:style>
+            <a:lnRef idx="1">
+              <a:schemeClr val="accent1"/>
+            </a:lnRef>
+            <a:fillRef idx="0">
+              <a:schemeClr val="accent1"/>
+            </a:fillRef>
+            <a:effectRef idx="0">
+              <a:schemeClr val="accent1"/>
+            </a:effectRef>
+            <a:fontRef idx="minor">
+              <a:schemeClr val="tx1"/>
+            </a:fontRef>
+          </p:style>
+        </p:cxnSp>
+      </p:grpSp>
+      <p:grpSp>
+        <p:nvGrpSpPr>
+          <p:cNvPr id="61" name="Group 60">
+            <a:extLst>
+              <a:ext uri="{FF2B5EF4-FFF2-40B4-BE49-F238E27FC236}">
+                <a16:creationId xmlns:a16="http://schemas.microsoft.com/office/drawing/2014/main" id="{02AE9FC2-05EC-4750-AA02-CB91E078F4D4}"/>
+              </a:ext>
+            </a:extLst>
+          </p:cNvPr>
+          <p:cNvGrpSpPr/>
+          <p:nvPr/>
+        </p:nvGrpSpPr>
+        <p:grpSpPr>
+          <a:xfrm>
+            <a:off x="5125763" y="821878"/>
+            <a:ext cx="590843" cy="612615"/>
+            <a:chOff x="8862646" y="323557"/>
+            <a:chExt cx="590843" cy="612615"/>
+          </a:xfrm>
+        </p:grpSpPr>
+        <p:cxnSp>
+          <p:nvCxnSpPr>
+            <p:cNvPr id="64" name="Straight Arrow Connector 63">
+              <a:extLst>
+                <a:ext uri="{FF2B5EF4-FFF2-40B4-BE49-F238E27FC236}">
+                  <a16:creationId xmlns:a16="http://schemas.microsoft.com/office/drawing/2014/main" id="{D77BF4D3-27DF-4E11-817F-4429C9C260FC}"/>
+                </a:ext>
+              </a:extLst>
+            </p:cNvPr>
+            <p:cNvCxnSpPr>
+              <a:cxnSpLocks/>
+            </p:cNvCxnSpPr>
+            <p:nvPr/>
+          </p:nvCxnSpPr>
+          <p:spPr>
+            <a:xfrm flipH="1">
+              <a:off x="8862646" y="928468"/>
+              <a:ext cx="590843" cy="0"/>
+            </a:xfrm>
+            <a:prstGeom prst="straightConnector1">
+              <a:avLst/>
+            </a:prstGeom>
+            <a:ln w="41275">
+              <a:solidFill>
+                <a:schemeClr val="accent1">
+                  <a:lumMod val="75000"/>
+                </a:schemeClr>
+              </a:solidFill>
+              <a:tailEnd type="triangle"/>
+            </a:ln>
+          </p:spPr>
+          <p:style>
+            <a:lnRef idx="1">
+              <a:schemeClr val="accent1"/>
+            </a:lnRef>
+            <a:fillRef idx="0">
+              <a:schemeClr val="accent1"/>
+            </a:fillRef>
+            <a:effectRef idx="0">
+              <a:schemeClr val="accent1"/>
+            </a:effectRef>
+            <a:fontRef idx="minor">
+              <a:schemeClr val="tx1"/>
+            </a:fontRef>
+          </p:style>
+        </p:cxnSp>
+        <p:cxnSp>
+          <p:nvCxnSpPr>
+            <p:cNvPr id="65" name="Straight Arrow Connector 64">
+              <a:extLst>
+                <a:ext uri="{FF2B5EF4-FFF2-40B4-BE49-F238E27FC236}">
+                  <a16:creationId xmlns:a16="http://schemas.microsoft.com/office/drawing/2014/main" id="{CE195B13-D358-454B-9355-2E545572124D}"/>
+                </a:ext>
+              </a:extLst>
+            </p:cNvPr>
+            <p:cNvCxnSpPr>
+              <a:cxnSpLocks/>
+            </p:cNvCxnSpPr>
+            <p:nvPr/>
+          </p:nvCxnSpPr>
+          <p:spPr>
+            <a:xfrm flipH="1" flipV="1">
+              <a:off x="9439423" y="323557"/>
+              <a:ext cx="1" cy="612615"/>
+            </a:xfrm>
+            <a:prstGeom prst="straightConnector1">
+              <a:avLst/>
+            </a:prstGeom>
+            <a:ln w="41275">
+              <a:solidFill>
+                <a:schemeClr val="accent1">
+                  <a:lumMod val="75000"/>
+                </a:schemeClr>
+              </a:solidFill>
+              <a:tailEnd type="triangle"/>
+            </a:ln>
+          </p:spPr>
+          <p:style>
+            <a:lnRef idx="1">
+              <a:schemeClr val="accent1"/>
+            </a:lnRef>
+            <a:fillRef idx="0">
+              <a:schemeClr val="accent1"/>
+            </a:fillRef>
+            <a:effectRef idx="0">
+              <a:schemeClr val="accent1"/>
+            </a:effectRef>
+            <a:fontRef idx="minor">
+              <a:schemeClr val="tx1"/>
+            </a:fontRef>
+          </p:style>
+        </p:cxnSp>
+      </p:grpSp>
+      <p:pic>
+        <p:nvPicPr>
+          <p:cNvPr id="20" name="Picture 19">
+            <a:extLst>
+              <a:ext uri="{FF2B5EF4-FFF2-40B4-BE49-F238E27FC236}">
+                <a16:creationId xmlns:a16="http://schemas.microsoft.com/office/drawing/2014/main" id="{39A064D1-D97D-4993-AEA1-1FBA6803611C}"/>
+              </a:ext>
+            </a:extLst>
+          </p:cNvPr>
+          <p:cNvPicPr>
+            <a:picLocks noChangeAspect="1"/>
+          </p:cNvPicPr>
+          <p:nvPr>
+            <p:custDataLst>
+              <p:tags r:id="rId1"/>
+            </p:custDataLst>
+          </p:nvPr>
+        </p:nvPicPr>
+        <p:blipFill>
+          <a:blip r:embed="rId12">
+            <a:extLst>
+              <a:ext uri="{28A0092B-C50C-407E-A947-70E740481C1C}">
+                <a14:useLocalDpi xmlns:a14="http://schemas.microsoft.com/office/drawing/2010/main" val="0"/>
+              </a:ext>
+            </a:extLst>
+          </a:blip>
+          <a:stretch>
+            <a:fillRect/>
+          </a:stretch>
+        </p:blipFill>
+        <p:spPr>
+          <a:xfrm>
+            <a:off x="8036438" y="503613"/>
+            <a:ext cx="296601" cy="193900"/>
+          </a:xfrm>
+          <a:prstGeom prst="rect">
+            <a:avLst/>
+          </a:prstGeom>
+        </p:spPr>
+      </p:pic>
+      <p:pic>
+        <p:nvPicPr>
+          <p:cNvPr id="25" name="Picture 24">
+            <a:extLst>
+              <a:ext uri="{FF2B5EF4-FFF2-40B4-BE49-F238E27FC236}">
+                <a16:creationId xmlns:a16="http://schemas.microsoft.com/office/drawing/2014/main" id="{7BA37DB7-2540-4378-A841-7A66BEAD5B0D}"/>
+              </a:ext>
+            </a:extLst>
+          </p:cNvPr>
+          <p:cNvPicPr>
+            <a:picLocks noChangeAspect="1"/>
+          </p:cNvPicPr>
+          <p:nvPr>
+            <p:custDataLst>
+              <p:tags r:id="rId2"/>
+            </p:custDataLst>
+          </p:nvPr>
+        </p:nvPicPr>
+        <p:blipFill>
+          <a:blip r:embed="rId13">
+            <a:extLst>
+              <a:ext uri="{28A0092B-C50C-407E-A947-70E740481C1C}">
+                <a14:useLocalDpi xmlns:a14="http://schemas.microsoft.com/office/drawing/2010/main" val="0"/>
+              </a:ext>
+            </a:extLst>
+          </a:blip>
+          <a:stretch>
+            <a:fillRect/>
+          </a:stretch>
+        </p:blipFill>
+        <p:spPr>
+          <a:xfrm>
+            <a:off x="7557499" y="1008032"/>
+            <a:ext cx="317963" cy="193900"/>
+          </a:xfrm>
+          <a:prstGeom prst="rect">
+            <a:avLst/>
+          </a:prstGeom>
+        </p:spPr>
+      </p:pic>
+      <p:pic>
+        <p:nvPicPr>
+          <p:cNvPr id="43" name="Picture 42">
+            <a:extLst>
+              <a:ext uri="{FF2B5EF4-FFF2-40B4-BE49-F238E27FC236}">
+                <a16:creationId xmlns:a16="http://schemas.microsoft.com/office/drawing/2014/main" id="{F27C85D7-4152-4917-BBD7-35C229052A63}"/>
+              </a:ext>
+            </a:extLst>
+          </p:cNvPr>
+          <p:cNvPicPr>
+            <a:picLocks noChangeAspect="1"/>
+          </p:cNvPicPr>
+          <p:nvPr>
+            <p:custDataLst>
+              <p:tags r:id="rId3"/>
+            </p:custDataLst>
+          </p:nvPr>
+        </p:nvPicPr>
+        <p:blipFill>
+          <a:blip r:embed="rId14">
+            <a:extLst>
+              <a:ext uri="{28A0092B-C50C-407E-A947-70E740481C1C}">
+                <a14:useLocalDpi xmlns:a14="http://schemas.microsoft.com/office/drawing/2010/main" val="0"/>
+              </a:ext>
+            </a:extLst>
+          </a:blip>
+          <a:stretch>
+            <a:fillRect/>
+          </a:stretch>
+        </p:blipFill>
+        <p:spPr>
+          <a:xfrm>
+            <a:off x="5342892" y="636810"/>
+            <a:ext cx="253877" cy="187327"/>
+          </a:xfrm>
+          <a:prstGeom prst="rect">
+            <a:avLst/>
+          </a:prstGeom>
+        </p:spPr>
+      </p:pic>
+      <p:pic>
+        <p:nvPicPr>
+          <p:cNvPr id="45" name="Picture 44">
+            <a:extLst>
+              <a:ext uri="{FF2B5EF4-FFF2-40B4-BE49-F238E27FC236}">
+                <a16:creationId xmlns:a16="http://schemas.microsoft.com/office/drawing/2014/main" id="{1E647EB9-9B66-427A-A0C7-4B9AE8CC31CD}"/>
+              </a:ext>
+            </a:extLst>
+          </p:cNvPr>
+          <p:cNvPicPr>
+            <a:picLocks noChangeAspect="1"/>
+          </p:cNvPicPr>
+          <p:nvPr>
+            <p:custDataLst>
+              <p:tags r:id="rId4"/>
+            </p:custDataLst>
+          </p:nvPr>
+        </p:nvPicPr>
+        <p:blipFill>
+          <a:blip r:embed="rId15">
+            <a:extLst>
+              <a:ext uri="{28A0092B-C50C-407E-A947-70E740481C1C}">
+                <a14:useLocalDpi xmlns:a14="http://schemas.microsoft.com/office/drawing/2010/main" val="0"/>
+              </a:ext>
+            </a:extLst>
+          </a:blip>
+          <a:stretch>
+            <a:fillRect/>
+          </a:stretch>
+        </p:blipFill>
+        <p:spPr>
+          <a:xfrm>
+            <a:off x="5043551" y="1047198"/>
+            <a:ext cx="275239" cy="187327"/>
+          </a:xfrm>
+          <a:prstGeom prst="rect">
+            <a:avLst/>
+          </a:prstGeom>
+        </p:spPr>
+      </p:pic>
+      <p:grpSp>
+        <p:nvGrpSpPr>
+          <p:cNvPr id="71" name="Group 70">
+            <a:extLst>
+              <a:ext uri="{FF2B5EF4-FFF2-40B4-BE49-F238E27FC236}">
+                <a16:creationId xmlns:a16="http://schemas.microsoft.com/office/drawing/2014/main" id="{CA158835-FE0F-4C32-93CA-B5F596C3602D}"/>
+              </a:ext>
+            </a:extLst>
+          </p:cNvPr>
+          <p:cNvGrpSpPr/>
+          <p:nvPr/>
+        </p:nvGrpSpPr>
+        <p:grpSpPr>
+          <a:xfrm>
+            <a:off x="8479702" y="4337918"/>
+            <a:ext cx="590843" cy="612615"/>
+            <a:chOff x="8862646" y="323557"/>
+            <a:chExt cx="590843" cy="612615"/>
+          </a:xfrm>
+        </p:grpSpPr>
+        <p:cxnSp>
+          <p:nvCxnSpPr>
+            <p:cNvPr id="79" name="Straight Arrow Connector 78">
+              <a:extLst>
+                <a:ext uri="{FF2B5EF4-FFF2-40B4-BE49-F238E27FC236}">
+                  <a16:creationId xmlns:a16="http://schemas.microsoft.com/office/drawing/2014/main" id="{1914E486-867D-4621-BF01-3917DCB93546}"/>
+                </a:ext>
+              </a:extLst>
+            </p:cNvPr>
+            <p:cNvCxnSpPr>
+              <a:cxnSpLocks/>
+            </p:cNvCxnSpPr>
+            <p:nvPr/>
+          </p:nvCxnSpPr>
+          <p:spPr>
+            <a:xfrm flipH="1">
+              <a:off x="8862646" y="928468"/>
+              <a:ext cx="590843" cy="0"/>
+            </a:xfrm>
+            <a:prstGeom prst="straightConnector1">
+              <a:avLst/>
+            </a:prstGeom>
+            <a:ln w="41275">
+              <a:solidFill>
+                <a:schemeClr val="accent1">
+                  <a:lumMod val="75000"/>
+                </a:schemeClr>
+              </a:solidFill>
+              <a:tailEnd type="triangle"/>
+            </a:ln>
+          </p:spPr>
+          <p:style>
+            <a:lnRef idx="1">
+              <a:schemeClr val="accent1"/>
+            </a:lnRef>
+            <a:fillRef idx="0">
+              <a:schemeClr val="accent1"/>
+            </a:fillRef>
+            <a:effectRef idx="0">
+              <a:schemeClr val="accent1"/>
+            </a:effectRef>
+            <a:fontRef idx="minor">
+              <a:schemeClr val="tx1"/>
+            </a:fontRef>
+          </p:style>
+        </p:cxnSp>
+        <p:cxnSp>
+          <p:nvCxnSpPr>
+            <p:cNvPr id="82" name="Straight Arrow Connector 81">
+              <a:extLst>
+                <a:ext uri="{FF2B5EF4-FFF2-40B4-BE49-F238E27FC236}">
+                  <a16:creationId xmlns:a16="http://schemas.microsoft.com/office/drawing/2014/main" id="{2FF2760F-0783-44C9-B4CA-10C1D6DB6499}"/>
+                </a:ext>
+              </a:extLst>
+            </p:cNvPr>
+            <p:cNvCxnSpPr>
+              <a:cxnSpLocks/>
+            </p:cNvCxnSpPr>
+            <p:nvPr/>
+          </p:nvCxnSpPr>
+          <p:spPr>
+            <a:xfrm flipH="1" flipV="1">
+              <a:off x="9439423" y="323557"/>
+              <a:ext cx="1" cy="612615"/>
+            </a:xfrm>
+            <a:prstGeom prst="straightConnector1">
+              <a:avLst/>
+            </a:prstGeom>
+            <a:ln w="41275">
+              <a:solidFill>
+                <a:schemeClr val="accent1">
+                  <a:lumMod val="75000"/>
+                </a:schemeClr>
+              </a:solidFill>
+              <a:tailEnd type="triangle"/>
+            </a:ln>
+          </p:spPr>
+          <p:style>
+            <a:lnRef idx="1">
+              <a:schemeClr val="accent1"/>
+            </a:lnRef>
+            <a:fillRef idx="0">
+              <a:schemeClr val="accent1"/>
+            </a:fillRef>
+            <a:effectRef idx="0">
+              <a:schemeClr val="accent1"/>
+            </a:effectRef>
+            <a:fontRef idx="minor">
+              <a:schemeClr val="tx1"/>
+            </a:fontRef>
+          </p:style>
+        </p:cxnSp>
+      </p:grpSp>
+      <p:pic>
+        <p:nvPicPr>
+          <p:cNvPr id="49" name="Picture 48">
+            <a:extLst>
+              <a:ext uri="{FF2B5EF4-FFF2-40B4-BE49-F238E27FC236}">
+                <a16:creationId xmlns:a16="http://schemas.microsoft.com/office/drawing/2014/main" id="{D73605FD-B13D-4F5D-BFB1-8609B64DCC2B}"/>
+              </a:ext>
+            </a:extLst>
+          </p:cNvPr>
+          <p:cNvPicPr>
+            <a:picLocks noChangeAspect="1"/>
+          </p:cNvPicPr>
+          <p:nvPr>
+            <p:custDataLst>
+              <p:tags r:id="rId5"/>
+            </p:custDataLst>
+          </p:nvPr>
+        </p:nvPicPr>
+        <p:blipFill>
+          <a:blip r:embed="rId16">
+            <a:extLst>
+              <a:ext uri="{28A0092B-C50C-407E-A947-70E740481C1C}">
+                <a14:useLocalDpi xmlns:a14="http://schemas.microsoft.com/office/drawing/2010/main" val="0"/>
+              </a:ext>
+            </a:extLst>
+          </a:blip>
+          <a:stretch>
+            <a:fillRect/>
+          </a:stretch>
+        </p:blipFill>
+        <p:spPr>
+          <a:xfrm>
+            <a:off x="8816668" y="4092121"/>
+            <a:ext cx="263736" cy="188149"/>
+          </a:xfrm>
+          <a:prstGeom prst="rect">
+            <a:avLst/>
+          </a:prstGeom>
+        </p:spPr>
+      </p:pic>
+      <p:pic>
+        <p:nvPicPr>
+          <p:cNvPr id="51" name="Picture 50">
+            <a:extLst>
+              <a:ext uri="{FF2B5EF4-FFF2-40B4-BE49-F238E27FC236}">
+                <a16:creationId xmlns:a16="http://schemas.microsoft.com/office/drawing/2014/main" id="{0DD9CFCF-A76A-4235-9478-0D2F39A6C18E}"/>
+              </a:ext>
+            </a:extLst>
+          </p:cNvPr>
+          <p:cNvPicPr>
+            <a:picLocks noChangeAspect="1"/>
+          </p:cNvPicPr>
+          <p:nvPr>
+            <p:custDataLst>
+              <p:tags r:id="rId6"/>
+            </p:custDataLst>
+          </p:nvPr>
+        </p:nvPicPr>
+        <p:blipFill>
+          <a:blip r:embed="rId17">
+            <a:extLst>
+              <a:ext uri="{28A0092B-C50C-407E-A947-70E740481C1C}">
+                <a14:useLocalDpi xmlns:a14="http://schemas.microsoft.com/office/drawing/2010/main" val="0"/>
+              </a:ext>
+            </a:extLst>
+          </a:blip>
+          <a:stretch>
+            <a:fillRect/>
+          </a:stretch>
+        </p:blipFill>
+        <p:spPr>
+          <a:xfrm>
+            <a:off x="8626511" y="4675347"/>
+            <a:ext cx="285098" cy="188149"/>
+          </a:xfrm>
+          <a:prstGeom prst="rect">
+            <a:avLst/>
+          </a:prstGeom>
+        </p:spPr>
+      </p:pic>
+      <p:grpSp>
+        <p:nvGrpSpPr>
+          <p:cNvPr id="85" name="Group 84">
+            <a:extLst>
+              <a:ext uri="{FF2B5EF4-FFF2-40B4-BE49-F238E27FC236}">
+                <a16:creationId xmlns:a16="http://schemas.microsoft.com/office/drawing/2014/main" id="{5082CDDC-6A1C-4E20-8EC6-3EFBF2709A21}"/>
+              </a:ext>
+            </a:extLst>
+          </p:cNvPr>
+          <p:cNvGrpSpPr/>
+          <p:nvPr/>
+        </p:nvGrpSpPr>
+        <p:grpSpPr>
+          <a:xfrm>
+            <a:off x="6926152" y="3076170"/>
+            <a:ext cx="590843" cy="612615"/>
+            <a:chOff x="8862646" y="323557"/>
+            <a:chExt cx="590843" cy="612615"/>
+          </a:xfrm>
+        </p:grpSpPr>
+        <p:cxnSp>
+          <p:nvCxnSpPr>
+            <p:cNvPr id="86" name="Straight Arrow Connector 85">
+              <a:extLst>
+                <a:ext uri="{FF2B5EF4-FFF2-40B4-BE49-F238E27FC236}">
+                  <a16:creationId xmlns:a16="http://schemas.microsoft.com/office/drawing/2014/main" id="{114002D4-F063-4C8A-B659-6B867CD5E857}"/>
+                </a:ext>
+              </a:extLst>
+            </p:cNvPr>
+            <p:cNvCxnSpPr>
+              <a:cxnSpLocks/>
+            </p:cNvCxnSpPr>
+            <p:nvPr/>
+          </p:nvCxnSpPr>
+          <p:spPr>
+            <a:xfrm flipH="1">
+              <a:off x="8862646" y="928468"/>
+              <a:ext cx="590843" cy="0"/>
+            </a:xfrm>
+            <a:prstGeom prst="straightConnector1">
+              <a:avLst/>
+            </a:prstGeom>
+            <a:ln w="41275">
+              <a:solidFill>
+                <a:schemeClr val="accent1">
+                  <a:lumMod val="75000"/>
+                </a:schemeClr>
+              </a:solidFill>
+              <a:tailEnd type="triangle"/>
+            </a:ln>
+          </p:spPr>
+          <p:style>
+            <a:lnRef idx="1">
+              <a:schemeClr val="accent1"/>
+            </a:lnRef>
+            <a:fillRef idx="0">
+              <a:schemeClr val="accent1"/>
+            </a:fillRef>
+            <a:effectRef idx="0">
+              <a:schemeClr val="accent1"/>
+            </a:effectRef>
+            <a:fontRef idx="minor">
+              <a:schemeClr val="tx1"/>
+            </a:fontRef>
+          </p:style>
+        </p:cxnSp>
+        <p:cxnSp>
+          <p:nvCxnSpPr>
+            <p:cNvPr id="87" name="Straight Arrow Connector 86">
+              <a:extLst>
+                <a:ext uri="{FF2B5EF4-FFF2-40B4-BE49-F238E27FC236}">
+                  <a16:creationId xmlns:a16="http://schemas.microsoft.com/office/drawing/2014/main" id="{EA5B53BD-BE42-4C80-B284-7F6F86D8A641}"/>
+                </a:ext>
+              </a:extLst>
+            </p:cNvPr>
+            <p:cNvCxnSpPr>
+              <a:cxnSpLocks/>
+            </p:cNvCxnSpPr>
+            <p:nvPr/>
+          </p:nvCxnSpPr>
+          <p:spPr>
+            <a:xfrm flipH="1" flipV="1">
+              <a:off x="9439423" y="323557"/>
+              <a:ext cx="1" cy="612615"/>
+            </a:xfrm>
+            <a:prstGeom prst="straightConnector1">
+              <a:avLst/>
+            </a:prstGeom>
+            <a:ln w="41275">
+              <a:solidFill>
+                <a:schemeClr val="accent1">
+                  <a:lumMod val="75000"/>
+                </a:schemeClr>
+              </a:solidFill>
+              <a:tailEnd type="triangle"/>
+            </a:ln>
+          </p:spPr>
+          <p:style>
+            <a:lnRef idx="1">
+              <a:schemeClr val="accent1"/>
+            </a:lnRef>
+            <a:fillRef idx="0">
+              <a:schemeClr val="accent1"/>
+            </a:fillRef>
+            <a:effectRef idx="0">
+              <a:schemeClr val="accent1"/>
+            </a:effectRef>
+            <a:fontRef idx="minor">
+              <a:schemeClr val="tx1"/>
+            </a:fontRef>
+          </p:style>
+        </p:cxnSp>
+      </p:grpSp>
+      <p:pic>
+        <p:nvPicPr>
+          <p:cNvPr id="56" name="Picture 55">
+            <a:extLst>
+              <a:ext uri="{FF2B5EF4-FFF2-40B4-BE49-F238E27FC236}">
+                <a16:creationId xmlns:a16="http://schemas.microsoft.com/office/drawing/2014/main" id="{85A1FD78-AC2D-4301-A76B-B13ABF2A2067}"/>
+              </a:ext>
+            </a:extLst>
+          </p:cNvPr>
+          <p:cNvPicPr>
+            <a:picLocks noChangeAspect="1"/>
+          </p:cNvPicPr>
+          <p:nvPr>
+            <p:custDataLst>
+              <p:tags r:id="rId7"/>
+            </p:custDataLst>
+          </p:nvPr>
+        </p:nvPicPr>
+        <p:blipFill>
+          <a:blip r:embed="rId18">
+            <a:extLst>
+              <a:ext uri="{28A0092B-C50C-407E-A947-70E740481C1C}">
+                <a14:useLocalDpi xmlns:a14="http://schemas.microsoft.com/office/drawing/2010/main" val="0"/>
+              </a:ext>
+            </a:extLst>
+          </a:blip>
+          <a:stretch>
+            <a:fillRect/>
+          </a:stretch>
+        </p:blipFill>
+        <p:spPr>
+          <a:xfrm>
+            <a:off x="7263118" y="2830373"/>
+            <a:ext cx="280168" cy="193900"/>
+          </a:xfrm>
+          <a:prstGeom prst="rect">
+            <a:avLst/>
+          </a:prstGeom>
+        </p:spPr>
+      </p:pic>
+      <p:pic>
+        <p:nvPicPr>
+          <p:cNvPr id="69" name="Picture 68">
+            <a:extLst>
+              <a:ext uri="{FF2B5EF4-FFF2-40B4-BE49-F238E27FC236}">
+                <a16:creationId xmlns:a16="http://schemas.microsoft.com/office/drawing/2014/main" id="{BEDB28E2-4CA9-4694-A355-871A947FE8E8}"/>
+              </a:ext>
+            </a:extLst>
+          </p:cNvPr>
+          <p:cNvPicPr>
+            <a:picLocks noChangeAspect="1"/>
+          </p:cNvPicPr>
+          <p:nvPr>
+            <p:custDataLst>
+              <p:tags r:id="rId8"/>
+            </p:custDataLst>
+          </p:nvPr>
+        </p:nvPicPr>
+        <p:blipFill>
+          <a:blip r:embed="rId19">
+            <a:extLst>
+              <a:ext uri="{28A0092B-C50C-407E-A947-70E740481C1C}">
+                <a14:useLocalDpi xmlns:a14="http://schemas.microsoft.com/office/drawing/2010/main" val="0"/>
+              </a:ext>
+            </a:extLst>
+          </a:blip>
+          <a:stretch>
+            <a:fillRect/>
+          </a:stretch>
+        </p:blipFill>
+        <p:spPr>
+          <a:xfrm>
+            <a:off x="6953693" y="3400347"/>
+            <a:ext cx="301530" cy="193900"/>
+          </a:xfrm>
+          <a:prstGeom prst="rect">
+            <a:avLst/>
+          </a:prstGeom>
+        </p:spPr>
+      </p:pic>
+      <p:grpSp>
+        <p:nvGrpSpPr>
+          <p:cNvPr id="93" name="Group 92">
+            <a:extLst>
+              <a:ext uri="{FF2B5EF4-FFF2-40B4-BE49-F238E27FC236}">
+                <a16:creationId xmlns:a16="http://schemas.microsoft.com/office/drawing/2014/main" id="{26155CB8-0FA4-4BCF-8AB7-443164028563}"/>
+              </a:ext>
+            </a:extLst>
+          </p:cNvPr>
+          <p:cNvGrpSpPr/>
+          <p:nvPr/>
+        </p:nvGrpSpPr>
+        <p:grpSpPr>
+          <a:xfrm>
+            <a:off x="8124608" y="1708810"/>
+            <a:ext cx="284440" cy="642440"/>
+            <a:chOff x="8124608" y="1708810"/>
+            <a:chExt cx="284440" cy="642440"/>
+          </a:xfrm>
+        </p:grpSpPr>
+        <p:cxnSp>
+          <p:nvCxnSpPr>
+            <p:cNvPr id="91" name="Straight Connector 90">
+              <a:extLst>
+                <a:ext uri="{FF2B5EF4-FFF2-40B4-BE49-F238E27FC236}">
+                  <a16:creationId xmlns:a16="http://schemas.microsoft.com/office/drawing/2014/main" id="{A73DE736-40A4-46CD-BA90-4447EDD58C5D}"/>
+                </a:ext>
+              </a:extLst>
+            </p:cNvPr>
+            <p:cNvCxnSpPr>
+              <a:cxnSpLocks/>
+            </p:cNvCxnSpPr>
+            <p:nvPr/>
+          </p:nvCxnSpPr>
+          <p:spPr>
+            <a:xfrm>
+              <a:off x="8248224" y="1998263"/>
+              <a:ext cx="160824" cy="352987"/>
+            </a:xfrm>
+            <a:prstGeom prst="line">
+              <a:avLst/>
+            </a:prstGeom>
+            <a:ln w="57150"/>
+          </p:spPr>
+          <p:style>
+            <a:lnRef idx="3">
+              <a:schemeClr val="dk1"/>
+            </a:lnRef>
+            <a:fillRef idx="0">
+              <a:schemeClr val="dk1"/>
+            </a:fillRef>
+            <a:effectRef idx="2">
+              <a:schemeClr val="dk1"/>
+            </a:effectRef>
+            <a:fontRef idx="minor">
+              <a:schemeClr val="tx1"/>
+            </a:fontRef>
+          </p:style>
+        </p:cxnSp>
+        <p:sp>
+          <p:nvSpPr>
+            <p:cNvPr id="70" name="Rectangle 69">
+              <a:extLst>
+                <a:ext uri="{FF2B5EF4-FFF2-40B4-BE49-F238E27FC236}">
+                  <a16:creationId xmlns:a16="http://schemas.microsoft.com/office/drawing/2014/main" id="{556939B7-55A8-4F95-9489-4D2EB617F5A5}"/>
+                </a:ext>
+              </a:extLst>
+            </p:cNvPr>
+            <p:cNvSpPr/>
             <p:nvPr/>
           </p:nvSpPr>
           <p:spPr>
-            <a:xfrm>
-              <a:off x="7512889" y="122512"/>
-              <a:ext cx="276038" cy="369332"/>
+            <a:xfrm rot="20075328">
+              <a:off x="8124608" y="1708810"/>
+              <a:ext cx="144145" cy="406644"/>
             </a:xfrm>
             <a:prstGeom prst="rect">
               <a:avLst/>
             </a:prstGeom>
-            <a:noFill/>
+            <a:solidFill>
+              <a:schemeClr val="accent2">
+                <a:lumMod val="60000"/>
+                <a:lumOff val="40000"/>
+              </a:schemeClr>
+            </a:solidFill>
+            <a:ln>
+              <a:solidFill>
+                <a:schemeClr val="tx1">
+                  <a:lumMod val="95000"/>
+                  <a:lumOff val="5000"/>
+                </a:schemeClr>
+              </a:solidFill>
+            </a:ln>
           </p:spPr>
+          <p:style>
+            <a:lnRef idx="2">
+              <a:schemeClr val="accent1">
+                <a:shade val="50000"/>
+              </a:schemeClr>
+            </a:lnRef>
+            <a:fillRef idx="1">
+              <a:schemeClr val="accent1"/>
+            </a:fillRef>
+            <a:effectRef idx="0">
+              <a:schemeClr val="accent1"/>
+            </a:effectRef>
+            <a:fontRef idx="minor">
+              <a:schemeClr val="lt1"/>
+            </a:fontRef>
+          </p:style>
           <p:txBody>
-            <a:bodyPr wrap="none" rtlCol="0">
-              <a:spAutoFit/>
-            </a:bodyPr>
+            <a:bodyPr rtlCol="0" anchor="ctr"/>
             <a:lstStyle/>
             <a:p>
-              <a:r>
-                <a:rPr lang="en-US" dirty="0"/>
-                <a:t>z</a:t>
-              </a:r>
-            </a:p>
-          </p:txBody>
-        </p:sp>
-        <p:sp>
-          <p:nvSpPr>
-            <p:cNvPr id="58" name="TextBox 57">
-              <a:extLst>
-                <a:ext uri="{FF2B5EF4-FFF2-40B4-BE49-F238E27FC236}">
-                  <a16:creationId xmlns:a16="http://schemas.microsoft.com/office/drawing/2014/main" id="{25080BBA-BD7F-4DFE-A692-F31063DD52D0}"/>
-                </a:ext>
-              </a:extLst>
-            </p:cNvPr>
-            <p:cNvSpPr txBox="1"/>
-            <p:nvPr/>
-          </p:nvSpPr>
-          <p:spPr>
-            <a:xfrm>
-              <a:off x="6953376" y="670538"/>
-              <a:ext cx="284052" cy="369332"/>
-            </a:xfrm>
-            <a:prstGeom prst="rect">
-              <a:avLst/>
-            </a:prstGeom>
-            <a:noFill/>
-          </p:spPr>
-          <p:txBody>
-            <a:bodyPr wrap="none" rtlCol="0">
-              <a:spAutoFit/>
-            </a:bodyPr>
-            <a:lstStyle/>
-            <a:p>
-              <a:r>
-                <a:rPr lang="en-US" dirty="0"/>
-                <a:t>x</a:t>
-              </a:r>
+              <a:pPr algn="ctr"/>
+              <a:endParaRPr lang="en-US"/>
             </a:p>
           </p:txBody>
         </p:sp>
       </p:grpSp>
       <p:grpSp>
         <p:nvGrpSpPr>
-          <p:cNvPr id="60" name="Group 59">
-            <a:extLst>
-              <a:ext uri="{FF2B5EF4-FFF2-40B4-BE49-F238E27FC236}">
-                <a16:creationId xmlns:a16="http://schemas.microsoft.com/office/drawing/2014/main" id="{7D4F5AA9-B310-4844-9E7E-670186FBE80D}"/>
+          <p:cNvPr id="94" name="Group 93">
+            <a:extLst>
+              <a:ext uri="{FF2B5EF4-FFF2-40B4-BE49-F238E27FC236}">
+                <a16:creationId xmlns:a16="http://schemas.microsoft.com/office/drawing/2014/main" id="{1157DBE7-78D0-441E-BDC1-E158697D8748}"/>
               </a:ext>
             </a:extLst>
           </p:cNvPr>
@@ -6494,399 +7191,192 @@
           <p:nvPr/>
         </p:nvGrpSpPr>
         <p:grpSpPr>
-          <a:xfrm>
-            <a:off x="5005008" y="498321"/>
-            <a:ext cx="835551" cy="936172"/>
-            <a:chOff x="6953376" y="122512"/>
-            <a:chExt cx="835551" cy="936172"/>
+          <a:xfrm rot="19842261">
+            <a:off x="7551216" y="1525315"/>
+            <a:ext cx="590843" cy="612615"/>
+            <a:chOff x="8862646" y="323557"/>
+            <a:chExt cx="590843" cy="612615"/>
           </a:xfrm>
         </p:grpSpPr>
-        <p:grpSp>
-          <p:nvGrpSpPr>
-            <p:cNvPr id="61" name="Group 60">
+        <p:cxnSp>
+          <p:nvCxnSpPr>
+            <p:cNvPr id="95" name="Straight Arrow Connector 94">
               <a:extLst>
                 <a:ext uri="{FF2B5EF4-FFF2-40B4-BE49-F238E27FC236}">
-                  <a16:creationId xmlns:a16="http://schemas.microsoft.com/office/drawing/2014/main" id="{02AE9FC2-05EC-4750-AA02-CB91E078F4D4}"/>
+                  <a16:creationId xmlns:a16="http://schemas.microsoft.com/office/drawing/2014/main" id="{EAA15453-3702-46D6-931E-6181E509C514}"/>
                 </a:ext>
               </a:extLst>
             </p:cNvPr>
-            <p:cNvGrpSpPr/>
+            <p:cNvCxnSpPr>
+              <a:cxnSpLocks/>
+            </p:cNvCxnSpPr>
             <p:nvPr/>
-          </p:nvGrpSpPr>
-          <p:grpSpPr>
-            <a:xfrm>
-              <a:off x="7074131" y="446069"/>
-              <a:ext cx="590843" cy="612615"/>
-              <a:chOff x="8862646" y="323557"/>
-              <a:chExt cx="590843" cy="612615"/>
+          </p:nvCxnSpPr>
+          <p:spPr>
+            <a:xfrm flipH="1">
+              <a:off x="8862646" y="928468"/>
+              <a:ext cx="590843" cy="0"/>
             </a:xfrm>
-          </p:grpSpPr>
-          <p:cxnSp>
-            <p:nvCxnSpPr>
-              <p:cNvPr id="64" name="Straight Arrow Connector 63">
-                <a:extLst>
-                  <a:ext uri="{FF2B5EF4-FFF2-40B4-BE49-F238E27FC236}">
-                    <a16:creationId xmlns:a16="http://schemas.microsoft.com/office/drawing/2014/main" id="{D77BF4D3-27DF-4E11-817F-4429C9C260FC}"/>
-                  </a:ext>
-                </a:extLst>
-              </p:cNvPr>
-              <p:cNvCxnSpPr>
-                <a:cxnSpLocks/>
-              </p:cNvCxnSpPr>
-              <p:nvPr/>
-            </p:nvCxnSpPr>
-            <p:spPr>
-              <a:xfrm flipH="1">
-                <a:off x="8862646" y="928468"/>
-                <a:ext cx="590843" cy="0"/>
-              </a:xfrm>
-              <a:prstGeom prst="straightConnector1">
-                <a:avLst/>
-              </a:prstGeom>
-              <a:ln w="41275">
-                <a:solidFill>
-                  <a:schemeClr val="tx1"/>
-                </a:solidFill>
-                <a:tailEnd type="triangle"/>
-              </a:ln>
-            </p:spPr>
-            <p:style>
-              <a:lnRef idx="1">
-                <a:schemeClr val="accent1"/>
-              </a:lnRef>
-              <a:fillRef idx="0">
-                <a:schemeClr val="accent1"/>
-              </a:fillRef>
-              <a:effectRef idx="0">
-                <a:schemeClr val="accent1"/>
-              </a:effectRef>
-              <a:fontRef idx="minor">
-                <a:schemeClr val="tx1"/>
-              </a:fontRef>
-            </p:style>
-          </p:cxnSp>
-          <p:cxnSp>
-            <p:nvCxnSpPr>
-              <p:cNvPr id="65" name="Straight Arrow Connector 64">
-                <a:extLst>
-                  <a:ext uri="{FF2B5EF4-FFF2-40B4-BE49-F238E27FC236}">
-                    <a16:creationId xmlns:a16="http://schemas.microsoft.com/office/drawing/2014/main" id="{CE195B13-D358-454B-9355-2E545572124D}"/>
-                  </a:ext>
-                </a:extLst>
-              </p:cNvPr>
-              <p:cNvCxnSpPr>
-                <a:cxnSpLocks/>
-              </p:cNvCxnSpPr>
-              <p:nvPr/>
-            </p:nvCxnSpPr>
-            <p:spPr>
-              <a:xfrm flipH="1" flipV="1">
-                <a:off x="9439423" y="323557"/>
-                <a:ext cx="1" cy="612615"/>
-              </a:xfrm>
-              <a:prstGeom prst="straightConnector1">
-                <a:avLst/>
-              </a:prstGeom>
-              <a:ln w="41275">
-                <a:solidFill>
-                  <a:schemeClr val="tx1"/>
-                </a:solidFill>
-                <a:tailEnd type="triangle"/>
-              </a:ln>
-            </p:spPr>
-            <p:style>
-              <a:lnRef idx="1">
-                <a:schemeClr val="accent1"/>
-              </a:lnRef>
-              <a:fillRef idx="0">
-                <a:schemeClr val="accent1"/>
-              </a:fillRef>
-              <a:effectRef idx="0">
-                <a:schemeClr val="accent1"/>
-              </a:effectRef>
-              <a:fontRef idx="minor">
-                <a:schemeClr val="tx1"/>
-              </a:fontRef>
-            </p:style>
-          </p:cxnSp>
-        </p:grpSp>
-        <p:sp>
-          <p:nvSpPr>
-            <p:cNvPr id="62" name="TextBox 61">
+            <a:prstGeom prst="straightConnector1">
+              <a:avLst/>
+            </a:prstGeom>
+            <a:ln w="41275">
+              <a:solidFill>
+                <a:schemeClr val="accent1">
+                  <a:lumMod val="75000"/>
+                </a:schemeClr>
+              </a:solidFill>
+              <a:tailEnd type="triangle"/>
+            </a:ln>
+          </p:spPr>
+          <p:style>
+            <a:lnRef idx="1">
+              <a:schemeClr val="accent1"/>
+            </a:lnRef>
+            <a:fillRef idx="0">
+              <a:schemeClr val="accent1"/>
+            </a:fillRef>
+            <a:effectRef idx="0">
+              <a:schemeClr val="accent1"/>
+            </a:effectRef>
+            <a:fontRef idx="minor">
+              <a:schemeClr val="tx1"/>
+            </a:fontRef>
+          </p:style>
+        </p:cxnSp>
+        <p:cxnSp>
+          <p:nvCxnSpPr>
+            <p:cNvPr id="96" name="Straight Arrow Connector 95">
               <a:extLst>
                 <a:ext uri="{FF2B5EF4-FFF2-40B4-BE49-F238E27FC236}">
-                  <a16:creationId xmlns:a16="http://schemas.microsoft.com/office/drawing/2014/main" id="{CC19D65D-3FE1-45FD-8606-E5AD6DA21B69}"/>
+                  <a16:creationId xmlns:a16="http://schemas.microsoft.com/office/drawing/2014/main" id="{72761EBE-E732-4BBD-A8B4-BFF7DD05DF8C}"/>
                 </a:ext>
               </a:extLst>
             </p:cNvPr>
-            <p:cNvSpPr txBox="1"/>
+            <p:cNvCxnSpPr>
+              <a:cxnSpLocks/>
+            </p:cNvCxnSpPr>
             <p:nvPr/>
-          </p:nvSpPr>
+          </p:nvCxnSpPr>
           <p:spPr>
-            <a:xfrm>
-              <a:off x="7512889" y="122512"/>
-              <a:ext cx="276038" cy="369332"/>
+            <a:xfrm flipH="1" flipV="1">
+              <a:off x="9439423" y="323557"/>
+              <a:ext cx="1" cy="612615"/>
             </a:xfrm>
-            <a:prstGeom prst="rect">
+            <a:prstGeom prst="straightConnector1">
               <a:avLst/>
             </a:prstGeom>
-            <a:noFill/>
+            <a:ln w="41275">
+              <a:solidFill>
+                <a:schemeClr val="accent1">
+                  <a:lumMod val="75000"/>
+                </a:schemeClr>
+              </a:solidFill>
+              <a:tailEnd type="triangle"/>
+            </a:ln>
           </p:spPr>
-          <p:txBody>
-            <a:bodyPr wrap="none" rtlCol="0">
-              <a:spAutoFit/>
-            </a:bodyPr>
-            <a:lstStyle/>
-            <a:p>
-              <a:r>
-                <a:rPr lang="en-US" dirty="0"/>
-                <a:t>z</a:t>
-              </a:r>
-            </a:p>
-          </p:txBody>
-        </p:sp>
-        <p:sp>
-          <p:nvSpPr>
-            <p:cNvPr id="63" name="TextBox 62">
-              <a:extLst>
-                <a:ext uri="{FF2B5EF4-FFF2-40B4-BE49-F238E27FC236}">
-                  <a16:creationId xmlns:a16="http://schemas.microsoft.com/office/drawing/2014/main" id="{F0627F96-DD41-4760-85AB-10E284EFF09D}"/>
-                </a:ext>
-              </a:extLst>
-            </p:cNvPr>
-            <p:cNvSpPr txBox="1"/>
-            <p:nvPr/>
-          </p:nvSpPr>
-          <p:spPr>
-            <a:xfrm>
-              <a:off x="6953376" y="670538"/>
-              <a:ext cx="284052" cy="369332"/>
-            </a:xfrm>
-            <a:prstGeom prst="rect">
-              <a:avLst/>
-            </a:prstGeom>
-            <a:noFill/>
-          </p:spPr>
-          <p:txBody>
-            <a:bodyPr wrap="none" rtlCol="0">
-              <a:spAutoFit/>
-            </a:bodyPr>
-            <a:lstStyle/>
-            <a:p>
-              <a:r>
-                <a:rPr lang="en-US" dirty="0"/>
-                <a:t>x</a:t>
-              </a:r>
-            </a:p>
-          </p:txBody>
-        </p:sp>
+          <p:style>
+            <a:lnRef idx="1">
+              <a:schemeClr val="accent1"/>
+            </a:lnRef>
+            <a:fillRef idx="0">
+              <a:schemeClr val="accent1"/>
+            </a:fillRef>
+            <a:effectRef idx="0">
+              <a:schemeClr val="accent1"/>
+            </a:effectRef>
+            <a:fontRef idx="minor">
+              <a:schemeClr val="tx1"/>
+            </a:fontRef>
+          </p:style>
+        </p:cxnSp>
       </p:grpSp>
-      <p:grpSp>
-        <p:nvGrpSpPr>
-          <p:cNvPr id="72" name="Group 71">
-            <a:extLst>
-              <a:ext uri="{FF2B5EF4-FFF2-40B4-BE49-F238E27FC236}">
-                <a16:creationId xmlns:a16="http://schemas.microsoft.com/office/drawing/2014/main" id="{D53E13BF-8017-490B-8A5E-EAAF9EC9F463}"/>
-              </a:ext>
-            </a:extLst>
-          </p:cNvPr>
-          <p:cNvGrpSpPr/>
-          <p:nvPr/>
-        </p:nvGrpSpPr>
-        <p:grpSpPr>
-          <a:xfrm>
-            <a:off x="8505871" y="4014610"/>
-            <a:ext cx="714796" cy="936172"/>
-            <a:chOff x="7074131" y="122512"/>
-            <a:chExt cx="714796" cy="936172"/>
-          </a:xfrm>
-        </p:grpSpPr>
-        <p:grpSp>
-          <p:nvGrpSpPr>
-            <p:cNvPr id="73" name="Group 72">
-              <a:extLst>
-                <a:ext uri="{FF2B5EF4-FFF2-40B4-BE49-F238E27FC236}">
-                  <a16:creationId xmlns:a16="http://schemas.microsoft.com/office/drawing/2014/main" id="{E8E9F8F5-7211-4C26-BAD2-202CBF01FFF2}"/>
-                </a:ext>
-              </a:extLst>
-            </p:cNvPr>
-            <p:cNvGrpSpPr/>
-            <p:nvPr/>
-          </p:nvGrpSpPr>
-          <p:grpSpPr>
-            <a:xfrm>
-              <a:off x="7074131" y="446069"/>
-              <a:ext cx="590843" cy="612615"/>
-              <a:chOff x="8862646" y="323557"/>
-              <a:chExt cx="590843" cy="612615"/>
-            </a:xfrm>
-          </p:grpSpPr>
-          <p:cxnSp>
-            <p:nvCxnSpPr>
-              <p:cNvPr id="76" name="Straight Arrow Connector 75">
-                <a:extLst>
-                  <a:ext uri="{FF2B5EF4-FFF2-40B4-BE49-F238E27FC236}">
-                    <a16:creationId xmlns:a16="http://schemas.microsoft.com/office/drawing/2014/main" id="{05A7E404-F966-4DC6-80C8-4EF4925589E5}"/>
-                  </a:ext>
-                </a:extLst>
-              </p:cNvPr>
-              <p:cNvCxnSpPr>
-                <a:cxnSpLocks/>
-              </p:cNvCxnSpPr>
-              <p:nvPr/>
-            </p:nvCxnSpPr>
-            <p:spPr>
-              <a:xfrm flipH="1">
-                <a:off x="8862646" y="928468"/>
-                <a:ext cx="590843" cy="0"/>
-              </a:xfrm>
-              <a:prstGeom prst="straightConnector1">
-                <a:avLst/>
-              </a:prstGeom>
-              <a:ln w="41275">
-                <a:solidFill>
-                  <a:schemeClr val="tx1"/>
-                </a:solidFill>
-                <a:tailEnd type="triangle"/>
-              </a:ln>
-            </p:spPr>
-            <p:style>
-              <a:lnRef idx="1">
-                <a:schemeClr val="accent1"/>
-              </a:lnRef>
-              <a:fillRef idx="0">
-                <a:schemeClr val="accent1"/>
-              </a:fillRef>
-              <a:effectRef idx="0">
-                <a:schemeClr val="accent1"/>
-              </a:effectRef>
-              <a:fontRef idx="minor">
-                <a:schemeClr val="tx1"/>
-              </a:fontRef>
-            </p:style>
-          </p:cxnSp>
-          <p:cxnSp>
-            <p:nvCxnSpPr>
-              <p:cNvPr id="77" name="Straight Arrow Connector 76">
-                <a:extLst>
-                  <a:ext uri="{FF2B5EF4-FFF2-40B4-BE49-F238E27FC236}">
-                    <a16:creationId xmlns:a16="http://schemas.microsoft.com/office/drawing/2014/main" id="{A80656DB-AE9E-4EE4-8E87-233984F290D6}"/>
-                  </a:ext>
-                </a:extLst>
-              </p:cNvPr>
-              <p:cNvCxnSpPr>
-                <a:cxnSpLocks/>
-              </p:cNvCxnSpPr>
-              <p:nvPr/>
-            </p:nvCxnSpPr>
-            <p:spPr>
-              <a:xfrm flipH="1" flipV="1">
-                <a:off x="9439423" y="323557"/>
-                <a:ext cx="1" cy="612615"/>
-              </a:xfrm>
-              <a:prstGeom prst="straightConnector1">
-                <a:avLst/>
-              </a:prstGeom>
-              <a:ln w="41275">
-                <a:solidFill>
-                  <a:schemeClr val="tx1"/>
-                </a:solidFill>
-                <a:tailEnd type="triangle"/>
-              </a:ln>
-            </p:spPr>
-            <p:style>
-              <a:lnRef idx="1">
-                <a:schemeClr val="accent1"/>
-              </a:lnRef>
-              <a:fillRef idx="0">
-                <a:schemeClr val="accent1"/>
-              </a:fillRef>
-              <a:effectRef idx="0">
-                <a:schemeClr val="accent1"/>
-              </a:effectRef>
-              <a:fontRef idx="minor">
-                <a:schemeClr val="tx1"/>
-              </a:fontRef>
-            </p:style>
-          </p:cxnSp>
-        </p:grpSp>
-        <p:sp>
-          <p:nvSpPr>
-            <p:cNvPr id="74" name="TextBox 73">
-              <a:extLst>
-                <a:ext uri="{FF2B5EF4-FFF2-40B4-BE49-F238E27FC236}">
-                  <a16:creationId xmlns:a16="http://schemas.microsoft.com/office/drawing/2014/main" id="{1DE979AB-1096-4F5F-8C03-38F269F4CA8B}"/>
-                </a:ext>
-              </a:extLst>
-            </p:cNvPr>
-            <p:cNvSpPr txBox="1"/>
-            <p:nvPr/>
-          </p:nvSpPr>
-          <p:spPr>
-            <a:xfrm>
-              <a:off x="7512889" y="122512"/>
-              <a:ext cx="276038" cy="369332"/>
-            </a:xfrm>
-            <a:prstGeom prst="rect">
-              <a:avLst/>
-            </a:prstGeom>
-            <a:noFill/>
-          </p:spPr>
-          <p:txBody>
-            <a:bodyPr wrap="none" rtlCol="0">
-              <a:spAutoFit/>
-            </a:bodyPr>
-            <a:lstStyle/>
-            <a:p>
-              <a:r>
-                <a:rPr lang="en-US" dirty="0"/>
-                <a:t>z</a:t>
-              </a:r>
-            </a:p>
-          </p:txBody>
-        </p:sp>
-        <p:sp>
-          <p:nvSpPr>
-            <p:cNvPr id="75" name="TextBox 74">
-              <a:extLst>
-                <a:ext uri="{FF2B5EF4-FFF2-40B4-BE49-F238E27FC236}">
-                  <a16:creationId xmlns:a16="http://schemas.microsoft.com/office/drawing/2014/main" id="{C7638235-2383-4B57-B8FB-56293BFA34A4}"/>
-                </a:ext>
-              </a:extLst>
-            </p:cNvPr>
-            <p:cNvSpPr txBox="1"/>
-            <p:nvPr/>
-          </p:nvSpPr>
-          <p:spPr>
-            <a:xfrm>
-              <a:off x="7079988" y="670538"/>
-              <a:ext cx="284052" cy="369332"/>
-            </a:xfrm>
-            <a:prstGeom prst="rect">
-              <a:avLst/>
-            </a:prstGeom>
-            <a:noFill/>
-          </p:spPr>
-          <p:txBody>
-            <a:bodyPr wrap="none" rtlCol="0">
-              <a:spAutoFit/>
-            </a:bodyPr>
-            <a:lstStyle/>
-            <a:p>
-              <a:r>
-                <a:rPr lang="en-US" dirty="0"/>
-                <a:t>x</a:t>
-              </a:r>
-            </a:p>
-          </p:txBody>
-        </p:sp>
-      </p:grpSp>
+      <p:pic>
+        <p:nvPicPr>
+          <p:cNvPr id="102" name="Picture 101">
+            <a:extLst>
+              <a:ext uri="{FF2B5EF4-FFF2-40B4-BE49-F238E27FC236}">
+                <a16:creationId xmlns:a16="http://schemas.microsoft.com/office/drawing/2014/main" id="{755834C7-638D-4BE8-A1D8-4DEE650D34D6}"/>
+              </a:ext>
+            </a:extLst>
+          </p:cNvPr>
+          <p:cNvPicPr>
+            <a:picLocks noChangeAspect="1"/>
+          </p:cNvPicPr>
+          <p:nvPr>
+            <p:custDataLst>
+              <p:tags r:id="rId9"/>
+            </p:custDataLst>
+          </p:nvPr>
+        </p:nvPicPr>
+        <p:blipFill>
+          <a:blip r:embed="rId20">
+            <a:extLst>
+              <a:ext uri="{28A0092B-C50C-407E-A947-70E740481C1C}">
+                <a14:useLocalDpi xmlns:a14="http://schemas.microsoft.com/office/drawing/2010/main" val="0"/>
+              </a:ext>
+            </a:extLst>
+          </a:blip>
+          <a:stretch>
+            <a:fillRect/>
+          </a:stretch>
+        </p:blipFill>
+        <p:spPr>
+          <a:xfrm rot="19842261">
+            <a:off x="7664092" y="1628523"/>
+            <a:ext cx="271952" cy="188971"/>
+          </a:xfrm>
+          <a:prstGeom prst="rect">
+            <a:avLst/>
+          </a:prstGeom>
+        </p:spPr>
+      </p:pic>
+      <p:pic>
+        <p:nvPicPr>
+          <p:cNvPr id="100" name="Picture 99">
+            <a:extLst>
+              <a:ext uri="{FF2B5EF4-FFF2-40B4-BE49-F238E27FC236}">
+                <a16:creationId xmlns:a16="http://schemas.microsoft.com/office/drawing/2014/main" id="{6553CDCB-7CA1-4F24-8EB9-AF092A1B6487}"/>
+              </a:ext>
+            </a:extLst>
+          </p:cNvPr>
+          <p:cNvPicPr>
+            <a:picLocks noChangeAspect="1"/>
+          </p:cNvPicPr>
+          <p:nvPr>
+            <p:custDataLst>
+              <p:tags r:id="rId10"/>
+            </p:custDataLst>
+          </p:nvPr>
+        </p:nvPicPr>
+        <p:blipFill>
+          <a:blip r:embed="rId21">
+            <a:extLst>
+              <a:ext uri="{28A0092B-C50C-407E-A947-70E740481C1C}">
+                <a14:useLocalDpi xmlns:a14="http://schemas.microsoft.com/office/drawing/2010/main" val="0"/>
+              </a:ext>
+            </a:extLst>
+          </a:blip>
+          <a:stretch>
+            <a:fillRect/>
+          </a:stretch>
+        </p:blipFill>
+        <p:spPr>
+          <a:xfrm rot="19842261">
+            <a:off x="7571087" y="2303303"/>
+            <a:ext cx="294136" cy="188971"/>
+          </a:xfrm>
+          <a:prstGeom prst="rect">
+            <a:avLst/>
+          </a:prstGeom>
+        </p:spPr>
+      </p:pic>
       <p:sp>
         <p:nvSpPr>
-          <p:cNvPr id="78" name="TextBox 77">
-            <a:extLst>
-              <a:ext uri="{FF2B5EF4-FFF2-40B4-BE49-F238E27FC236}">
-                <a16:creationId xmlns:a16="http://schemas.microsoft.com/office/drawing/2014/main" id="{B951398C-9FD4-4CA6-A043-EB5547CDCA8F}"/>
+          <p:cNvPr id="2" name="TextBox 1">
+            <a:extLst>
+              <a:ext uri="{FF2B5EF4-FFF2-40B4-BE49-F238E27FC236}">
+                <a16:creationId xmlns:a16="http://schemas.microsoft.com/office/drawing/2014/main" id="{8A027A8E-7482-41C7-973E-E455BA3A0753}"/>
               </a:ext>
             </a:extLst>
           </p:cNvPr>
@@ -6895,13 +7385,18 @@
         </p:nvSpPr>
         <p:spPr>
           <a:xfrm>
-            <a:off x="8414990" y="937946"/>
-            <a:ext cx="330540" cy="369332"/>
+            <a:off x="3222588" y="780432"/>
+            <a:ext cx="823302" cy="369332"/>
           </a:xfrm>
           <a:prstGeom prst="rect">
             <a:avLst/>
           </a:prstGeom>
-          <a:noFill/>
+          <a:solidFill>
+            <a:schemeClr val="accent2">
+              <a:lumMod val="40000"/>
+              <a:lumOff val="60000"/>
+            </a:schemeClr>
+          </a:solidFill>
         </p:spPr>
         <p:txBody>
           <a:bodyPr wrap="none" rtlCol="0">
@@ -6911,17 +7406,17 @@
           <a:p>
             <a:r>
               <a:rPr lang="en-US" dirty="0"/>
-              <a:t>G</a:t>
+              <a:t>Gantry</a:t>
             </a:r>
           </a:p>
         </p:txBody>
       </p:sp>
       <p:sp>
         <p:nvSpPr>
-          <p:cNvPr id="80" name="TextBox 79">
-            <a:extLst>
-              <a:ext uri="{FF2B5EF4-FFF2-40B4-BE49-F238E27FC236}">
-                <a16:creationId xmlns:a16="http://schemas.microsoft.com/office/drawing/2014/main" id="{514F79E4-2E7E-438B-9F1F-8F54ED49DD79}"/>
+          <p:cNvPr id="63" name="TextBox 62">
+            <a:extLst>
+              <a:ext uri="{FF2B5EF4-FFF2-40B4-BE49-F238E27FC236}">
+                <a16:creationId xmlns:a16="http://schemas.microsoft.com/office/drawing/2014/main" id="{3ACD87B8-6635-472E-A0C6-ACD13C7C25A4}"/>
               </a:ext>
             </a:extLst>
           </p:cNvPr>
@@ -6930,13 +7425,18 @@
         </p:nvSpPr>
         <p:spPr>
           <a:xfrm>
-            <a:off x="5716323" y="1008551"/>
-            <a:ext cx="296876" cy="369332"/>
+            <a:off x="3314545" y="3189926"/>
+            <a:ext cx="1104661" cy="369332"/>
           </a:xfrm>
           <a:prstGeom prst="rect">
             <a:avLst/>
           </a:prstGeom>
-          <a:noFill/>
+          <a:solidFill>
+            <a:schemeClr val="accent2">
+              <a:lumMod val="40000"/>
+              <a:lumOff val="60000"/>
+            </a:schemeClr>
+          </a:solidFill>
         </p:spPr>
         <p:txBody>
           <a:bodyPr wrap="none" rtlCol="0">
@@ -6946,17 +7446,17 @@
           <a:p>
             <a:r>
               <a:rPr lang="en-US" dirty="0"/>
-              <a:t>T</a:t>
+              <a:t>Container</a:t>
             </a:r>
           </a:p>
         </p:txBody>
       </p:sp>
       <p:sp>
         <p:nvSpPr>
-          <p:cNvPr id="81" name="TextBox 80">
-            <a:extLst>
-              <a:ext uri="{FF2B5EF4-FFF2-40B4-BE49-F238E27FC236}">
-                <a16:creationId xmlns:a16="http://schemas.microsoft.com/office/drawing/2014/main" id="{F938623F-413A-4A1D-B266-9EC9F504CA9E}"/>
+          <p:cNvPr id="66" name="TextBox 65">
+            <a:extLst>
+              <a:ext uri="{FF2B5EF4-FFF2-40B4-BE49-F238E27FC236}">
+                <a16:creationId xmlns:a16="http://schemas.microsoft.com/office/drawing/2014/main" id="{C6736ECF-5920-45F7-AA25-2AA4CA47B9C8}"/>
               </a:ext>
             </a:extLst>
           </p:cNvPr>
@@ -6965,13 +7465,18 @@
         </p:nvSpPr>
         <p:spPr>
           <a:xfrm>
-            <a:off x="9127172" y="4766116"/>
-            <a:ext cx="290464" cy="369332"/>
+            <a:off x="3857766" y="2144058"/>
+            <a:ext cx="804772" cy="369332"/>
           </a:xfrm>
           <a:prstGeom prst="rect">
             <a:avLst/>
           </a:prstGeom>
-          <a:noFill/>
+          <a:solidFill>
+            <a:schemeClr val="accent2">
+              <a:lumMod val="40000"/>
+              <a:lumOff val="60000"/>
+            </a:schemeClr>
+          </a:solidFill>
         </p:spPr>
         <p:txBody>
           <a:bodyPr wrap="none" rtlCol="0">
@@ -6981,7 +7486,213 @@
           <a:p>
             <a:r>
               <a:rPr lang="en-US" dirty="0"/>
-              <a:t>F</a:t>
+              <a:t>Trolley</a:t>
+            </a:r>
+          </a:p>
+        </p:txBody>
+      </p:sp>
+      <p:cxnSp>
+        <p:nvCxnSpPr>
+          <p:cNvPr id="6" name="Straight Arrow Connector 5">
+            <a:extLst>
+              <a:ext uri="{FF2B5EF4-FFF2-40B4-BE49-F238E27FC236}">
+                <a16:creationId xmlns:a16="http://schemas.microsoft.com/office/drawing/2014/main" id="{CCC10222-6FE2-47D0-A147-A5F56DE143A9}"/>
+              </a:ext>
+            </a:extLst>
+          </p:cNvPr>
+          <p:cNvCxnSpPr>
+            <a:cxnSpLocks/>
+            <a:stCxn id="66" idx="0"/>
+            <a:endCxn id="9" idx="2"/>
+          </p:cNvCxnSpPr>
+          <p:nvPr/>
+        </p:nvCxnSpPr>
+        <p:spPr>
+          <a:xfrm flipV="1">
+            <a:off x="4260152" y="1503975"/>
+            <a:ext cx="1413872" cy="640083"/>
+          </a:xfrm>
+          <a:prstGeom prst="straightConnector1">
+            <a:avLst/>
+          </a:prstGeom>
+          <a:ln>
+            <a:tailEnd type="triangle"/>
+          </a:ln>
+        </p:spPr>
+        <p:style>
+          <a:lnRef idx="1">
+            <a:schemeClr val="accent1"/>
+          </a:lnRef>
+          <a:fillRef idx="0">
+            <a:schemeClr val="accent1"/>
+          </a:fillRef>
+          <a:effectRef idx="0">
+            <a:schemeClr val="accent1"/>
+          </a:effectRef>
+          <a:fontRef idx="minor">
+            <a:schemeClr val="tx1"/>
+          </a:fontRef>
+        </p:style>
+      </p:cxnSp>
+      <p:sp>
+        <p:nvSpPr>
+          <p:cNvPr id="73" name="TextBox 72">
+            <a:extLst>
+              <a:ext uri="{FF2B5EF4-FFF2-40B4-BE49-F238E27FC236}">
+                <a16:creationId xmlns:a16="http://schemas.microsoft.com/office/drawing/2014/main" id="{145E1716-35CB-469A-9725-9D3E9D8744F1}"/>
+              </a:ext>
+            </a:extLst>
+          </p:cNvPr>
+          <p:cNvSpPr txBox="1"/>
+          <p:nvPr/>
+        </p:nvSpPr>
+        <p:spPr>
+          <a:xfrm>
+            <a:off x="6681030" y="1770631"/>
+            <a:ext cx="647934" cy="369332"/>
+          </a:xfrm>
+          <a:prstGeom prst="rect">
+            <a:avLst/>
+          </a:prstGeom>
+          <a:solidFill>
+            <a:schemeClr val="accent2">
+              <a:lumMod val="40000"/>
+              <a:lumOff val="60000"/>
+            </a:schemeClr>
+          </a:solidFill>
+        </p:spPr>
+        <p:txBody>
+          <a:bodyPr wrap="none" rtlCol="0">
+            <a:spAutoFit/>
+          </a:bodyPr>
+          <a:lstStyle/>
+          <a:p>
+            <a:r>
+              <a:rPr lang="en-US" dirty="0"/>
+              <a:t>Lidar</a:t>
+            </a:r>
+          </a:p>
+        </p:txBody>
+      </p:sp>
+      <p:cxnSp>
+        <p:nvCxnSpPr>
+          <p:cNvPr id="74" name="Straight Arrow Connector 73">
+            <a:extLst>
+              <a:ext uri="{FF2B5EF4-FFF2-40B4-BE49-F238E27FC236}">
+                <a16:creationId xmlns:a16="http://schemas.microsoft.com/office/drawing/2014/main" id="{5CC67526-D996-4CB7-A479-A06F0C5C3D39}"/>
+              </a:ext>
+            </a:extLst>
+          </p:cNvPr>
+          <p:cNvCxnSpPr>
+            <a:cxnSpLocks/>
+          </p:cNvCxnSpPr>
+          <p:nvPr/>
+        </p:nvCxnSpPr>
+        <p:spPr>
+          <a:xfrm>
+            <a:off x="7323472" y="1945794"/>
+            <a:ext cx="718048" cy="0"/>
+          </a:xfrm>
+          <a:prstGeom prst="straightConnector1">
+            <a:avLst/>
+          </a:prstGeom>
+          <a:ln>
+            <a:tailEnd type="triangle"/>
+          </a:ln>
+        </p:spPr>
+        <p:style>
+          <a:lnRef idx="1">
+            <a:schemeClr val="accent1"/>
+          </a:lnRef>
+          <a:fillRef idx="0">
+            <a:schemeClr val="accent1"/>
+          </a:fillRef>
+          <a:effectRef idx="0">
+            <a:schemeClr val="accent1"/>
+          </a:effectRef>
+          <a:fontRef idx="minor">
+            <a:schemeClr val="tx1"/>
+          </a:fontRef>
+        </p:style>
+      </p:cxnSp>
+      <p:cxnSp>
+        <p:nvCxnSpPr>
+          <p:cNvPr id="55" name="Connector: Elbow 54">
+            <a:extLst>
+              <a:ext uri="{FF2B5EF4-FFF2-40B4-BE49-F238E27FC236}">
+                <a16:creationId xmlns:a16="http://schemas.microsoft.com/office/drawing/2014/main" id="{2A79EBC8-8673-4C3A-BDE0-45338640460C}"/>
+              </a:ext>
+            </a:extLst>
+          </p:cNvPr>
+          <p:cNvCxnSpPr>
+            <a:cxnSpLocks/>
+            <a:stCxn id="63" idx="3"/>
+          </p:cNvCxnSpPr>
+          <p:nvPr/>
+        </p:nvCxnSpPr>
+        <p:spPr>
+          <a:xfrm>
+            <a:off x="4419206" y="3374592"/>
+            <a:ext cx="128811" cy="299397"/>
+          </a:xfrm>
+          <a:prstGeom prst="bentConnector2">
+            <a:avLst/>
+          </a:prstGeom>
+          <a:ln>
+            <a:tailEnd type="triangle"/>
+          </a:ln>
+        </p:spPr>
+        <p:style>
+          <a:lnRef idx="1">
+            <a:schemeClr val="accent1"/>
+          </a:lnRef>
+          <a:fillRef idx="0">
+            <a:schemeClr val="accent1"/>
+          </a:fillRef>
+          <a:effectRef idx="0">
+            <a:schemeClr val="accent1"/>
+          </a:effectRef>
+          <a:fontRef idx="minor">
+            <a:schemeClr val="tx1"/>
+          </a:fontRef>
+        </p:style>
+      </p:cxnSp>
+      <p:sp>
+        <p:nvSpPr>
+          <p:cNvPr id="83" name="TextBox 82">
+            <a:extLst>
+              <a:ext uri="{FF2B5EF4-FFF2-40B4-BE49-F238E27FC236}">
+                <a16:creationId xmlns:a16="http://schemas.microsoft.com/office/drawing/2014/main" id="{B22D1785-E650-45D1-8A60-D2C2A3194E59}"/>
+              </a:ext>
+            </a:extLst>
+          </p:cNvPr>
+          <p:cNvSpPr txBox="1"/>
+          <p:nvPr/>
+        </p:nvSpPr>
+        <p:spPr>
+          <a:xfrm>
+            <a:off x="3131467" y="5019254"/>
+            <a:ext cx="894284" cy="369332"/>
+          </a:xfrm>
+          <a:prstGeom prst="rect">
+            <a:avLst/>
+          </a:prstGeom>
+          <a:solidFill>
+            <a:schemeClr val="accent2">
+              <a:lumMod val="40000"/>
+              <a:lumOff val="60000"/>
+            </a:schemeClr>
+          </a:solidFill>
+        </p:spPr>
+        <p:txBody>
+          <a:bodyPr wrap="none" rtlCol="0">
+            <a:spAutoFit/>
+          </a:bodyPr>
+          <a:lstStyle/>
+          <a:p>
+            <a:r>
+              <a:rPr lang="en-US" dirty="0"/>
+              <a:t>Ground</a:t>
             </a:r>
           </a:p>
         </p:txBody>
@@ -8453,6 +9164,11 @@
             <a:prstGeom prst="rect">
               <a:avLst/>
             </a:prstGeom>
+            <a:solidFill>
+              <a:schemeClr val="accent4">
+                <a:lumMod val="75000"/>
+              </a:schemeClr>
+            </a:solidFill>
             <a:ln>
               <a:solidFill>
                 <a:schemeClr val="tx1"/>
@@ -8934,10 +9650,10 @@
       </p:grpSp>
       <p:grpSp>
         <p:nvGrpSpPr>
-          <p:cNvPr id="66" name="Group 65">
-            <a:extLst>
-              <a:ext uri="{FF2B5EF4-FFF2-40B4-BE49-F238E27FC236}">
-                <a16:creationId xmlns:a16="http://schemas.microsoft.com/office/drawing/2014/main" id="{045C68E4-572E-4FDB-94E1-8E407E65E2E4}"/>
+          <p:cNvPr id="67" name="Group 66">
+            <a:extLst>
+              <a:ext uri="{FF2B5EF4-FFF2-40B4-BE49-F238E27FC236}">
+                <a16:creationId xmlns:a16="http://schemas.microsoft.com/office/drawing/2014/main" id="{B425E9CC-5A1F-4CBB-9C1D-00748E04908F}"/>
               </a:ext>
             </a:extLst>
           </p:cNvPr>
@@ -8946,198 +9662,770 @@
         </p:nvGrpSpPr>
         <p:grpSpPr>
           <a:xfrm>
-            <a:off x="5614133" y="530346"/>
-            <a:ext cx="835551" cy="936172"/>
-            <a:chOff x="6953376" y="122512"/>
-            <a:chExt cx="835551" cy="936172"/>
+            <a:off x="5734888" y="853903"/>
+            <a:ext cx="590843" cy="612615"/>
+            <a:chOff x="8862646" y="323557"/>
+            <a:chExt cx="590843" cy="612615"/>
           </a:xfrm>
         </p:grpSpPr>
-        <p:grpSp>
-          <p:nvGrpSpPr>
-            <p:cNvPr id="67" name="Group 66">
+        <p:cxnSp>
+          <p:nvCxnSpPr>
+            <p:cNvPr id="70" name="Straight Arrow Connector 69">
               <a:extLst>
                 <a:ext uri="{FF2B5EF4-FFF2-40B4-BE49-F238E27FC236}">
-                  <a16:creationId xmlns:a16="http://schemas.microsoft.com/office/drawing/2014/main" id="{B425E9CC-5A1F-4CBB-9C1D-00748E04908F}"/>
+                  <a16:creationId xmlns:a16="http://schemas.microsoft.com/office/drawing/2014/main" id="{2227EFA8-7E54-4632-885E-B3A66AA5F505}"/>
                 </a:ext>
               </a:extLst>
             </p:cNvPr>
-            <p:cNvGrpSpPr/>
+            <p:cNvCxnSpPr>
+              <a:cxnSpLocks/>
+            </p:cNvCxnSpPr>
             <p:nvPr/>
-          </p:nvGrpSpPr>
-          <p:grpSpPr>
-            <a:xfrm>
-              <a:off x="7074131" y="446069"/>
-              <a:ext cx="590843" cy="612615"/>
-              <a:chOff x="8862646" y="323557"/>
-              <a:chExt cx="590843" cy="612615"/>
+          </p:nvCxnSpPr>
+          <p:spPr>
+            <a:xfrm flipH="1">
+              <a:off x="8862646" y="928468"/>
+              <a:ext cx="590843" cy="0"/>
             </a:xfrm>
-          </p:grpSpPr>
-          <p:cxnSp>
-            <p:nvCxnSpPr>
-              <p:cNvPr id="70" name="Straight Arrow Connector 69">
-                <a:extLst>
-                  <a:ext uri="{FF2B5EF4-FFF2-40B4-BE49-F238E27FC236}">
-                    <a16:creationId xmlns:a16="http://schemas.microsoft.com/office/drawing/2014/main" id="{2227EFA8-7E54-4632-885E-B3A66AA5F505}"/>
-                  </a:ext>
-                </a:extLst>
-              </p:cNvPr>
-              <p:cNvCxnSpPr>
-                <a:cxnSpLocks/>
-              </p:cNvCxnSpPr>
-              <p:nvPr/>
-            </p:nvCxnSpPr>
-            <p:spPr>
-              <a:xfrm flipH="1">
-                <a:off x="8862646" y="928468"/>
-                <a:ext cx="590843" cy="0"/>
-              </a:xfrm>
-              <a:prstGeom prst="straightConnector1">
-                <a:avLst/>
-              </a:prstGeom>
-              <a:ln w="41275">
-                <a:solidFill>
-                  <a:schemeClr val="tx1"/>
-                </a:solidFill>
-                <a:tailEnd type="triangle"/>
-              </a:ln>
-            </p:spPr>
-            <p:style>
-              <a:lnRef idx="1">
-                <a:schemeClr val="accent1"/>
-              </a:lnRef>
-              <a:fillRef idx="0">
-                <a:schemeClr val="accent1"/>
-              </a:fillRef>
-              <a:effectRef idx="0">
-                <a:schemeClr val="accent1"/>
-              </a:effectRef>
-              <a:fontRef idx="minor">
-                <a:schemeClr val="tx1"/>
-              </a:fontRef>
-            </p:style>
-          </p:cxnSp>
-          <p:cxnSp>
-            <p:nvCxnSpPr>
-              <p:cNvPr id="71" name="Straight Arrow Connector 70">
-                <a:extLst>
-                  <a:ext uri="{FF2B5EF4-FFF2-40B4-BE49-F238E27FC236}">
-                    <a16:creationId xmlns:a16="http://schemas.microsoft.com/office/drawing/2014/main" id="{22AF88DE-A5E2-4CAC-AC19-0EC0E551C754}"/>
-                  </a:ext>
-                </a:extLst>
-              </p:cNvPr>
-              <p:cNvCxnSpPr>
-                <a:cxnSpLocks/>
-              </p:cNvCxnSpPr>
-              <p:nvPr/>
-            </p:nvCxnSpPr>
-            <p:spPr>
-              <a:xfrm flipH="1" flipV="1">
-                <a:off x="9439423" y="323557"/>
-                <a:ext cx="1" cy="612615"/>
-              </a:xfrm>
-              <a:prstGeom prst="straightConnector1">
-                <a:avLst/>
-              </a:prstGeom>
-              <a:ln w="41275">
-                <a:solidFill>
-                  <a:schemeClr val="tx1"/>
-                </a:solidFill>
-                <a:tailEnd type="triangle"/>
-              </a:ln>
-            </p:spPr>
-            <p:style>
-              <a:lnRef idx="1">
-                <a:schemeClr val="accent1"/>
-              </a:lnRef>
-              <a:fillRef idx="0">
-                <a:schemeClr val="accent1"/>
-              </a:fillRef>
-              <a:effectRef idx="0">
-                <a:schemeClr val="accent1"/>
-              </a:effectRef>
-              <a:fontRef idx="minor">
-                <a:schemeClr val="tx1"/>
-              </a:fontRef>
-            </p:style>
-          </p:cxnSp>
-        </p:grpSp>
-        <p:sp>
-          <p:nvSpPr>
-            <p:cNvPr id="68" name="TextBox 67">
+            <a:prstGeom prst="straightConnector1">
+              <a:avLst/>
+            </a:prstGeom>
+            <a:ln w="41275">
+              <a:solidFill>
+                <a:schemeClr val="accent1">
+                  <a:lumMod val="75000"/>
+                </a:schemeClr>
+              </a:solidFill>
+              <a:tailEnd type="triangle"/>
+            </a:ln>
+          </p:spPr>
+          <p:style>
+            <a:lnRef idx="1">
+              <a:schemeClr val="accent1"/>
+            </a:lnRef>
+            <a:fillRef idx="0">
+              <a:schemeClr val="accent1"/>
+            </a:fillRef>
+            <a:effectRef idx="0">
+              <a:schemeClr val="accent1"/>
+            </a:effectRef>
+            <a:fontRef idx="minor">
+              <a:schemeClr val="tx1"/>
+            </a:fontRef>
+          </p:style>
+        </p:cxnSp>
+        <p:cxnSp>
+          <p:nvCxnSpPr>
+            <p:cNvPr id="71" name="Straight Arrow Connector 70">
               <a:extLst>
                 <a:ext uri="{FF2B5EF4-FFF2-40B4-BE49-F238E27FC236}">
-                  <a16:creationId xmlns:a16="http://schemas.microsoft.com/office/drawing/2014/main" id="{B3E1B8BF-0930-4EAB-8A1C-3CD20080374F}"/>
+                  <a16:creationId xmlns:a16="http://schemas.microsoft.com/office/drawing/2014/main" id="{22AF88DE-A5E2-4CAC-AC19-0EC0E551C754}"/>
                 </a:ext>
               </a:extLst>
             </p:cNvPr>
-            <p:cNvSpPr txBox="1"/>
+            <p:cNvCxnSpPr>
+              <a:cxnSpLocks/>
+            </p:cNvCxnSpPr>
             <p:nvPr/>
-          </p:nvSpPr>
+          </p:nvCxnSpPr>
           <p:spPr>
-            <a:xfrm>
-              <a:off x="7512889" y="122512"/>
-              <a:ext cx="276038" cy="369332"/>
+            <a:xfrm flipH="1" flipV="1">
+              <a:off x="9439423" y="323557"/>
+              <a:ext cx="1" cy="612615"/>
             </a:xfrm>
-            <a:prstGeom prst="rect">
+            <a:prstGeom prst="straightConnector1">
               <a:avLst/>
             </a:prstGeom>
-            <a:noFill/>
+            <a:ln w="41275">
+              <a:solidFill>
+                <a:schemeClr val="accent1">
+                  <a:lumMod val="75000"/>
+                </a:schemeClr>
+              </a:solidFill>
+              <a:tailEnd type="triangle"/>
+            </a:ln>
           </p:spPr>
-          <p:txBody>
-            <a:bodyPr wrap="none" rtlCol="0">
-              <a:spAutoFit/>
-            </a:bodyPr>
-            <a:lstStyle/>
-            <a:p>
-              <a:r>
-                <a:rPr lang="en-US" dirty="0"/>
-                <a:t>z</a:t>
-              </a:r>
-            </a:p>
-          </p:txBody>
-        </p:sp>
-        <p:sp>
-          <p:nvSpPr>
-            <p:cNvPr id="69" name="TextBox 68">
+          <p:style>
+            <a:lnRef idx="1">
+              <a:schemeClr val="accent1"/>
+            </a:lnRef>
+            <a:fillRef idx="0">
+              <a:schemeClr val="accent1"/>
+            </a:fillRef>
+            <a:effectRef idx="0">
+              <a:schemeClr val="accent1"/>
+            </a:effectRef>
+            <a:fontRef idx="minor">
+              <a:schemeClr val="tx1"/>
+            </a:fontRef>
+          </p:style>
+        </p:cxnSp>
+      </p:grpSp>
+      <p:grpSp>
+        <p:nvGrpSpPr>
+          <p:cNvPr id="74" name="Group 73">
+            <a:extLst>
+              <a:ext uri="{FF2B5EF4-FFF2-40B4-BE49-F238E27FC236}">
+                <a16:creationId xmlns:a16="http://schemas.microsoft.com/office/drawing/2014/main" id="{AF4A6711-8E19-4DB0-B1FF-0E97880BAD1E}"/>
+              </a:ext>
+            </a:extLst>
+          </p:cNvPr>
+          <p:cNvGrpSpPr/>
+          <p:nvPr/>
+        </p:nvGrpSpPr>
+        <p:grpSpPr>
+          <a:xfrm>
+            <a:off x="3160867" y="4344883"/>
+            <a:ext cx="590843" cy="612615"/>
+            <a:chOff x="8862646" y="323557"/>
+            <a:chExt cx="590843" cy="612615"/>
+          </a:xfrm>
+        </p:grpSpPr>
+        <p:cxnSp>
+          <p:nvCxnSpPr>
+            <p:cNvPr id="77" name="Straight Arrow Connector 76">
               <a:extLst>
                 <a:ext uri="{FF2B5EF4-FFF2-40B4-BE49-F238E27FC236}">
-                  <a16:creationId xmlns:a16="http://schemas.microsoft.com/office/drawing/2014/main" id="{DA15E824-5488-45C6-AA0D-1E8F3274E88B}"/>
+                  <a16:creationId xmlns:a16="http://schemas.microsoft.com/office/drawing/2014/main" id="{D35C862C-2120-40E4-B014-AFE2C7647AF2}"/>
                 </a:ext>
               </a:extLst>
             </p:cNvPr>
-            <p:cNvSpPr txBox="1"/>
+            <p:cNvCxnSpPr>
+              <a:cxnSpLocks/>
+            </p:cNvCxnSpPr>
             <p:nvPr/>
-          </p:nvSpPr>
+          </p:nvCxnSpPr>
           <p:spPr>
-            <a:xfrm>
-              <a:off x="6953376" y="670538"/>
-              <a:ext cx="288862" cy="369332"/>
+            <a:xfrm flipH="1">
+              <a:off x="8862646" y="928468"/>
+              <a:ext cx="590843" cy="0"/>
             </a:xfrm>
-            <a:prstGeom prst="rect">
+            <a:prstGeom prst="straightConnector1">
               <a:avLst/>
             </a:prstGeom>
-            <a:noFill/>
+            <a:ln w="41275">
+              <a:solidFill>
+                <a:schemeClr val="accent1">
+                  <a:lumMod val="75000"/>
+                </a:schemeClr>
+              </a:solidFill>
+              <a:tailEnd type="triangle"/>
+            </a:ln>
           </p:spPr>
-          <p:txBody>
-            <a:bodyPr wrap="none" rtlCol="0">
-              <a:spAutoFit/>
-            </a:bodyPr>
-            <a:lstStyle/>
-            <a:p>
-              <a:r>
-                <a:rPr lang="en-US" dirty="0"/>
-                <a:t>y</a:t>
-              </a:r>
-            </a:p>
-          </p:txBody>
-        </p:sp>
+          <p:style>
+            <a:lnRef idx="1">
+              <a:schemeClr val="accent1"/>
+            </a:lnRef>
+            <a:fillRef idx="0">
+              <a:schemeClr val="accent1"/>
+            </a:fillRef>
+            <a:effectRef idx="0">
+              <a:schemeClr val="accent1"/>
+            </a:effectRef>
+            <a:fontRef idx="minor">
+              <a:schemeClr val="tx1"/>
+            </a:fontRef>
+          </p:style>
+        </p:cxnSp>
+        <p:cxnSp>
+          <p:nvCxnSpPr>
+            <p:cNvPr id="78" name="Straight Arrow Connector 77">
+              <a:extLst>
+                <a:ext uri="{FF2B5EF4-FFF2-40B4-BE49-F238E27FC236}">
+                  <a16:creationId xmlns:a16="http://schemas.microsoft.com/office/drawing/2014/main" id="{AE595283-80D8-4C27-8DB7-3F8ECE32B850}"/>
+                </a:ext>
+              </a:extLst>
+            </p:cNvPr>
+            <p:cNvCxnSpPr>
+              <a:cxnSpLocks/>
+            </p:cNvCxnSpPr>
+            <p:nvPr/>
+          </p:nvCxnSpPr>
+          <p:spPr>
+            <a:xfrm flipH="1" flipV="1">
+              <a:off x="9439423" y="323557"/>
+              <a:ext cx="1" cy="612615"/>
+            </a:xfrm>
+            <a:prstGeom prst="straightConnector1">
+              <a:avLst/>
+            </a:prstGeom>
+            <a:ln w="41275">
+              <a:solidFill>
+                <a:schemeClr val="accent1">
+                  <a:lumMod val="75000"/>
+                </a:schemeClr>
+              </a:solidFill>
+              <a:tailEnd type="triangle"/>
+            </a:ln>
+          </p:spPr>
+          <p:style>
+            <a:lnRef idx="1">
+              <a:schemeClr val="accent1"/>
+            </a:lnRef>
+            <a:fillRef idx="0">
+              <a:schemeClr val="accent1"/>
+            </a:fillRef>
+            <a:effectRef idx="0">
+              <a:schemeClr val="accent1"/>
+            </a:effectRef>
+            <a:fontRef idx="minor">
+              <a:schemeClr val="tx1"/>
+            </a:fontRef>
+          </p:style>
+        </p:cxnSp>
       </p:grpSp>
+      <p:grpSp>
+        <p:nvGrpSpPr>
+          <p:cNvPr id="81" name="Group 80">
+            <a:extLst>
+              <a:ext uri="{FF2B5EF4-FFF2-40B4-BE49-F238E27FC236}">
+                <a16:creationId xmlns:a16="http://schemas.microsoft.com/office/drawing/2014/main" id="{CC55E760-763F-41C3-A75E-237DFC40E3FD}"/>
+              </a:ext>
+            </a:extLst>
+          </p:cNvPr>
+          <p:cNvGrpSpPr/>
+          <p:nvPr/>
+        </p:nvGrpSpPr>
+        <p:grpSpPr>
+          <a:xfrm>
+            <a:off x="3851806" y="701234"/>
+            <a:ext cx="590843" cy="612615"/>
+            <a:chOff x="8862646" y="323557"/>
+            <a:chExt cx="590843" cy="612615"/>
+          </a:xfrm>
+        </p:grpSpPr>
+        <p:cxnSp>
+          <p:nvCxnSpPr>
+            <p:cNvPr id="84" name="Straight Arrow Connector 83">
+              <a:extLst>
+                <a:ext uri="{FF2B5EF4-FFF2-40B4-BE49-F238E27FC236}">
+                  <a16:creationId xmlns:a16="http://schemas.microsoft.com/office/drawing/2014/main" id="{DF58C5EE-7B73-420A-9ABC-1BFCE6151B34}"/>
+                </a:ext>
+              </a:extLst>
+            </p:cNvPr>
+            <p:cNvCxnSpPr>
+              <a:cxnSpLocks/>
+            </p:cNvCxnSpPr>
+            <p:nvPr/>
+          </p:nvCxnSpPr>
+          <p:spPr>
+            <a:xfrm flipH="1">
+              <a:off x="8862646" y="928468"/>
+              <a:ext cx="590843" cy="0"/>
+            </a:xfrm>
+            <a:prstGeom prst="straightConnector1">
+              <a:avLst/>
+            </a:prstGeom>
+            <a:ln w="41275">
+              <a:solidFill>
+                <a:schemeClr val="accent1">
+                  <a:lumMod val="75000"/>
+                </a:schemeClr>
+              </a:solidFill>
+              <a:tailEnd type="triangle"/>
+            </a:ln>
+          </p:spPr>
+          <p:style>
+            <a:lnRef idx="1">
+              <a:schemeClr val="accent1"/>
+            </a:lnRef>
+            <a:fillRef idx="0">
+              <a:schemeClr val="accent1"/>
+            </a:fillRef>
+            <a:effectRef idx="0">
+              <a:schemeClr val="accent1"/>
+            </a:effectRef>
+            <a:fontRef idx="minor">
+              <a:schemeClr val="tx1"/>
+            </a:fontRef>
+          </p:style>
+        </p:cxnSp>
+        <p:cxnSp>
+          <p:nvCxnSpPr>
+            <p:cNvPr id="85" name="Straight Arrow Connector 84">
+              <a:extLst>
+                <a:ext uri="{FF2B5EF4-FFF2-40B4-BE49-F238E27FC236}">
+                  <a16:creationId xmlns:a16="http://schemas.microsoft.com/office/drawing/2014/main" id="{7CF65358-5540-45E1-A856-3E482A03A5CB}"/>
+                </a:ext>
+              </a:extLst>
+            </p:cNvPr>
+            <p:cNvCxnSpPr>
+              <a:cxnSpLocks/>
+            </p:cNvCxnSpPr>
+            <p:nvPr/>
+          </p:nvCxnSpPr>
+          <p:spPr>
+            <a:xfrm flipH="1" flipV="1">
+              <a:off x="9439423" y="323557"/>
+              <a:ext cx="1" cy="612615"/>
+            </a:xfrm>
+            <a:prstGeom prst="straightConnector1">
+              <a:avLst/>
+            </a:prstGeom>
+            <a:ln w="41275">
+              <a:solidFill>
+                <a:schemeClr val="accent1">
+                  <a:lumMod val="75000"/>
+                </a:schemeClr>
+              </a:solidFill>
+              <a:tailEnd type="triangle"/>
+            </a:ln>
+          </p:spPr>
+          <p:style>
+            <a:lnRef idx="1">
+              <a:schemeClr val="accent1"/>
+            </a:lnRef>
+            <a:fillRef idx="0">
+              <a:schemeClr val="accent1"/>
+            </a:fillRef>
+            <a:effectRef idx="0">
+              <a:schemeClr val="accent1"/>
+            </a:effectRef>
+            <a:fontRef idx="minor">
+              <a:schemeClr val="tx1"/>
+            </a:fontRef>
+          </p:style>
+        </p:cxnSp>
+      </p:grpSp>
+      <p:pic>
+        <p:nvPicPr>
+          <p:cNvPr id="41" name="Picture 40">
+            <a:extLst>
+              <a:ext uri="{FF2B5EF4-FFF2-40B4-BE49-F238E27FC236}">
+                <a16:creationId xmlns:a16="http://schemas.microsoft.com/office/drawing/2014/main" id="{DED41781-F578-41B7-8D37-5692F17C0FEA}"/>
+              </a:ext>
+            </a:extLst>
+          </p:cNvPr>
+          <p:cNvPicPr>
+            <a:picLocks noChangeAspect="1"/>
+          </p:cNvPicPr>
+          <p:nvPr>
+            <p:custDataLst>
+              <p:tags r:id="rId1"/>
+            </p:custDataLst>
+          </p:nvPr>
+        </p:nvPicPr>
+        <p:blipFill>
+          <a:blip r:embed="rId10">
+            <a:extLst>
+              <a:ext uri="{28A0092B-C50C-407E-A947-70E740481C1C}">
+                <a14:useLocalDpi xmlns:a14="http://schemas.microsoft.com/office/drawing/2010/main" val="0"/>
+              </a:ext>
+            </a:extLst>
+          </a:blip>
+          <a:stretch>
+            <a:fillRect/>
+          </a:stretch>
+        </p:blipFill>
+        <p:spPr>
+          <a:xfrm>
+            <a:off x="3047982" y="4673619"/>
+            <a:ext cx="272774" cy="188149"/>
+          </a:xfrm>
+          <a:prstGeom prst="rect">
+            <a:avLst/>
+          </a:prstGeom>
+        </p:spPr>
+      </p:pic>
+      <p:pic>
+        <p:nvPicPr>
+          <p:cNvPr id="39" name="Picture 38">
+            <a:extLst>
+              <a:ext uri="{FF2B5EF4-FFF2-40B4-BE49-F238E27FC236}">
+                <a16:creationId xmlns:a16="http://schemas.microsoft.com/office/drawing/2014/main" id="{D14D06BB-5488-4B9E-917F-AD8C3D2D76D6}"/>
+              </a:ext>
+            </a:extLst>
+          </p:cNvPr>
+          <p:cNvPicPr>
+            <a:picLocks noChangeAspect="1"/>
+          </p:cNvPicPr>
+          <p:nvPr>
+            <p:custDataLst>
+              <p:tags r:id="rId2"/>
+            </p:custDataLst>
+          </p:nvPr>
+        </p:nvPicPr>
+        <p:blipFill>
+          <a:blip r:embed="rId11">
+            <a:extLst>
+              <a:ext uri="{28A0092B-C50C-407E-A947-70E740481C1C}">
+                <a14:useLocalDpi xmlns:a14="http://schemas.microsoft.com/office/drawing/2010/main" val="0"/>
+              </a:ext>
+            </a:extLst>
+          </a:blip>
+          <a:stretch>
+            <a:fillRect/>
+          </a:stretch>
+        </p:blipFill>
+        <p:spPr>
+          <a:xfrm>
+            <a:off x="3366065" y="4207334"/>
+            <a:ext cx="263736" cy="188149"/>
+          </a:xfrm>
+          <a:prstGeom prst="rect">
+            <a:avLst/>
+          </a:prstGeom>
+        </p:spPr>
+      </p:pic>
+      <p:pic>
+        <p:nvPicPr>
+          <p:cNvPr id="29" name="Picture 28">
+            <a:extLst>
+              <a:ext uri="{FF2B5EF4-FFF2-40B4-BE49-F238E27FC236}">
+                <a16:creationId xmlns:a16="http://schemas.microsoft.com/office/drawing/2014/main" id="{D9D02BB7-CE29-4820-8AAC-4F22FE09F605}"/>
+              </a:ext>
+            </a:extLst>
+          </p:cNvPr>
+          <p:cNvPicPr>
+            <a:picLocks noChangeAspect="1"/>
+          </p:cNvPicPr>
+          <p:nvPr>
+            <p:custDataLst>
+              <p:tags r:id="rId3"/>
+            </p:custDataLst>
+          </p:nvPr>
+        </p:nvPicPr>
+        <p:blipFill>
+          <a:blip r:embed="rId12">
+            <a:extLst>
+              <a:ext uri="{28A0092B-C50C-407E-A947-70E740481C1C}">
+                <a14:useLocalDpi xmlns:a14="http://schemas.microsoft.com/office/drawing/2010/main" val="0"/>
+              </a:ext>
+            </a:extLst>
+          </a:blip>
+          <a:stretch>
+            <a:fillRect/>
+          </a:stretch>
+        </p:blipFill>
+        <p:spPr>
+          <a:xfrm>
+            <a:off x="5734888" y="1027507"/>
+            <a:ext cx="262914" cy="187327"/>
+          </a:xfrm>
+          <a:prstGeom prst="rect">
+            <a:avLst/>
+          </a:prstGeom>
+        </p:spPr>
+      </p:pic>
+      <p:pic>
+        <p:nvPicPr>
+          <p:cNvPr id="31" name="Picture 30">
+            <a:extLst>
+              <a:ext uri="{FF2B5EF4-FFF2-40B4-BE49-F238E27FC236}">
+                <a16:creationId xmlns:a16="http://schemas.microsoft.com/office/drawing/2014/main" id="{83EB0663-FF7F-45DE-92E0-40F01360CF3A}"/>
+              </a:ext>
+            </a:extLst>
+          </p:cNvPr>
+          <p:cNvPicPr>
+            <a:picLocks noChangeAspect="1"/>
+          </p:cNvPicPr>
+          <p:nvPr>
+            <p:custDataLst>
+              <p:tags r:id="rId4"/>
+            </p:custDataLst>
+          </p:nvPr>
+        </p:nvPicPr>
+        <p:blipFill>
+          <a:blip r:embed="rId13">
+            <a:extLst>
+              <a:ext uri="{28A0092B-C50C-407E-A947-70E740481C1C}">
+                <a14:useLocalDpi xmlns:a14="http://schemas.microsoft.com/office/drawing/2010/main" val="0"/>
+              </a:ext>
+            </a:extLst>
+          </a:blip>
+          <a:stretch>
+            <a:fillRect/>
+          </a:stretch>
+        </p:blipFill>
+        <p:spPr>
+          <a:xfrm>
+            <a:off x="5987808" y="657257"/>
+            <a:ext cx="253877" cy="187327"/>
+          </a:xfrm>
+          <a:prstGeom prst="rect">
+            <a:avLst/>
+          </a:prstGeom>
+        </p:spPr>
+      </p:pic>
+      <p:pic>
+        <p:nvPicPr>
+          <p:cNvPr id="17" name="Picture 16">
+            <a:extLst>
+              <a:ext uri="{FF2B5EF4-FFF2-40B4-BE49-F238E27FC236}">
+                <a16:creationId xmlns:a16="http://schemas.microsoft.com/office/drawing/2014/main" id="{26A30635-457A-4161-848F-56741715DEC9}"/>
+              </a:ext>
+            </a:extLst>
+          </p:cNvPr>
+          <p:cNvPicPr>
+            <a:picLocks noChangeAspect="1"/>
+          </p:cNvPicPr>
+          <p:nvPr>
+            <p:custDataLst>
+              <p:tags r:id="rId5"/>
+            </p:custDataLst>
+          </p:nvPr>
+        </p:nvPicPr>
+        <p:blipFill>
+          <a:blip r:embed="rId14">
+            <a:extLst>
+              <a:ext uri="{28A0092B-C50C-407E-A947-70E740481C1C}">
+                <a14:useLocalDpi xmlns:a14="http://schemas.microsoft.com/office/drawing/2010/main" val="0"/>
+              </a:ext>
+            </a:extLst>
+          </a:blip>
+          <a:stretch>
+            <a:fillRect/>
+          </a:stretch>
+        </p:blipFill>
+        <p:spPr>
+          <a:xfrm>
+            <a:off x="3823055" y="1000786"/>
+            <a:ext cx="305638" cy="193900"/>
+          </a:xfrm>
+          <a:prstGeom prst="rect">
+            <a:avLst/>
+          </a:prstGeom>
+        </p:spPr>
+      </p:pic>
+      <p:pic>
+        <p:nvPicPr>
+          <p:cNvPr id="13" name="Picture 12">
+            <a:extLst>
+              <a:ext uri="{FF2B5EF4-FFF2-40B4-BE49-F238E27FC236}">
+                <a16:creationId xmlns:a16="http://schemas.microsoft.com/office/drawing/2014/main" id="{298DC45C-9B23-4705-81D0-5A32CA13081F}"/>
+              </a:ext>
+            </a:extLst>
+          </p:cNvPr>
+          <p:cNvPicPr>
+            <a:picLocks noChangeAspect="1"/>
+          </p:cNvPicPr>
+          <p:nvPr>
+            <p:custDataLst>
+              <p:tags r:id="rId6"/>
+            </p:custDataLst>
+          </p:nvPr>
+        </p:nvPicPr>
+        <p:blipFill>
+          <a:blip r:embed="rId15">
+            <a:extLst>
+              <a:ext uri="{28A0092B-C50C-407E-A947-70E740481C1C}">
+                <a14:useLocalDpi xmlns:a14="http://schemas.microsoft.com/office/drawing/2010/main" val="0"/>
+              </a:ext>
+            </a:extLst>
+          </a:blip>
+          <a:stretch>
+            <a:fillRect/>
+          </a:stretch>
+        </p:blipFill>
+        <p:spPr>
+          <a:xfrm>
+            <a:off x="4061785" y="548655"/>
+            <a:ext cx="296601" cy="193900"/>
+          </a:xfrm>
+          <a:prstGeom prst="rect">
+            <a:avLst/>
+          </a:prstGeom>
+        </p:spPr>
+      </p:pic>
+      <p:grpSp>
+        <p:nvGrpSpPr>
+          <p:cNvPr id="94" name="Group 93">
+            <a:extLst>
+              <a:ext uri="{FF2B5EF4-FFF2-40B4-BE49-F238E27FC236}">
+                <a16:creationId xmlns:a16="http://schemas.microsoft.com/office/drawing/2014/main" id="{FAB2E09C-1CD1-4240-B0ED-594B846CE16F}"/>
+              </a:ext>
+            </a:extLst>
+          </p:cNvPr>
+          <p:cNvGrpSpPr/>
+          <p:nvPr/>
+        </p:nvGrpSpPr>
+        <p:grpSpPr>
+          <a:xfrm>
+            <a:off x="4312008" y="3048732"/>
+            <a:ext cx="590843" cy="612615"/>
+            <a:chOff x="8862646" y="323557"/>
+            <a:chExt cx="590843" cy="612615"/>
+          </a:xfrm>
+        </p:grpSpPr>
+        <p:cxnSp>
+          <p:nvCxnSpPr>
+            <p:cNvPr id="95" name="Straight Arrow Connector 94">
+              <a:extLst>
+                <a:ext uri="{FF2B5EF4-FFF2-40B4-BE49-F238E27FC236}">
+                  <a16:creationId xmlns:a16="http://schemas.microsoft.com/office/drawing/2014/main" id="{5CC0B805-E88B-4A30-91AC-03CD68E2FA55}"/>
+                </a:ext>
+              </a:extLst>
+            </p:cNvPr>
+            <p:cNvCxnSpPr>
+              <a:cxnSpLocks/>
+            </p:cNvCxnSpPr>
+            <p:nvPr/>
+          </p:nvCxnSpPr>
+          <p:spPr>
+            <a:xfrm flipH="1">
+              <a:off x="8862646" y="928468"/>
+              <a:ext cx="590843" cy="0"/>
+            </a:xfrm>
+            <a:prstGeom prst="straightConnector1">
+              <a:avLst/>
+            </a:prstGeom>
+            <a:ln w="41275">
+              <a:solidFill>
+                <a:schemeClr val="accent1">
+                  <a:lumMod val="75000"/>
+                </a:schemeClr>
+              </a:solidFill>
+              <a:tailEnd type="triangle"/>
+            </a:ln>
+          </p:spPr>
+          <p:style>
+            <a:lnRef idx="1">
+              <a:schemeClr val="accent1"/>
+            </a:lnRef>
+            <a:fillRef idx="0">
+              <a:schemeClr val="accent1"/>
+            </a:fillRef>
+            <a:effectRef idx="0">
+              <a:schemeClr val="accent1"/>
+            </a:effectRef>
+            <a:fontRef idx="minor">
+              <a:schemeClr val="tx1"/>
+            </a:fontRef>
+          </p:style>
+        </p:cxnSp>
+        <p:cxnSp>
+          <p:nvCxnSpPr>
+            <p:cNvPr id="96" name="Straight Arrow Connector 95">
+              <a:extLst>
+                <a:ext uri="{FF2B5EF4-FFF2-40B4-BE49-F238E27FC236}">
+                  <a16:creationId xmlns:a16="http://schemas.microsoft.com/office/drawing/2014/main" id="{36E29B88-6333-4A44-88E8-CD1D448DD606}"/>
+                </a:ext>
+              </a:extLst>
+            </p:cNvPr>
+            <p:cNvCxnSpPr>
+              <a:cxnSpLocks/>
+            </p:cNvCxnSpPr>
+            <p:nvPr/>
+          </p:nvCxnSpPr>
+          <p:spPr>
+            <a:xfrm flipH="1" flipV="1">
+              <a:off x="9439423" y="323557"/>
+              <a:ext cx="1" cy="612615"/>
+            </a:xfrm>
+            <a:prstGeom prst="straightConnector1">
+              <a:avLst/>
+            </a:prstGeom>
+            <a:ln w="41275">
+              <a:solidFill>
+                <a:schemeClr val="accent1">
+                  <a:lumMod val="75000"/>
+                </a:schemeClr>
+              </a:solidFill>
+              <a:tailEnd type="triangle"/>
+            </a:ln>
+          </p:spPr>
+          <p:style>
+            <a:lnRef idx="1">
+              <a:schemeClr val="accent1"/>
+            </a:lnRef>
+            <a:fillRef idx="0">
+              <a:schemeClr val="accent1"/>
+            </a:fillRef>
+            <a:effectRef idx="0">
+              <a:schemeClr val="accent1"/>
+            </a:effectRef>
+            <a:fontRef idx="minor">
+              <a:schemeClr val="tx1"/>
+            </a:fontRef>
+          </p:style>
+        </p:cxnSp>
+      </p:grpSp>
+      <p:pic>
+        <p:nvPicPr>
+          <p:cNvPr id="35" name="Picture 34">
+            <a:extLst>
+              <a:ext uri="{FF2B5EF4-FFF2-40B4-BE49-F238E27FC236}">
+                <a16:creationId xmlns:a16="http://schemas.microsoft.com/office/drawing/2014/main" id="{5C74D2A8-98E7-4EBF-8FD6-0C94EB71B2E5}"/>
+              </a:ext>
+            </a:extLst>
+          </p:cNvPr>
+          <p:cNvPicPr>
+            <a:picLocks noChangeAspect="1"/>
+          </p:cNvPicPr>
+          <p:nvPr>
+            <p:custDataLst>
+              <p:tags r:id="rId7"/>
+            </p:custDataLst>
+          </p:nvPr>
+        </p:nvPicPr>
+        <p:blipFill>
+          <a:blip r:embed="rId16">
+            <a:extLst>
+              <a:ext uri="{28A0092B-C50C-407E-A947-70E740481C1C}">
+                <a14:useLocalDpi xmlns:a14="http://schemas.microsoft.com/office/drawing/2010/main" val="0"/>
+              </a:ext>
+            </a:extLst>
+          </a:blip>
+          <a:stretch>
+            <a:fillRect/>
+          </a:stretch>
+        </p:blipFill>
+        <p:spPr>
+          <a:xfrm>
+            <a:off x="4384651" y="3377468"/>
+            <a:ext cx="289206" cy="193900"/>
+          </a:xfrm>
+          <a:prstGeom prst="rect">
+            <a:avLst/>
+          </a:prstGeom>
+        </p:spPr>
+      </p:pic>
+      <p:pic>
+        <p:nvPicPr>
+          <p:cNvPr id="33" name="Picture 32">
+            <a:extLst>
+              <a:ext uri="{FF2B5EF4-FFF2-40B4-BE49-F238E27FC236}">
+                <a16:creationId xmlns:a16="http://schemas.microsoft.com/office/drawing/2014/main" id="{AFF6AC11-3E81-4125-8037-A594D21873F3}"/>
+              </a:ext>
+            </a:extLst>
+          </p:cNvPr>
+          <p:cNvPicPr>
+            <a:picLocks noChangeAspect="1"/>
+          </p:cNvPicPr>
+          <p:nvPr>
+            <p:custDataLst>
+              <p:tags r:id="rId8"/>
+            </p:custDataLst>
+          </p:nvPr>
+        </p:nvPicPr>
+        <p:blipFill>
+          <a:blip r:embed="rId17">
+            <a:extLst>
+              <a:ext uri="{28A0092B-C50C-407E-A947-70E740481C1C}">
+                <a14:useLocalDpi xmlns:a14="http://schemas.microsoft.com/office/drawing/2010/main" val="0"/>
+              </a:ext>
+            </a:extLst>
+          </a:blip>
+          <a:stretch>
+            <a:fillRect/>
+          </a:stretch>
+        </p:blipFill>
+        <p:spPr>
+          <a:xfrm>
+            <a:off x="4517206" y="2911183"/>
+            <a:ext cx="280168" cy="193900"/>
+          </a:xfrm>
+          <a:prstGeom prst="rect">
+            <a:avLst/>
+          </a:prstGeom>
+        </p:spPr>
+      </p:pic>
       <p:sp>
         <p:nvSpPr>
-          <p:cNvPr id="72" name="TextBox 71">
-            <a:extLst>
-              <a:ext uri="{FF2B5EF4-FFF2-40B4-BE49-F238E27FC236}">
-                <a16:creationId xmlns:a16="http://schemas.microsoft.com/office/drawing/2014/main" id="{151D2E46-0A5F-468E-AFB4-315E150D7A95}"/>
+          <p:cNvPr id="66" name="TextBox 65">
+            <a:extLst>
+              <a:ext uri="{FF2B5EF4-FFF2-40B4-BE49-F238E27FC236}">
+                <a16:creationId xmlns:a16="http://schemas.microsoft.com/office/drawing/2014/main" id="{A744EACA-D6FC-441D-B2DC-1EE638333C1D}"/>
               </a:ext>
             </a:extLst>
           </p:cNvPr>
@@ -9146,13 +10434,18 @@
         </p:nvSpPr>
         <p:spPr>
           <a:xfrm>
-            <a:off x="6318900" y="1092694"/>
-            <a:ext cx="296876" cy="369332"/>
+            <a:off x="6336553" y="5017706"/>
+            <a:ext cx="894284" cy="369332"/>
           </a:xfrm>
           <a:prstGeom prst="rect">
             <a:avLst/>
           </a:prstGeom>
-          <a:noFill/>
+          <a:solidFill>
+            <a:schemeClr val="accent2">
+              <a:lumMod val="40000"/>
+              <a:lumOff val="60000"/>
+            </a:schemeClr>
+          </a:solidFill>
         </p:spPr>
         <p:txBody>
           <a:bodyPr wrap="none" rtlCol="0">
@@ -9162,217 +10455,17 @@
           <a:p>
             <a:r>
               <a:rPr lang="en-US" dirty="0"/>
-              <a:t>T</a:t>
+              <a:t>Ground</a:t>
             </a:r>
           </a:p>
         </p:txBody>
       </p:sp>
-      <p:grpSp>
-        <p:nvGrpSpPr>
-          <p:cNvPr id="73" name="Group 72">
-            <a:extLst>
-              <a:ext uri="{FF2B5EF4-FFF2-40B4-BE49-F238E27FC236}">
-                <a16:creationId xmlns:a16="http://schemas.microsoft.com/office/drawing/2014/main" id="{80C1DA42-80BF-4C88-BE92-488A79C0C55A}"/>
-              </a:ext>
-            </a:extLst>
-          </p:cNvPr>
-          <p:cNvGrpSpPr/>
-          <p:nvPr/>
-        </p:nvGrpSpPr>
-        <p:grpSpPr>
-          <a:xfrm>
-            <a:off x="3040112" y="4021326"/>
-            <a:ext cx="835551" cy="936172"/>
-            <a:chOff x="6953376" y="122512"/>
-            <a:chExt cx="835551" cy="936172"/>
-          </a:xfrm>
-        </p:grpSpPr>
-        <p:grpSp>
-          <p:nvGrpSpPr>
-            <p:cNvPr id="74" name="Group 73">
-              <a:extLst>
-                <a:ext uri="{FF2B5EF4-FFF2-40B4-BE49-F238E27FC236}">
-                  <a16:creationId xmlns:a16="http://schemas.microsoft.com/office/drawing/2014/main" id="{AF4A6711-8E19-4DB0-B1FF-0E97880BAD1E}"/>
-                </a:ext>
-              </a:extLst>
-            </p:cNvPr>
-            <p:cNvGrpSpPr/>
-            <p:nvPr/>
-          </p:nvGrpSpPr>
-          <p:grpSpPr>
-            <a:xfrm>
-              <a:off x="7074131" y="446069"/>
-              <a:ext cx="590843" cy="612615"/>
-              <a:chOff x="8862646" y="323557"/>
-              <a:chExt cx="590843" cy="612615"/>
-            </a:xfrm>
-          </p:grpSpPr>
-          <p:cxnSp>
-            <p:nvCxnSpPr>
-              <p:cNvPr id="77" name="Straight Arrow Connector 76">
-                <a:extLst>
-                  <a:ext uri="{FF2B5EF4-FFF2-40B4-BE49-F238E27FC236}">
-                    <a16:creationId xmlns:a16="http://schemas.microsoft.com/office/drawing/2014/main" id="{D35C862C-2120-40E4-B014-AFE2C7647AF2}"/>
-                  </a:ext>
-                </a:extLst>
-              </p:cNvPr>
-              <p:cNvCxnSpPr>
-                <a:cxnSpLocks/>
-              </p:cNvCxnSpPr>
-              <p:nvPr/>
-            </p:nvCxnSpPr>
-            <p:spPr>
-              <a:xfrm flipH="1">
-                <a:off x="8862646" y="928468"/>
-                <a:ext cx="590843" cy="0"/>
-              </a:xfrm>
-              <a:prstGeom prst="straightConnector1">
-                <a:avLst/>
-              </a:prstGeom>
-              <a:ln w="41275">
-                <a:solidFill>
-                  <a:schemeClr val="tx1"/>
-                </a:solidFill>
-                <a:tailEnd type="triangle"/>
-              </a:ln>
-            </p:spPr>
-            <p:style>
-              <a:lnRef idx="1">
-                <a:schemeClr val="accent1"/>
-              </a:lnRef>
-              <a:fillRef idx="0">
-                <a:schemeClr val="accent1"/>
-              </a:fillRef>
-              <a:effectRef idx="0">
-                <a:schemeClr val="accent1"/>
-              </a:effectRef>
-              <a:fontRef idx="minor">
-                <a:schemeClr val="tx1"/>
-              </a:fontRef>
-            </p:style>
-          </p:cxnSp>
-          <p:cxnSp>
-            <p:nvCxnSpPr>
-              <p:cNvPr id="78" name="Straight Arrow Connector 77">
-                <a:extLst>
-                  <a:ext uri="{FF2B5EF4-FFF2-40B4-BE49-F238E27FC236}">
-                    <a16:creationId xmlns:a16="http://schemas.microsoft.com/office/drawing/2014/main" id="{AE595283-80D8-4C27-8DB7-3F8ECE32B850}"/>
-                  </a:ext>
-                </a:extLst>
-              </p:cNvPr>
-              <p:cNvCxnSpPr>
-                <a:cxnSpLocks/>
-              </p:cNvCxnSpPr>
-              <p:nvPr/>
-            </p:nvCxnSpPr>
-            <p:spPr>
-              <a:xfrm flipH="1" flipV="1">
-                <a:off x="9439423" y="323557"/>
-                <a:ext cx="1" cy="612615"/>
-              </a:xfrm>
-              <a:prstGeom prst="straightConnector1">
-                <a:avLst/>
-              </a:prstGeom>
-              <a:ln w="41275">
-                <a:solidFill>
-                  <a:schemeClr val="tx1"/>
-                </a:solidFill>
-                <a:tailEnd type="triangle"/>
-              </a:ln>
-            </p:spPr>
-            <p:style>
-              <a:lnRef idx="1">
-                <a:schemeClr val="accent1"/>
-              </a:lnRef>
-              <a:fillRef idx="0">
-                <a:schemeClr val="accent1"/>
-              </a:fillRef>
-              <a:effectRef idx="0">
-                <a:schemeClr val="accent1"/>
-              </a:effectRef>
-              <a:fontRef idx="minor">
-                <a:schemeClr val="tx1"/>
-              </a:fontRef>
-            </p:style>
-          </p:cxnSp>
-        </p:grpSp>
-        <p:sp>
-          <p:nvSpPr>
-            <p:cNvPr id="75" name="TextBox 74">
-              <a:extLst>
-                <a:ext uri="{FF2B5EF4-FFF2-40B4-BE49-F238E27FC236}">
-                  <a16:creationId xmlns:a16="http://schemas.microsoft.com/office/drawing/2014/main" id="{62927AFD-0D7A-42AE-8C15-F83E371C0822}"/>
-                </a:ext>
-              </a:extLst>
-            </p:cNvPr>
-            <p:cNvSpPr txBox="1"/>
-            <p:nvPr/>
-          </p:nvSpPr>
-          <p:spPr>
-            <a:xfrm>
-              <a:off x="7512889" y="122512"/>
-              <a:ext cx="276038" cy="369332"/>
-            </a:xfrm>
-            <a:prstGeom prst="rect">
-              <a:avLst/>
-            </a:prstGeom>
-            <a:noFill/>
-          </p:spPr>
-          <p:txBody>
-            <a:bodyPr wrap="none" rtlCol="0">
-              <a:spAutoFit/>
-            </a:bodyPr>
-            <a:lstStyle/>
-            <a:p>
-              <a:r>
-                <a:rPr lang="en-US" dirty="0"/>
-                <a:t>z</a:t>
-              </a:r>
-            </a:p>
-          </p:txBody>
-        </p:sp>
-        <p:sp>
-          <p:nvSpPr>
-            <p:cNvPr id="76" name="TextBox 75">
-              <a:extLst>
-                <a:ext uri="{FF2B5EF4-FFF2-40B4-BE49-F238E27FC236}">
-                  <a16:creationId xmlns:a16="http://schemas.microsoft.com/office/drawing/2014/main" id="{32D2AF19-7D7A-4C25-8191-D6BC266BF490}"/>
-                </a:ext>
-              </a:extLst>
-            </p:cNvPr>
-            <p:cNvSpPr txBox="1"/>
-            <p:nvPr/>
-          </p:nvSpPr>
-          <p:spPr>
-            <a:xfrm>
-              <a:off x="6953376" y="670538"/>
-              <a:ext cx="288862" cy="369332"/>
-            </a:xfrm>
-            <a:prstGeom prst="rect">
-              <a:avLst/>
-            </a:prstGeom>
-            <a:noFill/>
-          </p:spPr>
-          <p:txBody>
-            <a:bodyPr wrap="none" rtlCol="0">
-              <a:spAutoFit/>
-            </a:bodyPr>
-            <a:lstStyle/>
-            <a:p>
-              <a:r>
-                <a:rPr lang="en-US" dirty="0"/>
-                <a:t>y</a:t>
-              </a:r>
-            </a:p>
-          </p:txBody>
-        </p:sp>
-      </p:grpSp>
       <p:sp>
         <p:nvSpPr>
-          <p:cNvPr id="79" name="TextBox 78">
-            <a:extLst>
-              <a:ext uri="{FF2B5EF4-FFF2-40B4-BE49-F238E27FC236}">
-                <a16:creationId xmlns:a16="http://schemas.microsoft.com/office/drawing/2014/main" id="{D8338889-CF8C-4CCC-8303-8CCC4CB90940}"/>
+          <p:cNvPr id="68" name="TextBox 67">
+            <a:extLst>
+              <a:ext uri="{FF2B5EF4-FFF2-40B4-BE49-F238E27FC236}">
+                <a16:creationId xmlns:a16="http://schemas.microsoft.com/office/drawing/2014/main" id="{E11750F9-08D7-4C9A-A456-5586AAD783D5}"/>
               </a:ext>
             </a:extLst>
           </p:cNvPr>
@@ -9381,13 +10474,18 @@
         </p:nvSpPr>
         <p:spPr>
           <a:xfrm>
-            <a:off x="3744879" y="4583674"/>
-            <a:ext cx="290464" cy="369332"/>
+            <a:off x="6325731" y="3667627"/>
+            <a:ext cx="1104661" cy="369332"/>
           </a:xfrm>
           <a:prstGeom prst="rect">
             <a:avLst/>
           </a:prstGeom>
-          <a:noFill/>
+          <a:solidFill>
+            <a:schemeClr val="accent2">
+              <a:lumMod val="40000"/>
+              <a:lumOff val="60000"/>
+            </a:schemeClr>
+          </a:solidFill>
         </p:spPr>
         <p:txBody>
           <a:bodyPr wrap="none" rtlCol="0">
@@ -9397,217 +10495,17 @@
           <a:p>
             <a:r>
               <a:rPr lang="en-US" dirty="0"/>
-              <a:t>F</a:t>
+              <a:t>Container</a:t>
             </a:r>
           </a:p>
         </p:txBody>
       </p:sp>
-      <p:grpSp>
-        <p:nvGrpSpPr>
-          <p:cNvPr id="80" name="Group 79">
-            <a:extLst>
-              <a:ext uri="{FF2B5EF4-FFF2-40B4-BE49-F238E27FC236}">
-                <a16:creationId xmlns:a16="http://schemas.microsoft.com/office/drawing/2014/main" id="{4D0959B3-3290-46B4-A67F-46BB3463EFDF}"/>
-              </a:ext>
-            </a:extLst>
-          </p:cNvPr>
-          <p:cNvGrpSpPr/>
-          <p:nvPr/>
-        </p:nvGrpSpPr>
-        <p:grpSpPr>
-          <a:xfrm>
-            <a:off x="3731051" y="377677"/>
-            <a:ext cx="835551" cy="936172"/>
-            <a:chOff x="6953376" y="122512"/>
-            <a:chExt cx="835551" cy="936172"/>
-          </a:xfrm>
-        </p:grpSpPr>
-        <p:grpSp>
-          <p:nvGrpSpPr>
-            <p:cNvPr id="81" name="Group 80">
-              <a:extLst>
-                <a:ext uri="{FF2B5EF4-FFF2-40B4-BE49-F238E27FC236}">
-                  <a16:creationId xmlns:a16="http://schemas.microsoft.com/office/drawing/2014/main" id="{CC55E760-763F-41C3-A75E-237DFC40E3FD}"/>
-                </a:ext>
-              </a:extLst>
-            </p:cNvPr>
-            <p:cNvGrpSpPr/>
-            <p:nvPr/>
-          </p:nvGrpSpPr>
-          <p:grpSpPr>
-            <a:xfrm>
-              <a:off x="7074131" y="446069"/>
-              <a:ext cx="590843" cy="612615"/>
-              <a:chOff x="8862646" y="323557"/>
-              <a:chExt cx="590843" cy="612615"/>
-            </a:xfrm>
-          </p:grpSpPr>
-          <p:cxnSp>
-            <p:nvCxnSpPr>
-              <p:cNvPr id="84" name="Straight Arrow Connector 83">
-                <a:extLst>
-                  <a:ext uri="{FF2B5EF4-FFF2-40B4-BE49-F238E27FC236}">
-                    <a16:creationId xmlns:a16="http://schemas.microsoft.com/office/drawing/2014/main" id="{DF58C5EE-7B73-420A-9ABC-1BFCE6151B34}"/>
-                  </a:ext>
-                </a:extLst>
-              </p:cNvPr>
-              <p:cNvCxnSpPr>
-                <a:cxnSpLocks/>
-              </p:cNvCxnSpPr>
-              <p:nvPr/>
-            </p:nvCxnSpPr>
-            <p:spPr>
-              <a:xfrm flipH="1">
-                <a:off x="8862646" y="928468"/>
-                <a:ext cx="590843" cy="0"/>
-              </a:xfrm>
-              <a:prstGeom prst="straightConnector1">
-                <a:avLst/>
-              </a:prstGeom>
-              <a:ln w="41275">
-                <a:solidFill>
-                  <a:schemeClr val="tx1"/>
-                </a:solidFill>
-                <a:tailEnd type="triangle"/>
-              </a:ln>
-            </p:spPr>
-            <p:style>
-              <a:lnRef idx="1">
-                <a:schemeClr val="accent1"/>
-              </a:lnRef>
-              <a:fillRef idx="0">
-                <a:schemeClr val="accent1"/>
-              </a:fillRef>
-              <a:effectRef idx="0">
-                <a:schemeClr val="accent1"/>
-              </a:effectRef>
-              <a:fontRef idx="minor">
-                <a:schemeClr val="tx1"/>
-              </a:fontRef>
-            </p:style>
-          </p:cxnSp>
-          <p:cxnSp>
-            <p:nvCxnSpPr>
-              <p:cNvPr id="85" name="Straight Arrow Connector 84">
-                <a:extLst>
-                  <a:ext uri="{FF2B5EF4-FFF2-40B4-BE49-F238E27FC236}">
-                    <a16:creationId xmlns:a16="http://schemas.microsoft.com/office/drawing/2014/main" id="{7CF65358-5540-45E1-A856-3E482A03A5CB}"/>
-                  </a:ext>
-                </a:extLst>
-              </p:cNvPr>
-              <p:cNvCxnSpPr>
-                <a:cxnSpLocks/>
-              </p:cNvCxnSpPr>
-              <p:nvPr/>
-            </p:nvCxnSpPr>
-            <p:spPr>
-              <a:xfrm flipH="1" flipV="1">
-                <a:off x="9439423" y="323557"/>
-                <a:ext cx="1" cy="612615"/>
-              </a:xfrm>
-              <a:prstGeom prst="straightConnector1">
-                <a:avLst/>
-              </a:prstGeom>
-              <a:ln w="41275">
-                <a:solidFill>
-                  <a:schemeClr val="tx1"/>
-                </a:solidFill>
-                <a:tailEnd type="triangle"/>
-              </a:ln>
-            </p:spPr>
-            <p:style>
-              <a:lnRef idx="1">
-                <a:schemeClr val="accent1"/>
-              </a:lnRef>
-              <a:fillRef idx="0">
-                <a:schemeClr val="accent1"/>
-              </a:fillRef>
-              <a:effectRef idx="0">
-                <a:schemeClr val="accent1"/>
-              </a:effectRef>
-              <a:fontRef idx="minor">
-                <a:schemeClr val="tx1"/>
-              </a:fontRef>
-            </p:style>
-          </p:cxnSp>
-        </p:grpSp>
-        <p:sp>
-          <p:nvSpPr>
-            <p:cNvPr id="82" name="TextBox 81">
-              <a:extLst>
-                <a:ext uri="{FF2B5EF4-FFF2-40B4-BE49-F238E27FC236}">
-                  <a16:creationId xmlns:a16="http://schemas.microsoft.com/office/drawing/2014/main" id="{55ED083D-2FDB-4087-B675-183405987601}"/>
-                </a:ext>
-              </a:extLst>
-            </p:cNvPr>
-            <p:cNvSpPr txBox="1"/>
-            <p:nvPr/>
-          </p:nvSpPr>
-          <p:spPr>
-            <a:xfrm>
-              <a:off x="7512889" y="122512"/>
-              <a:ext cx="276038" cy="369332"/>
-            </a:xfrm>
-            <a:prstGeom prst="rect">
-              <a:avLst/>
-            </a:prstGeom>
-            <a:noFill/>
-          </p:spPr>
-          <p:txBody>
-            <a:bodyPr wrap="none" rtlCol="0">
-              <a:spAutoFit/>
-            </a:bodyPr>
-            <a:lstStyle/>
-            <a:p>
-              <a:r>
-                <a:rPr lang="en-US" dirty="0"/>
-                <a:t>z</a:t>
-              </a:r>
-            </a:p>
-          </p:txBody>
-        </p:sp>
-        <p:sp>
-          <p:nvSpPr>
-            <p:cNvPr id="83" name="TextBox 82">
-              <a:extLst>
-                <a:ext uri="{FF2B5EF4-FFF2-40B4-BE49-F238E27FC236}">
-                  <a16:creationId xmlns:a16="http://schemas.microsoft.com/office/drawing/2014/main" id="{7695AEF9-900D-4139-A387-304784A96CAA}"/>
-                </a:ext>
-              </a:extLst>
-            </p:cNvPr>
-            <p:cNvSpPr txBox="1"/>
-            <p:nvPr/>
-          </p:nvSpPr>
-          <p:spPr>
-            <a:xfrm>
-              <a:off x="6953376" y="670538"/>
-              <a:ext cx="288862" cy="369332"/>
-            </a:xfrm>
-            <a:prstGeom prst="rect">
-              <a:avLst/>
-            </a:prstGeom>
-            <a:noFill/>
-          </p:spPr>
-          <p:txBody>
-            <a:bodyPr wrap="none" rtlCol="0">
-              <a:spAutoFit/>
-            </a:bodyPr>
-            <a:lstStyle/>
-            <a:p>
-              <a:r>
-                <a:rPr lang="en-US" dirty="0"/>
-                <a:t>y</a:t>
-              </a:r>
-            </a:p>
-          </p:txBody>
-        </p:sp>
-      </p:grpSp>
       <p:sp>
         <p:nvSpPr>
-          <p:cNvPr id="86" name="TextBox 85">
-            <a:extLst>
-              <a:ext uri="{FF2B5EF4-FFF2-40B4-BE49-F238E27FC236}">
-                <a16:creationId xmlns:a16="http://schemas.microsoft.com/office/drawing/2014/main" id="{AC81A69A-0881-4D0C-9AA9-1ECAC99FE2BF}"/>
+          <p:cNvPr id="69" name="TextBox 68">
+            <a:extLst>
+              <a:ext uri="{FF2B5EF4-FFF2-40B4-BE49-F238E27FC236}">
+                <a16:creationId xmlns:a16="http://schemas.microsoft.com/office/drawing/2014/main" id="{4ED5C6BD-EED7-4C4F-80E5-AA8305CF6D6C}"/>
               </a:ext>
             </a:extLst>
           </p:cNvPr>
@@ -9616,13 +10514,18 @@
         </p:nvSpPr>
         <p:spPr>
           <a:xfrm>
-            <a:off x="4435818" y="940025"/>
-            <a:ext cx="330540" cy="369332"/>
+            <a:off x="3334476" y="1733314"/>
+            <a:ext cx="804772" cy="369332"/>
           </a:xfrm>
           <a:prstGeom prst="rect">
             <a:avLst/>
           </a:prstGeom>
-          <a:noFill/>
+          <a:solidFill>
+            <a:schemeClr val="accent2">
+              <a:lumMod val="40000"/>
+              <a:lumOff val="60000"/>
+            </a:schemeClr>
+          </a:solidFill>
         </p:spPr>
         <p:txBody>
           <a:bodyPr wrap="none" rtlCol="0">
@@ -9632,11 +10535,137 @@
           <a:p>
             <a:r>
               <a:rPr lang="en-US" dirty="0"/>
-              <a:t>G</a:t>
+              <a:t>Trolley</a:t>
             </a:r>
           </a:p>
         </p:txBody>
       </p:sp>
+      <p:sp>
+        <p:nvSpPr>
+          <p:cNvPr id="72" name="TextBox 71">
+            <a:extLst>
+              <a:ext uri="{FF2B5EF4-FFF2-40B4-BE49-F238E27FC236}">
+                <a16:creationId xmlns:a16="http://schemas.microsoft.com/office/drawing/2014/main" id="{65D9D39F-1D5B-441B-AFBA-68DDFDBDA1D4}"/>
+              </a:ext>
+            </a:extLst>
+          </p:cNvPr>
+          <p:cNvSpPr txBox="1"/>
+          <p:nvPr/>
+        </p:nvSpPr>
+        <p:spPr>
+          <a:xfrm>
+            <a:off x="7168281" y="777313"/>
+            <a:ext cx="823302" cy="369332"/>
+          </a:xfrm>
+          <a:prstGeom prst="rect">
+            <a:avLst/>
+          </a:prstGeom>
+          <a:solidFill>
+            <a:schemeClr val="accent2">
+              <a:lumMod val="40000"/>
+              <a:lumOff val="60000"/>
+            </a:schemeClr>
+          </a:solidFill>
+        </p:spPr>
+        <p:txBody>
+          <a:bodyPr wrap="none" rtlCol="0">
+            <a:spAutoFit/>
+          </a:bodyPr>
+          <a:lstStyle/>
+          <a:p>
+            <a:r>
+              <a:rPr lang="en-US" dirty="0"/>
+              <a:t>Gantry</a:t>
+            </a:r>
+          </a:p>
+        </p:txBody>
+      </p:sp>
+      <p:cxnSp>
+        <p:nvCxnSpPr>
+          <p:cNvPr id="14" name="Connector: Elbow 13">
+            <a:extLst>
+              <a:ext uri="{FF2B5EF4-FFF2-40B4-BE49-F238E27FC236}">
+                <a16:creationId xmlns:a16="http://schemas.microsoft.com/office/drawing/2014/main" id="{1FAD2155-7FC2-4E51-BA04-98664F1FF507}"/>
+              </a:ext>
+            </a:extLst>
+          </p:cNvPr>
+          <p:cNvCxnSpPr>
+            <a:cxnSpLocks/>
+            <a:stCxn id="72" idx="3"/>
+            <a:endCxn id="8" idx="0"/>
+          </p:cNvCxnSpPr>
+          <p:nvPr/>
+        </p:nvCxnSpPr>
+        <p:spPr>
+          <a:xfrm>
+            <a:off x="7991583" y="961979"/>
+            <a:ext cx="276204" cy="317169"/>
+          </a:xfrm>
+          <a:prstGeom prst="bentConnector2">
+            <a:avLst/>
+          </a:prstGeom>
+          <a:ln>
+            <a:tailEnd type="triangle"/>
+          </a:ln>
+        </p:spPr>
+        <p:style>
+          <a:lnRef idx="1">
+            <a:schemeClr val="accent1"/>
+          </a:lnRef>
+          <a:fillRef idx="0">
+            <a:schemeClr val="accent1"/>
+          </a:fillRef>
+          <a:effectRef idx="0">
+            <a:schemeClr val="accent1"/>
+          </a:effectRef>
+          <a:fontRef idx="minor">
+            <a:schemeClr val="tx1"/>
+          </a:fontRef>
+        </p:style>
+      </p:cxnSp>
+      <p:cxnSp>
+        <p:nvCxnSpPr>
+          <p:cNvPr id="23" name="Connector: Elbow 22">
+            <a:extLst>
+              <a:ext uri="{FF2B5EF4-FFF2-40B4-BE49-F238E27FC236}">
+                <a16:creationId xmlns:a16="http://schemas.microsoft.com/office/drawing/2014/main" id="{4096037E-F273-4511-90E5-C036AC49728D}"/>
+              </a:ext>
+            </a:extLst>
+          </p:cNvPr>
+          <p:cNvCxnSpPr>
+            <a:cxnSpLocks/>
+            <a:stCxn id="69" idx="3"/>
+            <a:endCxn id="9" idx="1"/>
+          </p:cNvCxnSpPr>
+          <p:nvPr/>
+        </p:nvCxnSpPr>
+        <p:spPr>
+          <a:xfrm flipV="1">
+            <a:off x="4139248" y="1439654"/>
+            <a:ext cx="724724" cy="478326"/>
+          </a:xfrm>
+          <a:prstGeom prst="bentConnector3">
+            <a:avLst/>
+          </a:prstGeom>
+          <a:ln>
+            <a:tailEnd type="triangle"/>
+          </a:ln>
+        </p:spPr>
+        <p:style>
+          <a:lnRef idx="1">
+            <a:schemeClr val="accent1"/>
+          </a:lnRef>
+          <a:fillRef idx="0">
+            <a:schemeClr val="accent1"/>
+          </a:fillRef>
+          <a:effectRef idx="0">
+            <a:schemeClr val="accent1"/>
+          </a:effectRef>
+          <a:fontRef idx="minor">
+            <a:schemeClr val="tx1"/>
+          </a:fontRef>
+        </p:style>
+      </p:cxnSp>
     </p:spTree>
     <p:extLst>
       <p:ext uri="{BB962C8B-B14F-4D97-AF65-F5344CB8AC3E}">
@@ -9653,11 +10682,191 @@
 <file path=ppt/tags/tag1.xml><?xml version="1.0" encoding="utf-8"?>
 <p:tagLst xmlns:a="http://schemas.openxmlformats.org/drawingml/2006/main" xmlns:r="http://schemas.openxmlformats.org/officeDocument/2006/relationships" xmlns:p="http://schemas.openxmlformats.org/presentationml/2006/main">
   <p:tag name="OUTPUTDPI" val="2000"/>
-  <p:tag name="ORIGINALHEIGHT" val="91.51276"/>
-  <p:tag name="ORIGINALWIDTH" val="100.514"/>
-  <p:tag name="LATEXADDIN" val="\documentclass{article}&#10;\usepackage{amsmath}&#10;\pagestyle{empty}&#10;\input{&quot;C:/Users/ashim/Desktop/DelayedMeasurementEstimation/Tex/img/temp/settings.tex&quot;}&#10;\begin{document}&#10;&#10;$\tau$&#10;\end{document}"/>
+  <p:tag name="ORIGINALHEIGHT" val="140.2696"/>
+  <p:tag name="ORIGINALWIDTH" val="141.0197"/>
+  <p:tag name="LATEXADDIN" val="\documentclass{article}&#10;\usepackage{amsmath}&#10;\pagestyle{empty}&#10;\input{&quot;C:/Users/ashim/Desktop/DelayedMeasurementEstimation/Tex/img/temp/settings.tex&quot;}&#10;\begin{document}&#10;&#10;$T$&#10;\end{document}"/>
   <p:tag name="IGUANATEXSIZE" val="30"/>
-  <p:tag name="IGUANATEXCURSOR" val="170"/>
+  <p:tag name="IGUANATEXCURSOR" val="171"/>
+  <p:tag name="TRANSPARENCY" val="True"/>
+  <p:tag name="LATEXENGINEID" val="1"/>
+  <p:tag name="TEMPFOLDER" val=".\temp\"/>
+  <p:tag name="LATEXFORMHEIGHT" val="312"/>
+  <p:tag name="LATEXFORMWIDTH" val="384"/>
+  <p:tag name="LATEXFORMWRAP" val="True"/>
+  <p:tag name="BITMAPVECTOR" val="0"/>
+</p:tagLst>
+</file>
+
+<file path=ppt/tags/tag10.xml><?xml version="1.0" encoding="utf-8"?>
+<p:tagLst xmlns:a="http://schemas.openxmlformats.org/drawingml/2006/main" xmlns:r="http://schemas.openxmlformats.org/officeDocument/2006/relationships" xmlns:p="http://schemas.openxmlformats.org/presentationml/2006/main">
+  <p:tag name="OUTPUTDPI" val="2000"/>
+  <p:tag name="ORIGINALHEIGHT" val="177.0247"/>
+  <p:tag name="ORIGINALWIDTH" val="255.7857"/>
+  <p:tag name="LATEXADDIN" val="\documentclass{article}&#10;\usepackage{amsmath}&#10;\pagestyle{empty}&#10;\input{&quot;C:/Users/ashim/Desktop/DelayedMeasurementEstimation/Tex/img/temp/settings.tex&quot;}&#10;\begin{document}&#10;&#10;$C_Z$&#10;&#10;\end{document}"/>
+  <p:tag name="IGUANATEXSIZE" val="30"/>
+  <p:tag name="IGUANATEXCURSOR" val="171"/>
+  <p:tag name="TRANSPARENCY" val="True"/>
+  <p:tag name="LATEXENGINEID" val="1"/>
+  <p:tag name="TEMPFOLDER" val=".\temp\"/>
+  <p:tag name="LATEXFORMHEIGHT" val="312"/>
+  <p:tag name="LATEXFORMWIDTH" val="384"/>
+  <p:tag name="LATEXFORMWRAP" val="True"/>
+  <p:tag name="BITMAPVECTOR" val="0"/>
+</p:tagLst>
+</file>
+
+<file path=ppt/tags/tag11.xml><?xml version="1.0" encoding="utf-8"?>
+<p:tagLst xmlns:a="http://schemas.openxmlformats.org/drawingml/2006/main" xmlns:r="http://schemas.openxmlformats.org/officeDocument/2006/relationships" xmlns:p="http://schemas.openxmlformats.org/presentationml/2006/main">
+  <p:tag name="OUTPUTDPI" val="2000"/>
+  <p:tag name="ORIGINALHEIGHT" val="177.0247"/>
+  <p:tag name="ORIGINALWIDTH" val="275.2884"/>
+  <p:tag name="LATEXADDIN" val="\documentclass{article}&#10;\usepackage{amsmath}&#10;\pagestyle{empty}&#10;\input{&quot;C:/Users/ashim/Desktop/DelayedMeasurementEstimation/Tex/img/temp/settings.tex&quot;}&#10;\begin{document}&#10;&#10;$C_X$&#10;&#10;\end{document}"/>
+  <p:tag name="IGUANATEXSIZE" val="30"/>
+  <p:tag name="IGUANATEXCURSOR" val="171"/>
+  <p:tag name="TRANSPARENCY" val="True"/>
+  <p:tag name="LATEXENGINEID" val="1"/>
+  <p:tag name="TEMPFOLDER" val=".\temp\"/>
+  <p:tag name="LATEXFORMHEIGHT" val="312"/>
+  <p:tag name="LATEXFORMWIDTH" val="384"/>
+  <p:tag name="LATEXFORMWRAP" val="True"/>
+  <p:tag name="BITMAPVECTOR" val="0"/>
+</p:tagLst>
+</file>
+
+<file path=ppt/tags/tag12.xml><?xml version="1.0" encoding="utf-8"?>
+<p:tagLst xmlns:a="http://schemas.openxmlformats.org/drawingml/2006/main" xmlns:r="http://schemas.openxmlformats.org/officeDocument/2006/relationships" xmlns:p="http://schemas.openxmlformats.org/presentationml/2006/main">
+  <p:tag name="OUTPUTDPI" val="2000"/>
+  <p:tag name="ORIGINALHEIGHT" val="172.5241"/>
+  <p:tag name="ORIGINALWIDTH" val="248.2847"/>
+  <p:tag name="LATEXADDIN" val="\documentclass{article}&#10;\usepackage{amsmath}&#10;\pagestyle{empty}&#10;\input{&quot;C:/Users/ashim/Desktop/DelayedMeasurementEstimation/Tex/img/temp/settings.tex&quot;}&#10;\begin{document}&#10;&#10;$L_Z$&#10;&#10;\end{document}"/>
+  <p:tag name="IGUANATEXSIZE" val="30"/>
+  <p:tag name="IGUANATEXCURSOR" val="171"/>
+  <p:tag name="TRANSPARENCY" val="True"/>
+  <p:tag name="LATEXENGINEID" val="1"/>
+  <p:tag name="TEMPFOLDER" val=".\temp\"/>
+  <p:tag name="LATEXFORMHEIGHT" val="312"/>
+  <p:tag name="LATEXFORMWIDTH" val="384"/>
+  <p:tag name="LATEXFORMWRAP" val="True"/>
+  <p:tag name="BITMAPVECTOR" val="0"/>
+</p:tagLst>
+</file>
+
+<file path=ppt/tags/tag13.xml><?xml version="1.0" encoding="utf-8"?>
+<p:tagLst xmlns:a="http://schemas.openxmlformats.org/drawingml/2006/main" xmlns:r="http://schemas.openxmlformats.org/officeDocument/2006/relationships" xmlns:p="http://schemas.openxmlformats.org/presentationml/2006/main">
+  <p:tag name="OUTPUTDPI" val="2000"/>
+  <p:tag name="ORIGINALHEIGHT" val="172.5241"/>
+  <p:tag name="ORIGINALWIDTH" val="268.5375"/>
+  <p:tag name="LATEXADDIN" val="\documentclass{article}&#10;\usepackage{amsmath}&#10;\pagestyle{empty}&#10;\input{&quot;C:/Users/ashim/Desktop/DelayedMeasurementEstimation/Tex/img/temp/settings.tex&quot;}&#10;\begin{document}&#10;&#10;$L_X$&#10;&#10;\end{document}"/>
+  <p:tag name="IGUANATEXSIZE" val="30"/>
+  <p:tag name="IGUANATEXCURSOR" val="171"/>
+  <p:tag name="TRANSPARENCY" val="True"/>
+  <p:tag name="LATEXENGINEID" val="1"/>
+  <p:tag name="TEMPFOLDER" val=".\temp\"/>
+  <p:tag name="LATEXFORMHEIGHT" val="312"/>
+  <p:tag name="LATEXFORMWIDTH" val="384"/>
+  <p:tag name="LATEXFORMWRAP" val="True"/>
+  <p:tag name="BITMAPVECTOR" val="0"/>
+</p:tagLst>
+</file>
+
+<file path=ppt/tags/tag14.xml><?xml version="1.0" encoding="utf-8"?>
+<p:tagLst xmlns:a="http://schemas.openxmlformats.org/drawingml/2006/main" xmlns:r="http://schemas.openxmlformats.org/officeDocument/2006/relationships" xmlns:p="http://schemas.openxmlformats.org/presentationml/2006/main">
+  <p:tag name="OUTPUTDPI" val="2000"/>
+  <p:tag name="ORIGINALHEIGHT" val="171.7739"/>
+  <p:tag name="ORIGINALWIDTH" val="249.0347"/>
+  <p:tag name="LATEXADDIN" val="\documentclass{article}&#10;\usepackage{amsmath}&#10;\pagestyle{empty}&#10;\input{&quot;C:/Users/ashim/Desktop/DelayedMeasurementEstimation/Tex/img/temp/settings.tex&quot;}&#10;\begin{document}&#10;&#10;$F_Y$&#10;&#10;\end{document}"/>
+  <p:tag name="IGUANATEXSIZE" val="30"/>
+  <p:tag name="IGUANATEXCURSOR" val="173"/>
+  <p:tag name="TRANSPARENCY" val="True"/>
+  <p:tag name="LATEXENGINEID" val="1"/>
+  <p:tag name="TEMPFOLDER" val=".\temp\"/>
+  <p:tag name="LATEXFORMHEIGHT" val="312"/>
+  <p:tag name="LATEXFORMWIDTH" val="384"/>
+  <p:tag name="LATEXFORMWRAP" val="True"/>
+  <p:tag name="BITMAPVECTOR" val="0"/>
+</p:tagLst>
+</file>
+
+<file path=ppt/tags/tag15.xml><?xml version="1.0" encoding="utf-8"?>
+<p:tagLst xmlns:a="http://schemas.openxmlformats.org/drawingml/2006/main" xmlns:r="http://schemas.openxmlformats.org/officeDocument/2006/relationships" xmlns:p="http://schemas.openxmlformats.org/presentationml/2006/main">
+  <p:tag name="OUTPUTDPI" val="2000"/>
+  <p:tag name="ORIGINALHEIGHT" val="171.7739"/>
+  <p:tag name="ORIGINALWIDTH" val="240.7836"/>
+  <p:tag name="LATEXADDIN" val="\documentclass{article}&#10;\usepackage{amsmath}&#10;\pagestyle{empty}&#10;\input{&quot;C:/Users/ashim/Desktop/DelayedMeasurementEstimation/Tex/img/temp/settings.tex&quot;}&#10;\begin{document}&#10;&#10;$F_Z$&#10;&#10;\end{document}"/>
+  <p:tag name="IGUANATEXSIZE" val="30"/>
+  <p:tag name="IGUANATEXCURSOR" val="173"/>
+  <p:tag name="TRANSPARENCY" val="True"/>
+  <p:tag name="LATEXENGINEID" val="1"/>
+  <p:tag name="TEMPFOLDER" val=".\temp\"/>
+  <p:tag name="LATEXFORMHEIGHT" val="312"/>
+  <p:tag name="LATEXFORMWIDTH" val="384"/>
+  <p:tag name="LATEXFORMWRAP" val="True"/>
+  <p:tag name="BITMAPVECTOR" val="0"/>
+</p:tagLst>
+</file>
+
+<file path=ppt/tags/tag16.xml><?xml version="1.0" encoding="utf-8"?>
+<p:tagLst xmlns:a="http://schemas.openxmlformats.org/drawingml/2006/main" xmlns:r="http://schemas.openxmlformats.org/officeDocument/2006/relationships" xmlns:p="http://schemas.openxmlformats.org/presentationml/2006/main">
+  <p:tag name="OUTPUTDPI" val="2000"/>
+  <p:tag name="ORIGINALHEIGHT" val="171.0239"/>
+  <p:tag name="ORIGINALWIDTH" val="240.0335"/>
+  <p:tag name="LATEXADDIN" val="\documentclass{article}&#10;\usepackage{amsmath}&#10;\pagestyle{empty}&#10;\input{&quot;C:/Users/ashim/Desktop/DelayedMeasurementEstimation/Tex/img/temp/settings.tex&quot;}&#10;\begin{document}&#10;&#10;$T_Y$&#10;&#10;\end{document}"/>
+  <p:tag name="IGUANATEXSIZE" val="30"/>
+  <p:tag name="IGUANATEXCURSOR" val="171"/>
+  <p:tag name="TRANSPARENCY" val="True"/>
+  <p:tag name="LATEXENGINEID" val="1"/>
+  <p:tag name="TEMPFOLDER" val=".\temp\"/>
+  <p:tag name="LATEXFORMHEIGHT" val="312"/>
+  <p:tag name="LATEXFORMWIDTH" val="384"/>
+  <p:tag name="LATEXFORMWRAP" val="True"/>
+  <p:tag name="BITMAPVECTOR" val="0"/>
+</p:tagLst>
+</file>
+
+<file path=ppt/tags/tag17.xml><?xml version="1.0" encoding="utf-8"?>
+<p:tagLst xmlns:a="http://schemas.openxmlformats.org/drawingml/2006/main" xmlns:r="http://schemas.openxmlformats.org/officeDocument/2006/relationships" xmlns:p="http://schemas.openxmlformats.org/presentationml/2006/main">
+  <p:tag name="OUTPUTDPI" val="2000"/>
+  <p:tag name="ORIGINALHEIGHT" val="171.0239"/>
+  <p:tag name="ORIGINALWIDTH" val="231.7824"/>
+  <p:tag name="LATEXADDIN" val="\documentclass{article}&#10;\usepackage{amsmath}&#10;\pagestyle{empty}&#10;\input{&quot;C:/Users/ashim/Desktop/DelayedMeasurementEstimation/Tex/img/temp/settings.tex&quot;}&#10;\begin{document}&#10;&#10;$T_Z$&#10;&#10;\end{document}"/>
+  <p:tag name="IGUANATEXSIZE" val="30"/>
+  <p:tag name="IGUANATEXCURSOR" val="171"/>
+  <p:tag name="TRANSPARENCY" val="True"/>
+  <p:tag name="LATEXENGINEID" val="1"/>
+  <p:tag name="TEMPFOLDER" val=".\temp\"/>
+  <p:tag name="LATEXFORMHEIGHT" val="312"/>
+  <p:tag name="LATEXFORMWIDTH" val="384"/>
+  <p:tag name="LATEXFORMWRAP" val="True"/>
+  <p:tag name="BITMAPVECTOR" val="0"/>
+</p:tagLst>
+</file>
+
+<file path=ppt/tags/tag18.xml><?xml version="1.0" encoding="utf-8"?>
+<p:tagLst xmlns:a="http://schemas.openxmlformats.org/drawingml/2006/main" xmlns:r="http://schemas.openxmlformats.org/officeDocument/2006/relationships" xmlns:p="http://schemas.openxmlformats.org/presentationml/2006/main">
+  <p:tag name="OUTPUTDPI" val="2000"/>
+  <p:tag name="ORIGINALHEIGHT" val="177.0247"/>
+  <p:tag name="ORIGINALWIDTH" val="279.039"/>
+  <p:tag name="LATEXADDIN" val="\documentclass{article}&#10;\usepackage{amsmath}&#10;\pagestyle{empty}&#10;\input{&quot;C:/Users/ashim/Desktop/DelayedMeasurementEstimation/Tex/img/temp/settings.tex&quot;}&#10;\begin{document}&#10;&#10;$G_Y$&#10;&#10;\end{document}"/>
+  <p:tag name="IGUANATEXSIZE" val="30"/>
+  <p:tag name="IGUANATEXCURSOR" val="173"/>
+  <p:tag name="TRANSPARENCY" val="True"/>
+  <p:tag name="LATEXENGINEID" val="1"/>
+  <p:tag name="TEMPFOLDER" val=".\temp\"/>
+  <p:tag name="LATEXFORMHEIGHT" val="312"/>
+  <p:tag name="LATEXFORMWIDTH" val="384"/>
+  <p:tag name="LATEXFORMWRAP" val="True"/>
+  <p:tag name="BITMAPVECTOR" val="0"/>
+</p:tagLst>
+</file>
+
+<file path=ppt/tags/tag19.xml><?xml version="1.0" encoding="utf-8"?>
+<p:tagLst xmlns:a="http://schemas.openxmlformats.org/drawingml/2006/main" xmlns:r="http://schemas.openxmlformats.org/officeDocument/2006/relationships" xmlns:p="http://schemas.openxmlformats.org/presentationml/2006/main">
+  <p:tag name="OUTPUTDPI" val="2000"/>
+  <p:tag name="ORIGINALHEIGHT" val="177.0247"/>
+  <p:tag name="ORIGINALWIDTH" val="270.7878"/>
+  <p:tag name="LATEXADDIN" val="\documentclass{article}&#10;\usepackage{amsmath}&#10;\pagestyle{empty}&#10;\input{&quot;C:/Users/ashim/Desktop/DelayedMeasurementEstimation/Tex/img/temp/settings.tex&quot;}&#10;\begin{document}&#10;&#10;$G_Z$&#10;&#10;\end{document}"/>
+  <p:tag name="IGUANATEXSIZE" val="30"/>
+  <p:tag name="IGUANATEXCURSOR" val="171"/>
   <p:tag name="TRANSPARENCY" val="True"/>
   <p:tag name="LATEXENGINEID" val="1"/>
   <p:tag name="TEMPFOLDER" val=".\temp\"/>
@@ -9686,6 +10895,42 @@
 </p:tagLst>
 </file>
 
+<file path=ppt/tags/tag20.xml><?xml version="1.0" encoding="utf-8"?>
+<p:tagLst xmlns:a="http://schemas.openxmlformats.org/drawingml/2006/main" xmlns:r="http://schemas.openxmlformats.org/officeDocument/2006/relationships" xmlns:p="http://schemas.openxmlformats.org/presentationml/2006/main">
+  <p:tag name="OUTPUTDPI" val="2000"/>
+  <p:tag name="ORIGINALHEIGHT" val="177.0247"/>
+  <p:tag name="ORIGINALWIDTH" val="264.0369"/>
+  <p:tag name="LATEXADDIN" val="\documentclass{article}&#10;\usepackage{amsmath}&#10;\pagestyle{empty}&#10;\input{&quot;C:/Users/ashim/Desktop/DelayedMeasurementEstimation/Tex/img/temp/settings.tex&quot;}&#10;\begin{document}&#10;&#10;$C_Y$&#10;&#10;\end{document}"/>
+  <p:tag name="IGUANATEXSIZE" val="30"/>
+  <p:tag name="IGUANATEXCURSOR" val="173"/>
+  <p:tag name="TRANSPARENCY" val="True"/>
+  <p:tag name="LATEXENGINEID" val="1"/>
+  <p:tag name="TEMPFOLDER" val=".\temp\"/>
+  <p:tag name="LATEXFORMHEIGHT" val="312"/>
+  <p:tag name="LATEXFORMWIDTH" val="384"/>
+  <p:tag name="LATEXFORMWRAP" val="True"/>
+  <p:tag name="BITMAPVECTOR" val="0"/>
+</p:tagLst>
+</file>
+
+<file path=ppt/tags/tag21.xml><?xml version="1.0" encoding="utf-8"?>
+<p:tagLst xmlns:a="http://schemas.openxmlformats.org/drawingml/2006/main" xmlns:r="http://schemas.openxmlformats.org/officeDocument/2006/relationships" xmlns:p="http://schemas.openxmlformats.org/presentationml/2006/main">
+  <p:tag name="OUTPUTDPI" val="2000"/>
+  <p:tag name="ORIGINALHEIGHT" val="177.0247"/>
+  <p:tag name="ORIGINALWIDTH" val="255.7857"/>
+  <p:tag name="LATEXADDIN" val="\documentclass{article}&#10;\usepackage{amsmath}&#10;\pagestyle{empty}&#10;\input{&quot;C:/Users/ashim/Desktop/DelayedMeasurementEstimation/Tex/img/temp/settings.tex&quot;}&#10;\begin{document}&#10;&#10;$C_Z$&#10;&#10;\end{document}"/>
+  <p:tag name="IGUANATEXSIZE" val="30"/>
+  <p:tag name="IGUANATEXCURSOR" val="173"/>
+  <p:tag name="TRANSPARENCY" val="True"/>
+  <p:tag name="LATEXENGINEID" val="1"/>
+  <p:tag name="TEMPFOLDER" val=".\temp\"/>
+  <p:tag name="LATEXFORMHEIGHT" val="312"/>
+  <p:tag name="LATEXFORMWIDTH" val="384"/>
+  <p:tag name="LATEXFORMWRAP" val="True"/>
+  <p:tag name="BITMAPVECTOR" val="0"/>
+</p:tagLst>
+</file>
+
 <file path=ppt/tags/tag3.xml><?xml version="1.0" encoding="utf-8"?>
 <p:tagLst xmlns:a="http://schemas.openxmlformats.org/drawingml/2006/main" xmlns:r="http://schemas.openxmlformats.org/officeDocument/2006/relationships" xmlns:p="http://schemas.openxmlformats.org/presentationml/2006/main">
   <p:tag name="OUTPUTDPI" val="2000"/>
@@ -9694,6 +10939,114 @@
   <p:tag name="LATEXADDIN" val="\documentclass{article}&#10;\usepackage{amsmath}&#10;\pagestyle{empty}&#10;\input{&quot;C:/Users/ashim/Desktop/DelayedMeasurementEstimation/Tex/img/temp/settings.tex&quot;}&#10;\begin{document}&#10;&#10;$p(k,t)$&#10;\end{document}"/>
   <p:tag name="IGUANATEXSIZE" val="30"/>
   <p:tag name="IGUANATEXCURSOR" val="174"/>
+  <p:tag name="TRANSPARENCY" val="True"/>
+  <p:tag name="LATEXENGINEID" val="1"/>
+  <p:tag name="TEMPFOLDER" val=".\temp\"/>
+  <p:tag name="LATEXFORMHEIGHT" val="312"/>
+  <p:tag name="LATEXFORMWIDTH" val="384"/>
+  <p:tag name="LATEXFORMWRAP" val="True"/>
+  <p:tag name="BITMAPVECTOR" val="0"/>
+</p:tagLst>
+</file>
+
+<file path=ppt/tags/tag4.xml><?xml version="1.0" encoding="utf-8"?>
+<p:tagLst xmlns:a="http://schemas.openxmlformats.org/drawingml/2006/main" xmlns:r="http://schemas.openxmlformats.org/officeDocument/2006/relationships" xmlns:p="http://schemas.openxmlformats.org/presentationml/2006/main">
+  <p:tag name="OUTPUTDPI" val="2000"/>
+  <p:tag name="ORIGINALHEIGHT" val="177.0247"/>
+  <p:tag name="ORIGINALWIDTH" val="270.7878"/>
+  <p:tag name="LATEXADDIN" val="\documentclass{article}&#10;\usepackage{amsmath}&#10;\pagestyle{empty}&#10;\input{&quot;C:/Users/ashim/Desktop/DelayedMeasurementEstimation/Tex/img/temp/settings.tex&quot;}&#10;\begin{document}&#10;&#10;$G_Z$&#10;&#10;\end{document}"/>
+  <p:tag name="IGUANATEXSIZE" val="30"/>
+  <p:tag name="IGUANATEXCURSOR" val="173"/>
+  <p:tag name="TRANSPARENCY" val="True"/>
+  <p:tag name="LATEXENGINEID" val="1"/>
+  <p:tag name="TEMPFOLDER" val=".\temp\"/>
+  <p:tag name="LATEXFORMHEIGHT" val="312"/>
+  <p:tag name="LATEXFORMWIDTH" val="384"/>
+  <p:tag name="LATEXFORMWRAP" val="True"/>
+  <p:tag name="BITMAPVECTOR" val="0"/>
+</p:tagLst>
+</file>
+
+<file path=ppt/tags/tag5.xml><?xml version="1.0" encoding="utf-8"?>
+<p:tagLst xmlns:a="http://schemas.openxmlformats.org/drawingml/2006/main" xmlns:r="http://schemas.openxmlformats.org/officeDocument/2006/relationships" xmlns:p="http://schemas.openxmlformats.org/presentationml/2006/main">
+  <p:tag name="OUTPUTDPI" val="2000"/>
+  <p:tag name="ORIGINALHEIGHT" val="177.0247"/>
+  <p:tag name="ORIGINALWIDTH" val="290.2905"/>
+  <p:tag name="LATEXADDIN" val="\documentclass{article}&#10;\usepackage{amsmath}&#10;\pagestyle{empty}&#10;\input{&quot;C:/Users/ashim/Desktop/DelayedMeasurementEstimation/Tex/img/temp/settings.tex&quot;}&#10;\begin{document}&#10;&#10;$G_X$&#10;&#10;\end{document}"/>
+  <p:tag name="IGUANATEXSIZE" val="30"/>
+  <p:tag name="IGUANATEXCURSOR" val="173"/>
+  <p:tag name="TRANSPARENCY" val="True"/>
+  <p:tag name="LATEXENGINEID" val="1"/>
+  <p:tag name="TEMPFOLDER" val=".\temp\"/>
+  <p:tag name="LATEXFORMHEIGHT" val="312"/>
+  <p:tag name="LATEXFORMWIDTH" val="384"/>
+  <p:tag name="LATEXFORMWRAP" val="True"/>
+  <p:tag name="BITMAPVECTOR" val="0"/>
+</p:tagLst>
+</file>
+
+<file path=ppt/tags/tag6.xml><?xml version="1.0" encoding="utf-8"?>
+<p:tagLst xmlns:a="http://schemas.openxmlformats.org/drawingml/2006/main" xmlns:r="http://schemas.openxmlformats.org/officeDocument/2006/relationships" xmlns:p="http://schemas.openxmlformats.org/presentationml/2006/main">
+  <p:tag name="OUTPUTDPI" val="2000"/>
+  <p:tag name="ORIGINALHEIGHT" val="171.0239"/>
+  <p:tag name="ORIGINALWIDTH" val="231.7824"/>
+  <p:tag name="LATEXADDIN" val="\documentclass{article}&#10;\usepackage{amsmath}&#10;\pagestyle{empty}&#10;\input{&quot;C:/Users/ashim/Desktop/DelayedMeasurementEstimation/Tex/img/temp/settings.tex&quot;}&#10;\begin{document}&#10;&#10;$T_Z$&#10;&#10;\end{document}"/>
+  <p:tag name="IGUANATEXSIZE" val="30"/>
+  <p:tag name="IGUANATEXCURSOR" val="171"/>
+  <p:tag name="TRANSPARENCY" val="True"/>
+  <p:tag name="LATEXENGINEID" val="1"/>
+  <p:tag name="TEMPFOLDER" val=".\temp\"/>
+  <p:tag name="LATEXFORMHEIGHT" val="312"/>
+  <p:tag name="LATEXFORMWIDTH" val="384"/>
+  <p:tag name="LATEXFORMWRAP" val="True"/>
+  <p:tag name="BITMAPVECTOR" val="0"/>
+</p:tagLst>
+</file>
+
+<file path=ppt/tags/tag7.xml><?xml version="1.0" encoding="utf-8"?>
+<p:tagLst xmlns:a="http://schemas.openxmlformats.org/drawingml/2006/main" xmlns:r="http://schemas.openxmlformats.org/officeDocument/2006/relationships" xmlns:p="http://schemas.openxmlformats.org/presentationml/2006/main">
+  <p:tag name="OUTPUTDPI" val="2000"/>
+  <p:tag name="ORIGINALHEIGHT" val="171.0239"/>
+  <p:tag name="ORIGINALWIDTH" val="251.285"/>
+  <p:tag name="LATEXADDIN" val="\documentclass{article}&#10;\usepackage{amsmath}&#10;\pagestyle{empty}&#10;\input{&quot;C:/Users/ashim/Desktop/DelayedMeasurementEstimation/Tex/img/temp/settings.tex&quot;}&#10;\begin{document}&#10;&#10;$T_X$&#10;&#10;\end{document}"/>
+  <p:tag name="IGUANATEXSIZE" val="30"/>
+  <p:tag name="IGUANATEXCURSOR" val="173"/>
+  <p:tag name="TRANSPARENCY" val="True"/>
+  <p:tag name="LATEXENGINEID" val="1"/>
+  <p:tag name="TEMPFOLDER" val=".\temp\"/>
+  <p:tag name="LATEXFORMHEIGHT" val="312"/>
+  <p:tag name="LATEXFORMWIDTH" val="384"/>
+  <p:tag name="LATEXFORMWRAP" val="True"/>
+  <p:tag name="BITMAPVECTOR" val="0"/>
+</p:tagLst>
+</file>
+
+<file path=ppt/tags/tag8.xml><?xml version="1.0" encoding="utf-8"?>
+<p:tagLst xmlns:a="http://schemas.openxmlformats.org/drawingml/2006/main" xmlns:r="http://schemas.openxmlformats.org/officeDocument/2006/relationships" xmlns:p="http://schemas.openxmlformats.org/presentationml/2006/main">
+  <p:tag name="OUTPUTDPI" val="2000"/>
+  <p:tag name="ORIGINALHEIGHT" val="171.7739"/>
+  <p:tag name="ORIGINALWIDTH" val="240.7836"/>
+  <p:tag name="LATEXADDIN" val="\documentclass{article}&#10;\usepackage{amsmath}&#10;\pagestyle{empty}&#10;\input{&quot;C:/Users/ashim/Desktop/DelayedMeasurementEstimation/Tex/img/temp/settings.tex&quot;}&#10;\begin{document}&#10;&#10;$F_Z$&#10;&#10;\end{document}"/>
+  <p:tag name="IGUANATEXSIZE" val="30"/>
+  <p:tag name="IGUANATEXCURSOR" val="171"/>
+  <p:tag name="TRANSPARENCY" val="True"/>
+  <p:tag name="LATEXENGINEID" val="1"/>
+  <p:tag name="TEMPFOLDER" val=".\temp\"/>
+  <p:tag name="LATEXFORMHEIGHT" val="312"/>
+  <p:tag name="LATEXFORMWIDTH" val="384"/>
+  <p:tag name="LATEXFORMWRAP" val="True"/>
+  <p:tag name="BITMAPVECTOR" val="0"/>
+</p:tagLst>
+</file>
+
+<file path=ppt/tags/tag9.xml><?xml version="1.0" encoding="utf-8"?>
+<p:tagLst xmlns:a="http://schemas.openxmlformats.org/drawingml/2006/main" xmlns:r="http://schemas.openxmlformats.org/officeDocument/2006/relationships" xmlns:p="http://schemas.openxmlformats.org/presentationml/2006/main">
+  <p:tag name="OUTPUTDPI" val="2000"/>
+  <p:tag name="ORIGINALHEIGHT" val="171.7739"/>
+  <p:tag name="ORIGINALWIDTH" val="260.2863"/>
+  <p:tag name="LATEXADDIN" val="\documentclass{article}&#10;\usepackage{amsmath}&#10;\pagestyle{empty}&#10;\input{&quot;C:/Users/ashim/Desktop/DelayedMeasurementEstimation/Tex/img/temp/settings.tex&quot;}&#10;\begin{document}&#10;&#10;$F_X$&#10;&#10;\end{document}"/>
+  <p:tag name="IGUANATEXSIZE" val="30"/>
+  <p:tag name="IGUANATEXCURSOR" val="173"/>
   <p:tag name="TRANSPARENCY" val="True"/>
   <p:tag name="LATEXENGINEID" val="1"/>
   <p:tag name="TEMPFOLDER" val=".\temp\"/>

</xml_diff>